<commit_message>
add state pattern presentation
</commit_message>
<xml_diff>
--- a/Documentation/Praesentation/PresentationRoomanizer.pptx
+++ b/Documentation/Praesentation/PresentationRoomanizer.pptx
@@ -224,7 +224,7 @@
           <a:p>
             <a:fld id="{BE36B728-C1AC-41BD-B8EE-1499AEB738A0}" type="datetimeFigureOut">
               <a:rPr lang="en-GB" smtClean="0"/>
-              <a:t>09/06/2012</a:t>
+              <a:t>10/06/2012</a:t>
             </a:fld>
             <a:endParaRPr lang="en-GB"/>
           </a:p>
@@ -1283,17 +1283,12 @@
           <a:p>
             <a:r>
               <a:rPr lang="de-AT" dirty="0" smtClean="0"/>
-              <a:t>Eigenes </a:t>
-            </a:r>
-            <a:r>
-              <a:rPr lang="de-AT" smtClean="0"/>
-              <a:t>Diagramm</a:t>
-            </a:r>
-            <a:r>
-              <a:rPr lang="de-AT" baseline="0" smtClean="0"/>
+              <a:t>Eigenes Diagramm</a:t>
+            </a:r>
+            <a:r>
+              <a:rPr lang="de-AT" baseline="0" dirty="0" smtClean="0"/>
               <a:t> erstellen?</a:t>
             </a:r>
-            <a:endParaRPr lang="de-AT" baseline="0" dirty="0" smtClean="0"/>
           </a:p>
           <a:p>
             <a:endParaRPr lang="de-AT" baseline="0" dirty="0" smtClean="0"/>
@@ -4729,31 +4724,15 @@
             </a:pPr>
             <a:r>
               <a:rPr lang="en-US" dirty="0" smtClean="0"/>
-              <a:t>The integration of the other program parts by implementation of interfaces was not possible, </a:t>
+              <a:t>The integration of the other program parts by implementation of interfaces was not possible, because</a:t>
+            </a:r>
+            <a:r>
+              <a:rPr lang="en-US" baseline="0" dirty="0" smtClean="0"/>
+              <a:t> </a:t>
             </a:r>
             <a:r>
               <a:rPr lang="en-US" dirty="0" smtClean="0"/>
-              <a:t>because</a:t>
-            </a:r>
-            <a:r>
-              <a:rPr lang="en-US" baseline="0" dirty="0" smtClean="0"/>
-              <a:t> </a:t>
-            </a:r>
-            <a:r>
-              <a:rPr lang="en-US" dirty="0" smtClean="0"/>
-              <a:t>no interfaces were </a:t>
-            </a:r>
-            <a:r>
-              <a:rPr lang="en-US" dirty="0" smtClean="0"/>
-              <a:t>available. To avoid the problem, our adapter classes inherit direct from the domain objects from the other team. Also every adapter implements a generic adapter interface, to set and read its type. This enables dynamic programming, there every of our adapters support this interface and so they can </a:t>
-            </a:r>
-            <a:r>
-              <a:rPr lang="en-US" dirty="0" smtClean="0"/>
-              <a:t>be read </a:t>
-            </a:r>
-            <a:r>
-              <a:rPr lang="en-US" dirty="0" smtClean="0"/>
-              <a:t>and created by other classes.</a:t>
+              <a:t>no interfaces were available. To avoid the problem, our adapter classes inherit direct from the domain objects from the other team. Also every adapter implements a generic adapter interface, to set and read its type. This enables dynamic programming, there every of our adapters support this interface and so they can be read and created by other classes.</a:t>
             </a:r>
           </a:p>
           <a:p>
@@ -6920,7 +6899,7 @@
           <a:p>
             <a:fld id="{1BA50D42-C9CD-4801-B293-61D1F53EC57E}" type="datetimeFigureOut">
               <a:rPr lang="de-DE" smtClean="0"/>
-              <a:t>09.06.2012</a:t>
+              <a:t>10.06.2012</a:t>
             </a:fld>
             <a:endParaRPr lang="de-DE"/>
           </a:p>
@@ -7085,7 +7064,7 @@
           <a:p>
             <a:fld id="{1BA50D42-C9CD-4801-B293-61D1F53EC57E}" type="datetimeFigureOut">
               <a:rPr lang="de-DE" smtClean="0"/>
-              <a:t>09.06.2012</a:t>
+              <a:t>10.06.2012</a:t>
             </a:fld>
             <a:endParaRPr lang="de-DE"/>
           </a:p>
@@ -7260,7 +7239,7 @@
           <a:p>
             <a:fld id="{1BA50D42-C9CD-4801-B293-61D1F53EC57E}" type="datetimeFigureOut">
               <a:rPr lang="de-DE" smtClean="0"/>
-              <a:t>09.06.2012</a:t>
+              <a:t>10.06.2012</a:t>
             </a:fld>
             <a:endParaRPr lang="de-DE"/>
           </a:p>
@@ -7572,7 +7551,7 @@
           <a:p>
             <a:fld id="{1BA50D42-C9CD-4801-B293-61D1F53EC57E}" type="datetimeFigureOut">
               <a:rPr lang="de-DE" smtClean="0"/>
-              <a:t>09.06.2012</a:t>
+              <a:t>10.06.2012</a:t>
             </a:fld>
             <a:endParaRPr lang="de-DE"/>
           </a:p>
@@ -7813,7 +7792,7 @@
           <a:p>
             <a:fld id="{1BA50D42-C9CD-4801-B293-61D1F53EC57E}" type="datetimeFigureOut">
               <a:rPr lang="de-DE" smtClean="0"/>
-              <a:t>09.06.2012</a:t>
+              <a:t>10.06.2012</a:t>
             </a:fld>
             <a:endParaRPr lang="de-DE"/>
           </a:p>
@@ -8096,7 +8075,7 @@
           <a:p>
             <a:fld id="{1BA50D42-C9CD-4801-B293-61D1F53EC57E}" type="datetimeFigureOut">
               <a:rPr lang="de-DE" smtClean="0"/>
-              <a:t>09.06.2012</a:t>
+              <a:t>10.06.2012</a:t>
             </a:fld>
             <a:endParaRPr lang="de-DE"/>
           </a:p>
@@ -8513,7 +8492,7 @@
           <a:p>
             <a:fld id="{1BA50D42-C9CD-4801-B293-61D1F53EC57E}" type="datetimeFigureOut">
               <a:rPr lang="de-DE" smtClean="0"/>
-              <a:t>09.06.2012</a:t>
+              <a:t>10.06.2012</a:t>
             </a:fld>
             <a:endParaRPr lang="de-DE"/>
           </a:p>
@@ -8626,7 +8605,7 @@
           <a:p>
             <a:fld id="{1BA50D42-C9CD-4801-B293-61D1F53EC57E}" type="datetimeFigureOut">
               <a:rPr lang="de-DE" smtClean="0"/>
-              <a:t>09.06.2012</a:t>
+              <a:t>10.06.2012</a:t>
             </a:fld>
             <a:endParaRPr lang="de-DE"/>
           </a:p>
@@ -8716,7 +8695,7 @@
           <a:p>
             <a:fld id="{1BA50D42-C9CD-4801-B293-61D1F53EC57E}" type="datetimeFigureOut">
               <a:rPr lang="de-DE" smtClean="0"/>
-              <a:t>09.06.2012</a:t>
+              <a:t>10.06.2012</a:t>
             </a:fld>
             <a:endParaRPr lang="de-DE"/>
           </a:p>
@@ -8988,7 +8967,7 @@
           <a:p>
             <a:fld id="{1BA50D42-C9CD-4801-B293-61D1F53EC57E}" type="datetimeFigureOut">
               <a:rPr lang="de-DE" smtClean="0"/>
-              <a:t>09.06.2012</a:t>
+              <a:t>10.06.2012</a:t>
             </a:fld>
             <a:endParaRPr lang="de-DE"/>
           </a:p>
@@ -9236,7 +9215,7 @@
           <a:p>
             <a:fld id="{1BA50D42-C9CD-4801-B293-61D1F53EC57E}" type="datetimeFigureOut">
               <a:rPr lang="de-DE" smtClean="0"/>
-              <a:t>09.06.2012</a:t>
+              <a:t>10.06.2012</a:t>
             </a:fld>
             <a:endParaRPr lang="de-DE"/>
           </a:p>
@@ -9444,7 +9423,7 @@
           <a:p>
             <a:fld id="{1BA50D42-C9CD-4801-B293-61D1F53EC57E}" type="datetimeFigureOut">
               <a:rPr lang="de-DE" smtClean="0"/>
-              <a:t>09.06.2012</a:t>
+              <a:t>10.06.2012</a:t>
             </a:fld>
             <a:endParaRPr lang="de-DE"/>
           </a:p>

</xml_diff>

<commit_message>
presentation footer kein neuer content für Präsentation gefunden??? was los?
</commit_message>
<xml_diff>
--- a/Documentation/Praesentation/PresentationRoomanizer.pptx
+++ b/Documentation/Praesentation/PresentationRoomanizer.pptx
@@ -1,6 +1,6 @@
 
 <file path=ppt/presentation.xml><?xml version="1.0" encoding="utf-8"?>
-<p:presentation xmlns:a="http://schemas.openxmlformats.org/drawingml/2006/main" xmlns:r="http://schemas.openxmlformats.org/officeDocument/2006/relationships" xmlns:p="http://schemas.openxmlformats.org/presentationml/2006/main" saveSubsetFonts="1">
+<p:presentation xmlns:a="http://schemas.openxmlformats.org/drawingml/2006/main" xmlns:r="http://schemas.openxmlformats.org/officeDocument/2006/relationships" xmlns:p="http://schemas.openxmlformats.org/presentationml/2006/main" showSpecialPlsOnTitleSld="0" saveSubsetFonts="1">
   <p:sldMasterIdLst>
     <p:sldMasterId id="2147483648" r:id="rId1"/>
   </p:sldMasterIdLst>
@@ -2656,7 +2656,7 @@
           <a:p>
             <a:fld id="{BE36B728-C1AC-41BD-B8EE-1499AEB738A0}" type="datetimeFigureOut">
               <a:rPr lang="en-GB" smtClean="0"/>
-              <a:t>11/06/2012</a:t>
+              <a:t>12/06/2012</a:t>
             </a:fld>
             <a:endParaRPr lang="en-GB"/>
           </a:p>
@@ -2968,33 +2968,7 @@
           <a:bodyPr/>
           <a:lstStyle/>
           <a:p>
-            <a:r>
-              <a:rPr lang="de-AT" dirty="0" smtClean="0"/>
-              <a:t>Page </a:t>
-            </a:r>
-            <a:r>
-              <a:rPr lang="de-AT" dirty="0" err="1" smtClean="0"/>
-              <a:t>numbers</a:t>
-            </a:r>
-            <a:r>
-              <a:rPr lang="de-AT" dirty="0" smtClean="0"/>
-              <a:t>…</a:t>
-            </a:r>
-          </a:p>
-          <a:p>
-            <a:r>
-              <a:rPr lang="de-AT" dirty="0" smtClean="0"/>
-              <a:t>Flipchart </a:t>
-            </a:r>
-            <a:r>
-              <a:rPr lang="de-AT" smtClean="0"/>
-              <a:t>oder</a:t>
-            </a:r>
-            <a:r>
-              <a:rPr lang="de-AT" baseline="0" smtClean="0"/>
-              <a:t> Ähnliches</a:t>
-            </a:r>
-            <a:endParaRPr lang="en-GB" dirty="0"/>
+            <a:endParaRPr lang="de-AT" dirty="0" smtClean="0"/>
           </a:p>
         </p:txBody>
       </p:sp>
@@ -5421,8 +5395,8 @@
         </p:nvSpPr>
         <p:spPr bwMode="auto">
           <a:xfrm>
-            <a:off x="1003786" y="695134"/>
-            <a:ext cx="4848989" cy="3428152"/>
+            <a:off x="1143000" y="695325"/>
+            <a:ext cx="4570413" cy="3427413"/>
           </a:xfrm>
           <a:prstGeom prst="rect">
             <a:avLst/>
@@ -5951,8 +5925,8 @@
         </p:nvSpPr>
         <p:spPr bwMode="auto">
           <a:xfrm>
-            <a:off x="1003786" y="695134"/>
-            <a:ext cx="4848989" cy="3428152"/>
+            <a:off x="1143000" y="695325"/>
+            <a:ext cx="4570413" cy="3427413"/>
           </a:xfrm>
           <a:prstGeom prst="rect">
             <a:avLst/>
@@ -20352,9 +20326,9 @@
           <a:bodyPr/>
           <a:lstStyle/>
           <a:p>
-            <a:fld id="{1BA50D42-C9CD-4801-B293-61D1F53EC57E}" type="datetimeFigureOut">
+            <a:fld id="{DDD0AA32-0160-44A5-8FE7-45C9A4979251}" type="datetime1">
               <a:rPr lang="de-DE" smtClean="0"/>
-              <a:t>11.06.2012</a:t>
+              <a:t>12.06.2012</a:t>
             </a:fld>
             <a:endParaRPr lang="de-DE"/>
           </a:p>
@@ -20375,6 +20349,10 @@
           <a:bodyPr/>
           <a:lstStyle/>
           <a:p>
+            <a:r>
+              <a:rPr lang="de-DE" smtClean="0"/>
+              <a:t>Roomanizer Presentation Team E</a:t>
+            </a:r>
             <a:endParaRPr lang="de-DE"/>
           </a:p>
         </p:txBody>
@@ -20517,9 +20495,9 @@
           <a:bodyPr/>
           <a:lstStyle/>
           <a:p>
-            <a:fld id="{1BA50D42-C9CD-4801-B293-61D1F53EC57E}" type="datetimeFigureOut">
+            <a:fld id="{98116C09-A995-4E7E-B6C8-1BB05DBB9C52}" type="datetime1">
               <a:rPr lang="de-DE" smtClean="0"/>
-              <a:t>11.06.2012</a:t>
+              <a:t>12.06.2012</a:t>
             </a:fld>
             <a:endParaRPr lang="de-DE"/>
           </a:p>
@@ -20540,6 +20518,10 @@
           <a:bodyPr/>
           <a:lstStyle/>
           <a:p>
+            <a:r>
+              <a:rPr lang="de-DE" smtClean="0"/>
+              <a:t>Roomanizer Presentation Team E</a:t>
+            </a:r>
             <a:endParaRPr lang="de-DE"/>
           </a:p>
         </p:txBody>
@@ -20692,9 +20674,9 @@
           <a:bodyPr/>
           <a:lstStyle/>
           <a:p>
-            <a:fld id="{1BA50D42-C9CD-4801-B293-61D1F53EC57E}" type="datetimeFigureOut">
+            <a:fld id="{B87B94FE-C12F-4BA3-B79D-65589E544812}" type="datetime1">
               <a:rPr lang="de-DE" smtClean="0"/>
-              <a:t>11.06.2012</a:t>
+              <a:t>12.06.2012</a:t>
             </a:fld>
             <a:endParaRPr lang="de-DE"/>
           </a:p>
@@ -20715,6 +20697,10 @@
           <a:bodyPr/>
           <a:lstStyle/>
           <a:p>
+            <a:r>
+              <a:rPr lang="de-DE" smtClean="0"/>
+              <a:t>Roomanizer Presentation Team E</a:t>
+            </a:r>
             <a:endParaRPr lang="de-DE"/>
           </a:p>
         </p:txBody>
@@ -20819,6 +20805,10 @@
             </a:lvl1pPr>
           </a:lstStyle>
           <a:p>
+            <a:fld id="{D3CDE9A3-06E5-4344-9A39-8F3723C128C1}" type="datetime1">
+              <a:rPr lang="de-DE" smtClean="0"/>
+              <a:t>12.06.2012</a:t>
+            </a:fld>
             <a:endParaRPr lang="de-DE"/>
           </a:p>
         </p:txBody>
@@ -20847,6 +20837,10 @@
             </a:lvl1pPr>
           </a:lstStyle>
           <a:p>
+            <a:r>
+              <a:rPr lang="de-DE" smtClean="0"/>
+              <a:t>Roomanizer Presentation Team E</a:t>
+            </a:r>
             <a:endParaRPr lang="de-DE"/>
           </a:p>
         </p:txBody>
@@ -20966,10 +20960,11 @@
             <a:pPr>
               <a:defRPr/>
             </a:pPr>
-            <a:r>
-              <a:rPr lang="de-AT"/>
-              <a:t>10.06.2012</a:t>
-            </a:r>
+            <a:fld id="{9B0F25FC-86AA-401B-98F3-08040016A668}" type="datetime1">
+              <a:rPr lang="de-DE" smtClean="0"/>
+              <a:t>12.06.2012</a:t>
+            </a:fld>
+            <a:endParaRPr lang="de-AT"/>
           </a:p>
         </p:txBody>
       </p:sp>
@@ -21128,9 +21123,9 @@
           <a:bodyPr/>
           <a:lstStyle/>
           <a:p>
-            <a:fld id="{1BA50D42-C9CD-4801-B293-61D1F53EC57E}" type="datetimeFigureOut">
+            <a:fld id="{95AFB6B0-E810-4A12-AA92-DA6A89C77C77}" type="datetime1">
               <a:rPr lang="de-DE" smtClean="0"/>
-              <a:t>11.06.2012</a:t>
+              <a:t>12.06.2012</a:t>
             </a:fld>
             <a:endParaRPr lang="de-DE"/>
           </a:p>
@@ -21151,6 +21146,10 @@
           <a:bodyPr/>
           <a:lstStyle/>
           <a:p>
+            <a:r>
+              <a:rPr lang="de-DE" smtClean="0"/>
+              <a:t>Roomanizer Presentation Team E</a:t>
+            </a:r>
             <a:endParaRPr lang="de-DE"/>
           </a:p>
         </p:txBody>
@@ -21369,9 +21368,9 @@
           <a:bodyPr/>
           <a:lstStyle/>
           <a:p>
-            <a:fld id="{1BA50D42-C9CD-4801-B293-61D1F53EC57E}" type="datetimeFigureOut">
+            <a:fld id="{655E73A6-CF0F-44CE-BE9F-7C1399A79223}" type="datetime1">
               <a:rPr lang="de-DE" smtClean="0"/>
-              <a:t>11.06.2012</a:t>
+              <a:t>12.06.2012</a:t>
             </a:fld>
             <a:endParaRPr lang="de-DE"/>
           </a:p>
@@ -21392,6 +21391,10 @@
           <a:bodyPr/>
           <a:lstStyle/>
           <a:p>
+            <a:r>
+              <a:rPr lang="de-DE" smtClean="0"/>
+              <a:t>Roomanizer Presentation Team E</a:t>
+            </a:r>
             <a:endParaRPr lang="de-DE"/>
           </a:p>
         </p:txBody>
@@ -21652,9 +21655,9 @@
           <a:bodyPr/>
           <a:lstStyle/>
           <a:p>
-            <a:fld id="{1BA50D42-C9CD-4801-B293-61D1F53EC57E}" type="datetimeFigureOut">
+            <a:fld id="{3A875C4F-DAB4-40B1-8EB3-93FD8A0B3115}" type="datetime1">
               <a:rPr lang="de-DE" smtClean="0"/>
-              <a:t>11.06.2012</a:t>
+              <a:t>12.06.2012</a:t>
             </a:fld>
             <a:endParaRPr lang="de-DE"/>
           </a:p>
@@ -21675,6 +21678,10 @@
           <a:bodyPr/>
           <a:lstStyle/>
           <a:p>
+            <a:r>
+              <a:rPr lang="de-DE" smtClean="0"/>
+              <a:t>Roomanizer Presentation Team E</a:t>
+            </a:r>
             <a:endParaRPr lang="de-DE"/>
           </a:p>
         </p:txBody>
@@ -22069,9 +22076,9 @@
           <a:bodyPr/>
           <a:lstStyle/>
           <a:p>
-            <a:fld id="{1BA50D42-C9CD-4801-B293-61D1F53EC57E}" type="datetimeFigureOut">
+            <a:fld id="{F2EB9589-474F-4EC1-A5AB-3D3EB4D7B952}" type="datetime1">
               <a:rPr lang="de-DE" smtClean="0"/>
-              <a:t>11.06.2012</a:t>
+              <a:t>12.06.2012</a:t>
             </a:fld>
             <a:endParaRPr lang="de-DE"/>
           </a:p>
@@ -22092,6 +22099,10 @@
           <a:bodyPr/>
           <a:lstStyle/>
           <a:p>
+            <a:r>
+              <a:rPr lang="de-DE" smtClean="0"/>
+              <a:t>Roomanizer Presentation Team E</a:t>
+            </a:r>
             <a:endParaRPr lang="de-DE"/>
           </a:p>
         </p:txBody>
@@ -22182,9 +22193,9 @@
           <a:bodyPr/>
           <a:lstStyle/>
           <a:p>
-            <a:fld id="{1BA50D42-C9CD-4801-B293-61D1F53EC57E}" type="datetimeFigureOut">
+            <a:fld id="{5CD7508B-5B98-4877-A71E-A8CDA8F513D3}" type="datetime1">
               <a:rPr lang="de-DE" smtClean="0"/>
-              <a:t>11.06.2012</a:t>
+              <a:t>12.06.2012</a:t>
             </a:fld>
             <a:endParaRPr lang="de-DE"/>
           </a:p>
@@ -22205,6 +22216,10 @@
           <a:bodyPr/>
           <a:lstStyle/>
           <a:p>
+            <a:r>
+              <a:rPr lang="de-DE" smtClean="0"/>
+              <a:t>Roomanizer Presentation Team E</a:t>
+            </a:r>
             <a:endParaRPr lang="de-DE"/>
           </a:p>
         </p:txBody>
@@ -22272,9 +22287,9 @@
           <a:bodyPr/>
           <a:lstStyle/>
           <a:p>
-            <a:fld id="{1BA50D42-C9CD-4801-B293-61D1F53EC57E}" type="datetimeFigureOut">
+            <a:fld id="{70CB7FED-E8E8-4243-BD9D-754C1A2B1362}" type="datetime1">
               <a:rPr lang="de-DE" smtClean="0"/>
-              <a:t>11.06.2012</a:t>
+              <a:t>12.06.2012</a:t>
             </a:fld>
             <a:endParaRPr lang="de-DE"/>
           </a:p>
@@ -22295,6 +22310,10 @@
           <a:bodyPr/>
           <a:lstStyle/>
           <a:p>
+            <a:r>
+              <a:rPr lang="de-DE" smtClean="0"/>
+              <a:t>Roomanizer Presentation Team E</a:t>
+            </a:r>
             <a:endParaRPr lang="de-DE"/>
           </a:p>
         </p:txBody>
@@ -22544,9 +22563,9 @@
           <a:bodyPr/>
           <a:lstStyle/>
           <a:p>
-            <a:fld id="{1BA50D42-C9CD-4801-B293-61D1F53EC57E}" type="datetimeFigureOut">
+            <a:fld id="{020FBE84-397B-4223-A33A-2C159E59AFC2}" type="datetime1">
               <a:rPr lang="de-DE" smtClean="0"/>
-              <a:t>11.06.2012</a:t>
+              <a:t>12.06.2012</a:t>
             </a:fld>
             <a:endParaRPr lang="de-DE"/>
           </a:p>
@@ -22567,6 +22586,10 @@
           <a:bodyPr/>
           <a:lstStyle/>
           <a:p>
+            <a:r>
+              <a:rPr lang="de-DE" smtClean="0"/>
+              <a:t>Roomanizer Presentation Team E</a:t>
+            </a:r>
             <a:endParaRPr lang="de-DE"/>
           </a:p>
         </p:txBody>
@@ -22792,9 +22815,9 @@
           <a:bodyPr/>
           <a:lstStyle/>
           <a:p>
-            <a:fld id="{1BA50D42-C9CD-4801-B293-61D1F53EC57E}" type="datetimeFigureOut">
+            <a:fld id="{C75C895D-AF82-45A0-B09C-481D1E132560}" type="datetime1">
               <a:rPr lang="de-DE" smtClean="0"/>
-              <a:t>11.06.2012</a:t>
+              <a:t>12.06.2012</a:t>
             </a:fld>
             <a:endParaRPr lang="de-DE"/>
           </a:p>
@@ -22815,6 +22838,10 @@
           <a:bodyPr/>
           <a:lstStyle/>
           <a:p>
+            <a:r>
+              <a:rPr lang="de-DE" smtClean="0"/>
+              <a:t>Roomanizer Presentation Team E</a:t>
+            </a:r>
             <a:endParaRPr lang="de-DE"/>
           </a:p>
         </p:txBody>
@@ -23000,9 +23027,9 @@
             </a:lvl1pPr>
           </a:lstStyle>
           <a:p>
-            <a:fld id="{1BA50D42-C9CD-4801-B293-61D1F53EC57E}" type="datetimeFigureOut">
+            <a:fld id="{79F30C26-BCEE-4B2F-9971-B7D3B590B5F4}" type="datetime1">
               <a:rPr lang="de-DE" smtClean="0"/>
-              <a:t>11.06.2012</a:t>
+              <a:t>12.06.2012</a:t>
             </a:fld>
             <a:endParaRPr lang="de-DE"/>
           </a:p>
@@ -23041,6 +23068,10 @@
             </a:lvl1pPr>
           </a:lstStyle>
           <a:p>
+            <a:r>
+              <a:rPr lang="de-DE" smtClean="0"/>
+              <a:t>Roomanizer Presentation Team E</a:t>
+            </a:r>
             <a:endParaRPr lang="de-DE"/>
           </a:p>
         </p:txBody>
@@ -23104,6 +23135,7 @@
     <p:sldLayoutId id="2147483660" r:id="rId12"/>
     <p:sldLayoutId id="2147483661" r:id="rId13"/>
   </p:sldLayoutIdLst>
+  <p:hf hdr="0"/>
   <p:txStyles>
     <p:titleStyle>
       <a:lvl1pPr algn="ctr" defTabSz="914400" rtl="0" eaLnBrk="1" latinLnBrk="0" hangingPunct="1">
@@ -23513,11 +23545,57 @@
             <a:pPr>
               <a:defRPr/>
             </a:pPr>
-            <a:r>
-              <a:rPr lang="de-AT" smtClean="0"/>
-              <a:t>10.06.2012</a:t>
-            </a:r>
+            <a:fld id="{C5AC66B5-B60D-4CF5-92AB-CE600715BCB4}" type="datetime1">
+              <a:rPr lang="de-DE" smtClean="0"/>
+              <a:t>12.06.2012</a:t>
+            </a:fld>
             <a:endParaRPr lang="de-AT"/>
+          </a:p>
+        </p:txBody>
+      </p:sp>
+      <p:sp>
+        <p:nvSpPr>
+          <p:cNvPr id="2" name="Fußzeilenplatzhalter 1"/>
+          <p:cNvSpPr>
+            <a:spLocks noGrp="1"/>
+          </p:cNvSpPr>
+          <p:nvPr>
+            <p:ph type="ftr" sz="quarter" idx="11"/>
+          </p:nvPr>
+        </p:nvSpPr>
+        <p:spPr/>
+        <p:txBody>
+          <a:bodyPr/>
+          <a:lstStyle/>
+          <a:p>
+            <a:r>
+              <a:rPr lang="de-DE" smtClean="0"/>
+              <a:t>Roomanizer Presentation Team E</a:t>
+            </a:r>
+            <a:endParaRPr lang="de-DE"/>
+          </a:p>
+        </p:txBody>
+      </p:sp>
+      <p:sp>
+        <p:nvSpPr>
+          <p:cNvPr id="3" name="Foliennummernplatzhalter 2"/>
+          <p:cNvSpPr>
+            <a:spLocks noGrp="1"/>
+          </p:cNvSpPr>
+          <p:nvPr>
+            <p:ph type="sldNum" sz="quarter" idx="12"/>
+          </p:nvPr>
+        </p:nvSpPr>
+        <p:spPr/>
+        <p:txBody>
+          <a:bodyPr/>
+          <a:lstStyle/>
+          <a:p>
+            <a:fld id="{6C6AE60A-B69C-4790-82F7-3882EDF23186}" type="slidenum">
+              <a:rPr lang="de-DE" smtClean="0"/>
+              <a:t>10</a:t>
+            </a:fld>
+            <a:endParaRPr lang="de-DE"/>
           </a:p>
         </p:txBody>
       </p:sp>
@@ -23627,10 +23705,11 @@
             <a:pPr>
               <a:defRPr/>
             </a:pPr>
-            <a:r>
-              <a:rPr lang="de-AT"/>
-              <a:t>10.06.2012</a:t>
-            </a:r>
+            <a:fld id="{FAC3D005-EA50-4DFB-98B3-F60A2CBC2319}" type="datetime1">
+              <a:rPr lang="de-DE" smtClean="0"/>
+              <a:t>12.06.2012</a:t>
+            </a:fld>
+            <a:endParaRPr lang="de-AT"/>
           </a:p>
         </p:txBody>
       </p:sp>
@@ -23980,6 +24059,52 @@
           </a:p>
         </p:txBody>
       </p:sp>
+      <p:sp>
+        <p:nvSpPr>
+          <p:cNvPr id="2" name="Fußzeilenplatzhalter 1"/>
+          <p:cNvSpPr>
+            <a:spLocks noGrp="1"/>
+          </p:cNvSpPr>
+          <p:nvPr>
+            <p:ph type="ftr" sz="quarter" idx="11"/>
+          </p:nvPr>
+        </p:nvSpPr>
+        <p:spPr/>
+        <p:txBody>
+          <a:bodyPr/>
+          <a:lstStyle/>
+          <a:p>
+            <a:r>
+              <a:rPr lang="de-DE" smtClean="0"/>
+              <a:t>Roomanizer Presentation Team E</a:t>
+            </a:r>
+            <a:endParaRPr lang="de-DE"/>
+          </a:p>
+        </p:txBody>
+      </p:sp>
+      <p:sp>
+        <p:nvSpPr>
+          <p:cNvPr id="5" name="Foliennummernplatzhalter 4"/>
+          <p:cNvSpPr>
+            <a:spLocks noGrp="1"/>
+          </p:cNvSpPr>
+          <p:nvPr>
+            <p:ph type="sldNum" sz="quarter" idx="12"/>
+          </p:nvPr>
+        </p:nvSpPr>
+        <p:spPr/>
+        <p:txBody>
+          <a:bodyPr/>
+          <a:lstStyle/>
+          <a:p>
+            <a:fld id="{6C6AE60A-B69C-4790-82F7-3882EDF23186}" type="slidenum">
+              <a:rPr lang="de-DE" smtClean="0"/>
+              <a:t>11</a:t>
+            </a:fld>
+            <a:endParaRPr lang="de-DE"/>
+          </a:p>
+        </p:txBody>
+      </p:sp>
     </p:spTree>
     <p:extLst>
       <p:ext uri="{BB962C8B-B14F-4D97-AF65-F5344CB8AC3E}">
@@ -24110,6 +24235,75 @@
           <a:lstStyle/>
           <a:p>
             <a:endParaRPr lang="de-AT"/>
+          </a:p>
+        </p:txBody>
+      </p:sp>
+      <p:sp>
+        <p:nvSpPr>
+          <p:cNvPr id="2" name="Datumsplatzhalter 1"/>
+          <p:cNvSpPr>
+            <a:spLocks noGrp="1"/>
+          </p:cNvSpPr>
+          <p:nvPr>
+            <p:ph type="dt" sz="half" idx="10"/>
+          </p:nvPr>
+        </p:nvSpPr>
+        <p:spPr/>
+        <p:txBody>
+          <a:bodyPr/>
+          <a:lstStyle/>
+          <a:p>
+            <a:fld id="{ADC568EE-A27A-4870-ABE6-82CED8DD3893}" type="datetime1">
+              <a:rPr lang="de-DE" smtClean="0"/>
+              <a:t>12.06.2012</a:t>
+            </a:fld>
+            <a:endParaRPr lang="de-DE"/>
+          </a:p>
+        </p:txBody>
+      </p:sp>
+      <p:sp>
+        <p:nvSpPr>
+          <p:cNvPr id="3" name="Fußzeilenplatzhalter 2"/>
+          <p:cNvSpPr>
+            <a:spLocks noGrp="1"/>
+          </p:cNvSpPr>
+          <p:nvPr>
+            <p:ph type="ftr" sz="quarter" idx="11"/>
+          </p:nvPr>
+        </p:nvSpPr>
+        <p:spPr/>
+        <p:txBody>
+          <a:bodyPr/>
+          <a:lstStyle/>
+          <a:p>
+            <a:r>
+              <a:rPr lang="de-DE" smtClean="0"/>
+              <a:t>Roomanizer Presentation Team E</a:t>
+            </a:r>
+            <a:endParaRPr lang="de-DE"/>
+          </a:p>
+        </p:txBody>
+      </p:sp>
+      <p:sp>
+        <p:nvSpPr>
+          <p:cNvPr id="4" name="Foliennummernplatzhalter 3"/>
+          <p:cNvSpPr>
+            <a:spLocks noGrp="1"/>
+          </p:cNvSpPr>
+          <p:nvPr>
+            <p:ph type="sldNum" sz="quarter" idx="12"/>
+          </p:nvPr>
+        </p:nvSpPr>
+        <p:spPr/>
+        <p:txBody>
+          <a:bodyPr/>
+          <a:lstStyle/>
+          <a:p>
+            <a:fld id="{6C6AE60A-B69C-4790-82F7-3882EDF23186}" type="slidenum">
+              <a:rPr lang="de-DE" smtClean="0"/>
+              <a:t>12</a:t>
+            </a:fld>
+            <a:endParaRPr lang="de-DE"/>
           </a:p>
         </p:txBody>
       </p:sp>
@@ -24224,6 +24418,75 @@
           </a:p>
         </p:txBody>
       </p:sp>
+      <p:sp>
+        <p:nvSpPr>
+          <p:cNvPr id="4" name="Datumsplatzhalter 3"/>
+          <p:cNvSpPr>
+            <a:spLocks noGrp="1"/>
+          </p:cNvSpPr>
+          <p:nvPr>
+            <p:ph type="dt" sz="half" idx="10"/>
+          </p:nvPr>
+        </p:nvSpPr>
+        <p:spPr/>
+        <p:txBody>
+          <a:bodyPr/>
+          <a:lstStyle/>
+          <a:p>
+            <a:fld id="{A90FF4AD-C5DD-4C78-94A5-28A73066ED6D}" type="datetime1">
+              <a:rPr lang="de-DE" smtClean="0"/>
+              <a:t>12.06.2012</a:t>
+            </a:fld>
+            <a:endParaRPr lang="de-DE"/>
+          </a:p>
+        </p:txBody>
+      </p:sp>
+      <p:sp>
+        <p:nvSpPr>
+          <p:cNvPr id="5" name="Fußzeilenplatzhalter 4"/>
+          <p:cNvSpPr>
+            <a:spLocks noGrp="1"/>
+          </p:cNvSpPr>
+          <p:nvPr>
+            <p:ph type="ftr" sz="quarter" idx="11"/>
+          </p:nvPr>
+        </p:nvSpPr>
+        <p:spPr/>
+        <p:txBody>
+          <a:bodyPr/>
+          <a:lstStyle/>
+          <a:p>
+            <a:r>
+              <a:rPr lang="de-DE" smtClean="0"/>
+              <a:t>Roomanizer Presentation Team E</a:t>
+            </a:r>
+            <a:endParaRPr lang="de-DE"/>
+          </a:p>
+        </p:txBody>
+      </p:sp>
+      <p:sp>
+        <p:nvSpPr>
+          <p:cNvPr id="6" name="Foliennummernplatzhalter 5"/>
+          <p:cNvSpPr>
+            <a:spLocks noGrp="1"/>
+          </p:cNvSpPr>
+          <p:nvPr>
+            <p:ph type="sldNum" sz="quarter" idx="12"/>
+          </p:nvPr>
+        </p:nvSpPr>
+        <p:spPr/>
+        <p:txBody>
+          <a:bodyPr/>
+          <a:lstStyle/>
+          <a:p>
+            <a:fld id="{6C6AE60A-B69C-4790-82F7-3882EDF23186}" type="slidenum">
+              <a:rPr lang="de-DE" smtClean="0"/>
+              <a:t>13</a:t>
+            </a:fld>
+            <a:endParaRPr lang="de-DE"/>
+          </a:p>
+        </p:txBody>
+      </p:sp>
     </p:spTree>
     <p:extLst>
       <p:ext uri="{BB962C8B-B14F-4D97-AF65-F5344CB8AC3E}">
@@ -24457,6 +24720,75 @@
               <a:rPr lang="de-AT" sz="3200" dirty="0"/>
               <a:t> &amp;Ajax (web-reservation)</a:t>
             </a:r>
+          </a:p>
+        </p:txBody>
+      </p:sp>
+      <p:sp>
+        <p:nvSpPr>
+          <p:cNvPr id="2" name="Datumsplatzhalter 1"/>
+          <p:cNvSpPr>
+            <a:spLocks noGrp="1"/>
+          </p:cNvSpPr>
+          <p:nvPr>
+            <p:ph type="dt" sz="half" idx="10"/>
+          </p:nvPr>
+        </p:nvSpPr>
+        <p:spPr/>
+        <p:txBody>
+          <a:bodyPr/>
+          <a:lstStyle/>
+          <a:p>
+            <a:fld id="{2D8FD03C-C73A-440E-AF02-6123FFDAD148}" type="datetime1">
+              <a:rPr lang="de-DE" smtClean="0"/>
+              <a:t>12.06.2012</a:t>
+            </a:fld>
+            <a:endParaRPr lang="de-DE"/>
+          </a:p>
+        </p:txBody>
+      </p:sp>
+      <p:sp>
+        <p:nvSpPr>
+          <p:cNvPr id="3" name="Fußzeilenplatzhalter 2"/>
+          <p:cNvSpPr>
+            <a:spLocks noGrp="1"/>
+          </p:cNvSpPr>
+          <p:nvPr>
+            <p:ph type="ftr" sz="quarter" idx="11"/>
+          </p:nvPr>
+        </p:nvSpPr>
+        <p:spPr/>
+        <p:txBody>
+          <a:bodyPr/>
+          <a:lstStyle/>
+          <a:p>
+            <a:r>
+              <a:rPr lang="de-DE" smtClean="0"/>
+              <a:t>Roomanizer Presentation Team E</a:t>
+            </a:r>
+            <a:endParaRPr lang="de-DE"/>
+          </a:p>
+        </p:txBody>
+      </p:sp>
+      <p:sp>
+        <p:nvSpPr>
+          <p:cNvPr id="4" name="Foliennummernplatzhalter 3"/>
+          <p:cNvSpPr>
+            <a:spLocks noGrp="1"/>
+          </p:cNvSpPr>
+          <p:nvPr>
+            <p:ph type="sldNum" sz="quarter" idx="12"/>
+          </p:nvPr>
+        </p:nvSpPr>
+        <p:spPr/>
+        <p:txBody>
+          <a:bodyPr/>
+          <a:lstStyle/>
+          <a:p>
+            <a:fld id="{6C6AE60A-B69C-4790-82F7-3882EDF23186}" type="slidenum">
+              <a:rPr lang="de-DE" smtClean="0"/>
+              <a:t>14</a:t>
+            </a:fld>
+            <a:endParaRPr lang="de-DE"/>
           </a:p>
         </p:txBody>
       </p:sp>
@@ -25114,6 +25446,75 @@
           </a:extLst>
         </p:spPr>
       </p:pic>
+      <p:sp>
+        <p:nvSpPr>
+          <p:cNvPr id="2" name="Datumsplatzhalter 1"/>
+          <p:cNvSpPr>
+            <a:spLocks noGrp="1"/>
+          </p:cNvSpPr>
+          <p:nvPr>
+            <p:ph type="dt" sz="half" idx="10"/>
+          </p:nvPr>
+        </p:nvSpPr>
+        <p:spPr/>
+        <p:txBody>
+          <a:bodyPr/>
+          <a:lstStyle/>
+          <a:p>
+            <a:fld id="{533DEEBD-8567-4C86-A715-2F986F358394}" type="datetime1">
+              <a:rPr lang="de-DE" smtClean="0"/>
+              <a:t>12.06.2012</a:t>
+            </a:fld>
+            <a:endParaRPr lang="de-DE"/>
+          </a:p>
+        </p:txBody>
+      </p:sp>
+      <p:sp>
+        <p:nvSpPr>
+          <p:cNvPr id="3" name="Fußzeilenplatzhalter 2"/>
+          <p:cNvSpPr>
+            <a:spLocks noGrp="1"/>
+          </p:cNvSpPr>
+          <p:nvPr>
+            <p:ph type="ftr" sz="quarter" idx="11"/>
+          </p:nvPr>
+        </p:nvSpPr>
+        <p:spPr/>
+        <p:txBody>
+          <a:bodyPr/>
+          <a:lstStyle/>
+          <a:p>
+            <a:r>
+              <a:rPr lang="de-DE" smtClean="0"/>
+              <a:t>Roomanizer Presentation Team E</a:t>
+            </a:r>
+            <a:endParaRPr lang="de-DE"/>
+          </a:p>
+        </p:txBody>
+      </p:sp>
+      <p:sp>
+        <p:nvSpPr>
+          <p:cNvPr id="4" name="Foliennummernplatzhalter 3"/>
+          <p:cNvSpPr>
+            <a:spLocks noGrp="1"/>
+          </p:cNvSpPr>
+          <p:nvPr>
+            <p:ph type="sldNum" sz="quarter" idx="12"/>
+          </p:nvPr>
+        </p:nvSpPr>
+        <p:spPr/>
+        <p:txBody>
+          <a:bodyPr/>
+          <a:lstStyle/>
+          <a:p>
+            <a:fld id="{6C6AE60A-B69C-4790-82F7-3882EDF23186}" type="slidenum">
+              <a:rPr lang="de-DE" smtClean="0"/>
+              <a:t>15</a:t>
+            </a:fld>
+            <a:endParaRPr lang="de-DE"/>
+          </a:p>
+        </p:txBody>
+      </p:sp>
     </p:spTree>
     <p:extLst>
       <p:ext uri="{BB962C8B-B14F-4D97-AF65-F5344CB8AC3E}">
@@ -25246,10 +25647,10 @@
             <a:pPr>
               <a:defRPr/>
             </a:pPr>
-            <a:r>
-              <a:rPr lang="de-AT" smtClean="0"/>
-              <a:t>10.06.2012</a:t>
-            </a:r>
+            <a:fld id="{9CFD2361-5C6C-4E8D-A081-D92F5B71B1B9}" type="datetime1">
+              <a:rPr lang="de-DE" smtClean="0"/>
+              <a:t>12.06.2012</a:t>
+            </a:fld>
             <a:endParaRPr lang="de-AT"/>
           </a:p>
         </p:txBody>
@@ -25296,6 +25697,52 @@
               <a:t>Process</a:t>
             </a:r>
             <a:endParaRPr lang="de-DE" sz="4400" dirty="0" smtClean="0"/>
+          </a:p>
+        </p:txBody>
+      </p:sp>
+      <p:sp>
+        <p:nvSpPr>
+          <p:cNvPr id="2" name="Fußzeilenplatzhalter 1"/>
+          <p:cNvSpPr>
+            <a:spLocks noGrp="1"/>
+          </p:cNvSpPr>
+          <p:nvPr>
+            <p:ph type="ftr" sz="quarter" idx="11"/>
+          </p:nvPr>
+        </p:nvSpPr>
+        <p:spPr/>
+        <p:txBody>
+          <a:bodyPr/>
+          <a:lstStyle/>
+          <a:p>
+            <a:r>
+              <a:rPr lang="de-DE" smtClean="0"/>
+              <a:t>Roomanizer Presentation Team E</a:t>
+            </a:r>
+            <a:endParaRPr lang="de-DE"/>
+          </a:p>
+        </p:txBody>
+      </p:sp>
+      <p:sp>
+        <p:nvSpPr>
+          <p:cNvPr id="3" name="Foliennummernplatzhalter 2"/>
+          <p:cNvSpPr>
+            <a:spLocks noGrp="1"/>
+          </p:cNvSpPr>
+          <p:nvPr>
+            <p:ph type="sldNum" sz="quarter" idx="12"/>
+          </p:nvPr>
+        </p:nvSpPr>
+        <p:spPr/>
+        <p:txBody>
+          <a:bodyPr/>
+          <a:lstStyle/>
+          <a:p>
+            <a:fld id="{6C6AE60A-B69C-4790-82F7-3882EDF23186}" type="slidenum">
+              <a:rPr lang="de-DE" smtClean="0"/>
+              <a:t>16</a:t>
+            </a:fld>
+            <a:endParaRPr lang="de-DE"/>
           </a:p>
         </p:txBody>
       </p:sp>
@@ -25539,6 +25986,76 @@
               <a:rPr lang="de-DE"/>
               <a:t> Single layers can easily be exchanged/extended</a:t>
             </a:r>
+          </a:p>
+        </p:txBody>
+      </p:sp>
+      <p:sp>
+        <p:nvSpPr>
+          <p:cNvPr id="2" name="Datumsplatzhalter 1"/>
+          <p:cNvSpPr>
+            <a:spLocks noGrp="1"/>
+          </p:cNvSpPr>
+          <p:nvPr>
+            <p:ph type="dt" idx="10"/>
+          </p:nvPr>
+        </p:nvSpPr>
+        <p:spPr/>
+        <p:txBody>
+          <a:bodyPr/>
+          <a:lstStyle/>
+          <a:p>
+            <a:fld id="{2F3520D8-4B67-423E-9FFB-1542047B7366}" type="datetime1">
+              <a:rPr lang="de-DE" smtClean="0"/>
+              <a:t>12.06.2012</a:t>
+            </a:fld>
+            <a:endParaRPr lang="de-DE"/>
+          </a:p>
+        </p:txBody>
+      </p:sp>
+      <p:sp>
+        <p:nvSpPr>
+          <p:cNvPr id="3" name="Fußzeilenplatzhalter 2"/>
+          <p:cNvSpPr>
+            <a:spLocks noGrp="1"/>
+          </p:cNvSpPr>
+          <p:nvPr>
+            <p:ph type="ftr" idx="11"/>
+          </p:nvPr>
+        </p:nvSpPr>
+        <p:spPr/>
+        <p:txBody>
+          <a:bodyPr/>
+          <a:lstStyle/>
+          <a:p>
+            <a:r>
+              <a:rPr lang="de-DE" smtClean="0"/>
+              <a:t>Roomanizer Presentation Team E</a:t>
+            </a:r>
+            <a:endParaRPr lang="de-DE"/>
+          </a:p>
+        </p:txBody>
+      </p:sp>
+      <p:sp>
+        <p:nvSpPr>
+          <p:cNvPr id="4" name="Foliennummernplatzhalter 3"/>
+          <p:cNvSpPr>
+            <a:spLocks noGrp="1"/>
+          </p:cNvSpPr>
+          <p:nvPr>
+            <p:ph type="sldNum" idx="12"/>
+          </p:nvPr>
+        </p:nvSpPr>
+        <p:spPr/>
+        <p:txBody>
+          <a:bodyPr/>
+          <a:lstStyle/>
+          <a:p>
+            <a:fld id="{AAEB435E-0D0C-43CA-8E2E-CBED54098038}" type="slidenum">
+              <a:rPr lang="de-DE" smtClean="0"/>
+              <a:pPr/>
+              <a:t>17</a:t>
+            </a:fld>
+            <a:endParaRPr lang="de-DE"/>
           </a:p>
         </p:txBody>
       </p:sp>
@@ -25711,6 +26228,75 @@
           </a:extLst>
         </p:spPr>
       </p:pic>
+      <p:sp>
+        <p:nvSpPr>
+          <p:cNvPr id="2" name="Datumsplatzhalter 1"/>
+          <p:cNvSpPr>
+            <a:spLocks noGrp="1"/>
+          </p:cNvSpPr>
+          <p:nvPr>
+            <p:ph type="dt" sz="half" idx="10"/>
+          </p:nvPr>
+        </p:nvSpPr>
+        <p:spPr/>
+        <p:txBody>
+          <a:bodyPr/>
+          <a:lstStyle/>
+          <a:p>
+            <a:fld id="{4603DE6C-2766-453F-9D69-BEFC378EA777}" type="datetime1">
+              <a:rPr lang="de-DE" smtClean="0"/>
+              <a:t>12.06.2012</a:t>
+            </a:fld>
+            <a:endParaRPr lang="de-DE"/>
+          </a:p>
+        </p:txBody>
+      </p:sp>
+      <p:sp>
+        <p:nvSpPr>
+          <p:cNvPr id="3" name="Fußzeilenplatzhalter 2"/>
+          <p:cNvSpPr>
+            <a:spLocks noGrp="1"/>
+          </p:cNvSpPr>
+          <p:nvPr>
+            <p:ph type="ftr" sz="quarter" idx="11"/>
+          </p:nvPr>
+        </p:nvSpPr>
+        <p:spPr/>
+        <p:txBody>
+          <a:bodyPr/>
+          <a:lstStyle/>
+          <a:p>
+            <a:r>
+              <a:rPr lang="de-DE" smtClean="0"/>
+              <a:t>Roomanizer Presentation Team E</a:t>
+            </a:r>
+            <a:endParaRPr lang="de-DE"/>
+          </a:p>
+        </p:txBody>
+      </p:sp>
+      <p:sp>
+        <p:nvSpPr>
+          <p:cNvPr id="4" name="Foliennummernplatzhalter 3"/>
+          <p:cNvSpPr>
+            <a:spLocks noGrp="1"/>
+          </p:cNvSpPr>
+          <p:nvPr>
+            <p:ph type="sldNum" sz="quarter" idx="12"/>
+          </p:nvPr>
+        </p:nvSpPr>
+        <p:spPr/>
+        <p:txBody>
+          <a:bodyPr/>
+          <a:lstStyle/>
+          <a:p>
+            <a:fld id="{6C6AE60A-B69C-4790-82F7-3882EDF23186}" type="slidenum">
+              <a:rPr lang="de-DE" smtClean="0"/>
+              <a:t>18</a:t>
+            </a:fld>
+            <a:endParaRPr lang="de-DE"/>
+          </a:p>
+        </p:txBody>
+      </p:sp>
     </p:spTree>
     <p:extLst>
       <p:ext uri="{BB962C8B-B14F-4D97-AF65-F5344CB8AC3E}">
@@ -26128,6 +26714,75 @@
           </a:p>
         </p:txBody>
       </p:sp>
+      <p:sp>
+        <p:nvSpPr>
+          <p:cNvPr id="2" name="Datumsplatzhalter 1"/>
+          <p:cNvSpPr>
+            <a:spLocks noGrp="1"/>
+          </p:cNvSpPr>
+          <p:nvPr>
+            <p:ph type="dt" sz="half" idx="10"/>
+          </p:nvPr>
+        </p:nvSpPr>
+        <p:spPr/>
+        <p:txBody>
+          <a:bodyPr/>
+          <a:lstStyle/>
+          <a:p>
+            <a:fld id="{BC1E64A1-177A-41DB-86F4-D2E5228BC97E}" type="datetime1">
+              <a:rPr lang="de-DE" smtClean="0"/>
+              <a:t>12.06.2012</a:t>
+            </a:fld>
+            <a:endParaRPr lang="de-DE"/>
+          </a:p>
+        </p:txBody>
+      </p:sp>
+      <p:sp>
+        <p:nvSpPr>
+          <p:cNvPr id="3" name="Fußzeilenplatzhalter 2"/>
+          <p:cNvSpPr>
+            <a:spLocks noGrp="1"/>
+          </p:cNvSpPr>
+          <p:nvPr>
+            <p:ph type="ftr" sz="quarter" idx="11"/>
+          </p:nvPr>
+        </p:nvSpPr>
+        <p:spPr/>
+        <p:txBody>
+          <a:bodyPr/>
+          <a:lstStyle/>
+          <a:p>
+            <a:r>
+              <a:rPr lang="de-DE" smtClean="0"/>
+              <a:t>Roomanizer Presentation Team E</a:t>
+            </a:r>
+            <a:endParaRPr lang="de-DE"/>
+          </a:p>
+        </p:txBody>
+      </p:sp>
+      <p:sp>
+        <p:nvSpPr>
+          <p:cNvPr id="4" name="Foliennummernplatzhalter 3"/>
+          <p:cNvSpPr>
+            <a:spLocks noGrp="1"/>
+          </p:cNvSpPr>
+          <p:nvPr>
+            <p:ph type="sldNum" sz="quarter" idx="12"/>
+          </p:nvPr>
+        </p:nvSpPr>
+        <p:spPr/>
+        <p:txBody>
+          <a:bodyPr/>
+          <a:lstStyle/>
+          <a:p>
+            <a:fld id="{6C6AE60A-B69C-4790-82F7-3882EDF23186}" type="slidenum">
+              <a:rPr lang="de-DE" smtClean="0"/>
+              <a:t>19</a:t>
+            </a:fld>
+            <a:endParaRPr lang="de-DE"/>
+          </a:p>
+        </p:txBody>
+      </p:sp>
     </p:spTree>
     <p:extLst>
       <p:ext uri="{BB962C8B-B14F-4D97-AF65-F5344CB8AC3E}">
@@ -26345,11 +27000,6 @@
               </a:rPr>
               <a:t> Summary</a:t>
             </a:r>
-            <a:endParaRPr lang="de-AT" dirty="0" smtClean="0">
-              <a:solidFill>
-                <a:srgbClr val="FFC000"/>
-              </a:solidFill>
-            </a:endParaRPr>
           </a:p>
           <a:p>
             <a:r>
@@ -26501,11 +27151,6 @@
               </a:rPr>
               <a:t>Summary</a:t>
             </a:r>
-            <a:endParaRPr lang="de-AT" dirty="0" smtClean="0">
-              <a:solidFill>
-                <a:srgbClr val="002060"/>
-              </a:solidFill>
-            </a:endParaRPr>
           </a:p>
           <a:p>
             <a:r>
@@ -26528,6 +27173,75 @@
           </a:p>
           <a:p>
             <a:endParaRPr lang="en-GB" dirty="0"/>
+          </a:p>
+        </p:txBody>
+      </p:sp>
+      <p:sp>
+        <p:nvSpPr>
+          <p:cNvPr id="4" name="Datumsplatzhalter 3"/>
+          <p:cNvSpPr>
+            <a:spLocks noGrp="1"/>
+          </p:cNvSpPr>
+          <p:nvPr>
+            <p:ph type="dt" sz="half" idx="10"/>
+          </p:nvPr>
+        </p:nvSpPr>
+        <p:spPr/>
+        <p:txBody>
+          <a:bodyPr/>
+          <a:lstStyle/>
+          <a:p>
+            <a:fld id="{04D7C808-4BFD-4F58-ACB5-51FA1E05AE3D}" type="datetime1">
+              <a:rPr lang="de-DE" smtClean="0"/>
+              <a:t>12.06.2012</a:t>
+            </a:fld>
+            <a:endParaRPr lang="de-DE"/>
+          </a:p>
+        </p:txBody>
+      </p:sp>
+      <p:sp>
+        <p:nvSpPr>
+          <p:cNvPr id="5" name="Fußzeilenplatzhalter 4"/>
+          <p:cNvSpPr>
+            <a:spLocks noGrp="1"/>
+          </p:cNvSpPr>
+          <p:nvPr>
+            <p:ph type="ftr" sz="quarter" idx="11"/>
+          </p:nvPr>
+        </p:nvSpPr>
+        <p:spPr/>
+        <p:txBody>
+          <a:bodyPr/>
+          <a:lstStyle/>
+          <a:p>
+            <a:r>
+              <a:rPr lang="de-DE" smtClean="0"/>
+              <a:t>Roomanizer Presentation Team E</a:t>
+            </a:r>
+            <a:endParaRPr lang="de-DE"/>
+          </a:p>
+        </p:txBody>
+      </p:sp>
+      <p:sp>
+        <p:nvSpPr>
+          <p:cNvPr id="6" name="Foliennummernplatzhalter 5"/>
+          <p:cNvSpPr>
+            <a:spLocks noGrp="1"/>
+          </p:cNvSpPr>
+          <p:nvPr>
+            <p:ph type="sldNum" sz="quarter" idx="12"/>
+          </p:nvPr>
+        </p:nvSpPr>
+        <p:spPr/>
+        <p:txBody>
+          <a:bodyPr/>
+          <a:lstStyle/>
+          <a:p>
+            <a:fld id="{6C6AE60A-B69C-4790-82F7-3882EDF23186}" type="slidenum">
+              <a:rPr lang="de-DE" smtClean="0"/>
+              <a:t>2</a:t>
+            </a:fld>
+            <a:endParaRPr lang="de-DE"/>
           </a:p>
         </p:txBody>
       </p:sp>
@@ -26805,6 +27519,75 @@
           </a:p>
         </p:txBody>
       </p:sp>
+      <p:sp>
+        <p:nvSpPr>
+          <p:cNvPr id="4" name="Datumsplatzhalter 3"/>
+          <p:cNvSpPr>
+            <a:spLocks noGrp="1"/>
+          </p:cNvSpPr>
+          <p:nvPr>
+            <p:ph type="dt" sz="half" idx="10"/>
+          </p:nvPr>
+        </p:nvSpPr>
+        <p:spPr/>
+        <p:txBody>
+          <a:bodyPr/>
+          <a:lstStyle/>
+          <a:p>
+            <a:fld id="{1ED9C51D-1E2C-4A35-A2FD-447C3E0C3A18}" type="datetime1">
+              <a:rPr lang="de-DE" smtClean="0"/>
+              <a:t>12.06.2012</a:t>
+            </a:fld>
+            <a:endParaRPr lang="de-DE"/>
+          </a:p>
+        </p:txBody>
+      </p:sp>
+      <p:sp>
+        <p:nvSpPr>
+          <p:cNvPr id="5" name="Fußzeilenplatzhalter 4"/>
+          <p:cNvSpPr>
+            <a:spLocks noGrp="1"/>
+          </p:cNvSpPr>
+          <p:nvPr>
+            <p:ph type="ftr" sz="quarter" idx="11"/>
+          </p:nvPr>
+        </p:nvSpPr>
+        <p:spPr/>
+        <p:txBody>
+          <a:bodyPr/>
+          <a:lstStyle/>
+          <a:p>
+            <a:r>
+              <a:rPr lang="de-DE" smtClean="0"/>
+              <a:t>Roomanizer Presentation Team E</a:t>
+            </a:r>
+            <a:endParaRPr lang="de-DE"/>
+          </a:p>
+        </p:txBody>
+      </p:sp>
+      <p:sp>
+        <p:nvSpPr>
+          <p:cNvPr id="6" name="Foliennummernplatzhalter 5"/>
+          <p:cNvSpPr>
+            <a:spLocks noGrp="1"/>
+          </p:cNvSpPr>
+          <p:nvPr>
+            <p:ph type="sldNum" sz="quarter" idx="12"/>
+          </p:nvPr>
+        </p:nvSpPr>
+        <p:spPr/>
+        <p:txBody>
+          <a:bodyPr/>
+          <a:lstStyle/>
+          <a:p>
+            <a:fld id="{6C6AE60A-B69C-4790-82F7-3882EDF23186}" type="slidenum">
+              <a:rPr lang="de-DE" smtClean="0"/>
+              <a:t>20</a:t>
+            </a:fld>
+            <a:endParaRPr lang="de-DE"/>
+          </a:p>
+        </p:txBody>
+      </p:sp>
     </p:spTree>
     <p:extLst>
       <p:ext uri="{BB962C8B-B14F-4D97-AF65-F5344CB8AC3E}">
@@ -27050,6 +27833,75 @@
           </a:p>
         </p:txBody>
       </p:sp>
+      <p:sp>
+        <p:nvSpPr>
+          <p:cNvPr id="4" name="Datumsplatzhalter 3"/>
+          <p:cNvSpPr>
+            <a:spLocks noGrp="1"/>
+          </p:cNvSpPr>
+          <p:nvPr>
+            <p:ph type="dt" sz="half" idx="10"/>
+          </p:nvPr>
+        </p:nvSpPr>
+        <p:spPr/>
+        <p:txBody>
+          <a:bodyPr/>
+          <a:lstStyle/>
+          <a:p>
+            <a:fld id="{3EBC9EAD-DFF5-4FF1-8302-EE5137954968}" type="datetime1">
+              <a:rPr lang="de-DE" smtClean="0"/>
+              <a:t>12.06.2012</a:t>
+            </a:fld>
+            <a:endParaRPr lang="de-DE"/>
+          </a:p>
+        </p:txBody>
+      </p:sp>
+      <p:sp>
+        <p:nvSpPr>
+          <p:cNvPr id="5" name="Fußzeilenplatzhalter 4"/>
+          <p:cNvSpPr>
+            <a:spLocks noGrp="1"/>
+          </p:cNvSpPr>
+          <p:nvPr>
+            <p:ph type="ftr" sz="quarter" idx="11"/>
+          </p:nvPr>
+        </p:nvSpPr>
+        <p:spPr/>
+        <p:txBody>
+          <a:bodyPr/>
+          <a:lstStyle/>
+          <a:p>
+            <a:r>
+              <a:rPr lang="de-DE" smtClean="0"/>
+              <a:t>Roomanizer Presentation Team E</a:t>
+            </a:r>
+            <a:endParaRPr lang="de-DE"/>
+          </a:p>
+        </p:txBody>
+      </p:sp>
+      <p:sp>
+        <p:nvSpPr>
+          <p:cNvPr id="6" name="Foliennummernplatzhalter 5"/>
+          <p:cNvSpPr>
+            <a:spLocks noGrp="1"/>
+          </p:cNvSpPr>
+          <p:nvPr>
+            <p:ph type="sldNum" sz="quarter" idx="12"/>
+          </p:nvPr>
+        </p:nvSpPr>
+        <p:spPr/>
+        <p:txBody>
+          <a:bodyPr/>
+          <a:lstStyle/>
+          <a:p>
+            <a:fld id="{6C6AE60A-B69C-4790-82F7-3882EDF23186}" type="slidenum">
+              <a:rPr lang="de-DE" smtClean="0"/>
+              <a:t>21</a:t>
+            </a:fld>
+            <a:endParaRPr lang="de-DE"/>
+          </a:p>
+        </p:txBody>
+      </p:sp>
     </p:spTree>
     <p:extLst>
       <p:ext uri="{BB962C8B-B14F-4D97-AF65-F5344CB8AC3E}">
@@ -27296,6 +28148,75 @@
           </a:p>
         </p:txBody>
       </p:sp>
+      <p:sp>
+        <p:nvSpPr>
+          <p:cNvPr id="4" name="Datumsplatzhalter 3"/>
+          <p:cNvSpPr>
+            <a:spLocks noGrp="1"/>
+          </p:cNvSpPr>
+          <p:nvPr>
+            <p:ph type="dt" sz="half" idx="10"/>
+          </p:nvPr>
+        </p:nvSpPr>
+        <p:spPr/>
+        <p:txBody>
+          <a:bodyPr/>
+          <a:lstStyle/>
+          <a:p>
+            <a:fld id="{1C5D519C-9C68-4ECE-BCCF-07FC49A7D4F4}" type="datetime1">
+              <a:rPr lang="de-DE" smtClean="0"/>
+              <a:t>12.06.2012</a:t>
+            </a:fld>
+            <a:endParaRPr lang="de-DE"/>
+          </a:p>
+        </p:txBody>
+      </p:sp>
+      <p:sp>
+        <p:nvSpPr>
+          <p:cNvPr id="5" name="Fußzeilenplatzhalter 4"/>
+          <p:cNvSpPr>
+            <a:spLocks noGrp="1"/>
+          </p:cNvSpPr>
+          <p:nvPr>
+            <p:ph type="ftr" sz="quarter" idx="11"/>
+          </p:nvPr>
+        </p:nvSpPr>
+        <p:spPr/>
+        <p:txBody>
+          <a:bodyPr/>
+          <a:lstStyle/>
+          <a:p>
+            <a:r>
+              <a:rPr lang="de-DE" smtClean="0"/>
+              <a:t>Roomanizer Presentation Team E</a:t>
+            </a:r>
+            <a:endParaRPr lang="de-DE"/>
+          </a:p>
+        </p:txBody>
+      </p:sp>
+      <p:sp>
+        <p:nvSpPr>
+          <p:cNvPr id="6" name="Foliennummernplatzhalter 5"/>
+          <p:cNvSpPr>
+            <a:spLocks noGrp="1"/>
+          </p:cNvSpPr>
+          <p:nvPr>
+            <p:ph type="sldNum" sz="quarter" idx="12"/>
+          </p:nvPr>
+        </p:nvSpPr>
+        <p:spPr/>
+        <p:txBody>
+          <a:bodyPr/>
+          <a:lstStyle/>
+          <a:p>
+            <a:fld id="{6C6AE60A-B69C-4790-82F7-3882EDF23186}" type="slidenum">
+              <a:rPr lang="de-DE" smtClean="0"/>
+              <a:t>22</a:t>
+            </a:fld>
+            <a:endParaRPr lang="de-DE"/>
+          </a:p>
+        </p:txBody>
+      </p:sp>
     </p:spTree>
     <p:extLst>
       <p:ext uri="{BB962C8B-B14F-4D97-AF65-F5344CB8AC3E}">
@@ -27462,6 +28383,75 @@
           </a:p>
         </p:txBody>
       </p:sp>
+      <p:sp>
+        <p:nvSpPr>
+          <p:cNvPr id="4" name="Datumsplatzhalter 3"/>
+          <p:cNvSpPr>
+            <a:spLocks noGrp="1"/>
+          </p:cNvSpPr>
+          <p:nvPr>
+            <p:ph type="dt" sz="half" idx="10"/>
+          </p:nvPr>
+        </p:nvSpPr>
+        <p:spPr/>
+        <p:txBody>
+          <a:bodyPr/>
+          <a:lstStyle/>
+          <a:p>
+            <a:fld id="{E6C03166-3DDA-4ED7-B373-C80115541DAF}" type="datetime1">
+              <a:rPr lang="de-DE" smtClean="0"/>
+              <a:t>12.06.2012</a:t>
+            </a:fld>
+            <a:endParaRPr lang="de-DE"/>
+          </a:p>
+        </p:txBody>
+      </p:sp>
+      <p:sp>
+        <p:nvSpPr>
+          <p:cNvPr id="5" name="Fußzeilenplatzhalter 4"/>
+          <p:cNvSpPr>
+            <a:spLocks noGrp="1"/>
+          </p:cNvSpPr>
+          <p:nvPr>
+            <p:ph type="ftr" sz="quarter" idx="11"/>
+          </p:nvPr>
+        </p:nvSpPr>
+        <p:spPr/>
+        <p:txBody>
+          <a:bodyPr/>
+          <a:lstStyle/>
+          <a:p>
+            <a:r>
+              <a:rPr lang="de-DE" smtClean="0"/>
+              <a:t>Roomanizer Presentation Team E</a:t>
+            </a:r>
+            <a:endParaRPr lang="de-DE"/>
+          </a:p>
+        </p:txBody>
+      </p:sp>
+      <p:sp>
+        <p:nvSpPr>
+          <p:cNvPr id="6" name="Foliennummernplatzhalter 5"/>
+          <p:cNvSpPr>
+            <a:spLocks noGrp="1"/>
+          </p:cNvSpPr>
+          <p:nvPr>
+            <p:ph type="sldNum" sz="quarter" idx="12"/>
+          </p:nvPr>
+        </p:nvSpPr>
+        <p:spPr/>
+        <p:txBody>
+          <a:bodyPr/>
+          <a:lstStyle/>
+          <a:p>
+            <a:fld id="{6C6AE60A-B69C-4790-82F7-3882EDF23186}" type="slidenum">
+              <a:rPr lang="de-DE" smtClean="0"/>
+              <a:t>23</a:t>
+            </a:fld>
+            <a:endParaRPr lang="de-DE"/>
+          </a:p>
+        </p:txBody>
+      </p:sp>
     </p:spTree>
     <p:extLst>
       <p:ext uri="{BB962C8B-B14F-4D97-AF65-F5344CB8AC3E}">
@@ -27652,6 +28642,75 @@
           </a:prstGeom>
         </p:spPr>
       </p:pic>
+      <p:sp>
+        <p:nvSpPr>
+          <p:cNvPr id="5" name="Datumsplatzhalter 4"/>
+          <p:cNvSpPr>
+            <a:spLocks noGrp="1"/>
+          </p:cNvSpPr>
+          <p:nvPr>
+            <p:ph type="dt" sz="half" idx="10"/>
+          </p:nvPr>
+        </p:nvSpPr>
+        <p:spPr/>
+        <p:txBody>
+          <a:bodyPr/>
+          <a:lstStyle/>
+          <a:p>
+            <a:fld id="{8E41F980-1769-4E24-AFDE-FE4A290B54EE}" type="datetime1">
+              <a:rPr lang="de-DE" smtClean="0"/>
+              <a:t>12.06.2012</a:t>
+            </a:fld>
+            <a:endParaRPr lang="de-DE"/>
+          </a:p>
+        </p:txBody>
+      </p:sp>
+      <p:sp>
+        <p:nvSpPr>
+          <p:cNvPr id="6" name="Fußzeilenplatzhalter 5"/>
+          <p:cNvSpPr>
+            <a:spLocks noGrp="1"/>
+          </p:cNvSpPr>
+          <p:nvPr>
+            <p:ph type="ftr" sz="quarter" idx="11"/>
+          </p:nvPr>
+        </p:nvSpPr>
+        <p:spPr/>
+        <p:txBody>
+          <a:bodyPr/>
+          <a:lstStyle/>
+          <a:p>
+            <a:r>
+              <a:rPr lang="de-DE" smtClean="0"/>
+              <a:t>Roomanizer Presentation Team E</a:t>
+            </a:r>
+            <a:endParaRPr lang="de-DE"/>
+          </a:p>
+        </p:txBody>
+      </p:sp>
+      <p:sp>
+        <p:nvSpPr>
+          <p:cNvPr id="7" name="Foliennummernplatzhalter 6"/>
+          <p:cNvSpPr>
+            <a:spLocks noGrp="1"/>
+          </p:cNvSpPr>
+          <p:nvPr>
+            <p:ph type="sldNum" sz="quarter" idx="12"/>
+          </p:nvPr>
+        </p:nvSpPr>
+        <p:spPr/>
+        <p:txBody>
+          <a:bodyPr/>
+          <a:lstStyle/>
+          <a:p>
+            <a:fld id="{6C6AE60A-B69C-4790-82F7-3882EDF23186}" type="slidenum">
+              <a:rPr lang="de-DE" smtClean="0"/>
+              <a:t>24</a:t>
+            </a:fld>
+            <a:endParaRPr lang="de-DE"/>
+          </a:p>
+        </p:txBody>
+      </p:sp>
     </p:spTree>
     <p:extLst>
       <p:ext uri="{BB962C8B-B14F-4D97-AF65-F5344CB8AC3E}">
@@ -27771,6 +28830,75 @@
               <a:rPr lang="en-GB" dirty="0" smtClean="0"/>
               <a:t>Define which joined tables should be mapped</a:t>
             </a:r>
+          </a:p>
+        </p:txBody>
+      </p:sp>
+      <p:sp>
+        <p:nvSpPr>
+          <p:cNvPr id="4" name="Datumsplatzhalter 3"/>
+          <p:cNvSpPr>
+            <a:spLocks noGrp="1"/>
+          </p:cNvSpPr>
+          <p:nvPr>
+            <p:ph type="dt" sz="half" idx="10"/>
+          </p:nvPr>
+        </p:nvSpPr>
+        <p:spPr/>
+        <p:txBody>
+          <a:bodyPr/>
+          <a:lstStyle/>
+          <a:p>
+            <a:fld id="{E52BEC8C-D36B-4652-82DC-FA63DD2AAC47}" type="datetime1">
+              <a:rPr lang="de-DE" smtClean="0"/>
+              <a:t>12.06.2012</a:t>
+            </a:fld>
+            <a:endParaRPr lang="de-DE"/>
+          </a:p>
+        </p:txBody>
+      </p:sp>
+      <p:sp>
+        <p:nvSpPr>
+          <p:cNvPr id="5" name="Fußzeilenplatzhalter 4"/>
+          <p:cNvSpPr>
+            <a:spLocks noGrp="1"/>
+          </p:cNvSpPr>
+          <p:nvPr>
+            <p:ph type="ftr" sz="quarter" idx="11"/>
+          </p:nvPr>
+        </p:nvSpPr>
+        <p:spPr/>
+        <p:txBody>
+          <a:bodyPr/>
+          <a:lstStyle/>
+          <a:p>
+            <a:r>
+              <a:rPr lang="de-DE" smtClean="0"/>
+              <a:t>Roomanizer Presentation Team E</a:t>
+            </a:r>
+            <a:endParaRPr lang="de-DE"/>
+          </a:p>
+        </p:txBody>
+      </p:sp>
+      <p:sp>
+        <p:nvSpPr>
+          <p:cNvPr id="6" name="Foliennummernplatzhalter 5"/>
+          <p:cNvSpPr>
+            <a:spLocks noGrp="1"/>
+          </p:cNvSpPr>
+          <p:nvPr>
+            <p:ph type="sldNum" sz="quarter" idx="12"/>
+          </p:nvPr>
+        </p:nvSpPr>
+        <p:spPr/>
+        <p:txBody>
+          <a:bodyPr/>
+          <a:lstStyle/>
+          <a:p>
+            <a:fld id="{6C6AE60A-B69C-4790-82F7-3882EDF23186}" type="slidenum">
+              <a:rPr lang="de-DE" smtClean="0"/>
+              <a:t>25</a:t>
+            </a:fld>
+            <a:endParaRPr lang="de-DE"/>
           </a:p>
         </p:txBody>
       </p:sp>
@@ -28012,6 +29140,75 @@
           </a:extLst>
         </p:spPr>
       </p:pic>
+      <p:sp>
+        <p:nvSpPr>
+          <p:cNvPr id="4" name="Datumsplatzhalter 3"/>
+          <p:cNvSpPr>
+            <a:spLocks noGrp="1"/>
+          </p:cNvSpPr>
+          <p:nvPr>
+            <p:ph type="dt" sz="half" idx="10"/>
+          </p:nvPr>
+        </p:nvSpPr>
+        <p:spPr/>
+        <p:txBody>
+          <a:bodyPr/>
+          <a:lstStyle/>
+          <a:p>
+            <a:fld id="{614FFE3B-4363-4771-826E-FE2419BE35EB}" type="datetime1">
+              <a:rPr lang="de-DE" smtClean="0"/>
+              <a:t>12.06.2012</a:t>
+            </a:fld>
+            <a:endParaRPr lang="de-DE"/>
+          </a:p>
+        </p:txBody>
+      </p:sp>
+      <p:sp>
+        <p:nvSpPr>
+          <p:cNvPr id="5" name="Fußzeilenplatzhalter 4"/>
+          <p:cNvSpPr>
+            <a:spLocks noGrp="1"/>
+          </p:cNvSpPr>
+          <p:nvPr>
+            <p:ph type="ftr" sz="quarter" idx="11"/>
+          </p:nvPr>
+        </p:nvSpPr>
+        <p:spPr/>
+        <p:txBody>
+          <a:bodyPr/>
+          <a:lstStyle/>
+          <a:p>
+            <a:r>
+              <a:rPr lang="de-DE" smtClean="0"/>
+              <a:t>Roomanizer Presentation Team E</a:t>
+            </a:r>
+            <a:endParaRPr lang="de-DE"/>
+          </a:p>
+        </p:txBody>
+      </p:sp>
+      <p:sp>
+        <p:nvSpPr>
+          <p:cNvPr id="6" name="Foliennummernplatzhalter 5"/>
+          <p:cNvSpPr>
+            <a:spLocks noGrp="1"/>
+          </p:cNvSpPr>
+          <p:nvPr>
+            <p:ph type="sldNum" sz="quarter" idx="12"/>
+          </p:nvPr>
+        </p:nvSpPr>
+        <p:spPr/>
+        <p:txBody>
+          <a:bodyPr/>
+          <a:lstStyle/>
+          <a:p>
+            <a:fld id="{6C6AE60A-B69C-4790-82F7-3882EDF23186}" type="slidenum">
+              <a:rPr lang="de-DE" smtClean="0"/>
+              <a:t>26</a:t>
+            </a:fld>
+            <a:endParaRPr lang="de-DE"/>
+          </a:p>
+        </p:txBody>
+      </p:sp>
     </p:spTree>
     <p:extLst>
       <p:ext uri="{BB962C8B-B14F-4D97-AF65-F5344CB8AC3E}">
@@ -28185,6 +29382,75 @@
           </a:extLst>
         </p:spPr>
       </p:pic>
+      <p:sp>
+        <p:nvSpPr>
+          <p:cNvPr id="4" name="Datumsplatzhalter 3"/>
+          <p:cNvSpPr>
+            <a:spLocks noGrp="1"/>
+          </p:cNvSpPr>
+          <p:nvPr>
+            <p:ph type="dt" sz="half" idx="10"/>
+          </p:nvPr>
+        </p:nvSpPr>
+        <p:spPr/>
+        <p:txBody>
+          <a:bodyPr/>
+          <a:lstStyle/>
+          <a:p>
+            <a:fld id="{81926CCE-4BDC-41AB-A273-F8ADC452F4E5}" type="datetime1">
+              <a:rPr lang="de-DE" smtClean="0"/>
+              <a:t>12.06.2012</a:t>
+            </a:fld>
+            <a:endParaRPr lang="de-DE"/>
+          </a:p>
+        </p:txBody>
+      </p:sp>
+      <p:sp>
+        <p:nvSpPr>
+          <p:cNvPr id="5" name="Fußzeilenplatzhalter 4"/>
+          <p:cNvSpPr>
+            <a:spLocks noGrp="1"/>
+          </p:cNvSpPr>
+          <p:nvPr>
+            <p:ph type="ftr" sz="quarter" idx="11"/>
+          </p:nvPr>
+        </p:nvSpPr>
+        <p:spPr/>
+        <p:txBody>
+          <a:bodyPr/>
+          <a:lstStyle/>
+          <a:p>
+            <a:r>
+              <a:rPr lang="de-DE" smtClean="0"/>
+              <a:t>Roomanizer Presentation Team E</a:t>
+            </a:r>
+            <a:endParaRPr lang="de-DE"/>
+          </a:p>
+        </p:txBody>
+      </p:sp>
+      <p:sp>
+        <p:nvSpPr>
+          <p:cNvPr id="6" name="Foliennummernplatzhalter 5"/>
+          <p:cNvSpPr>
+            <a:spLocks noGrp="1"/>
+          </p:cNvSpPr>
+          <p:nvPr>
+            <p:ph type="sldNum" sz="quarter" idx="12"/>
+          </p:nvPr>
+        </p:nvSpPr>
+        <p:spPr/>
+        <p:txBody>
+          <a:bodyPr/>
+          <a:lstStyle/>
+          <a:p>
+            <a:fld id="{6C6AE60A-B69C-4790-82F7-3882EDF23186}" type="slidenum">
+              <a:rPr lang="de-DE" smtClean="0"/>
+              <a:t>27</a:t>
+            </a:fld>
+            <a:endParaRPr lang="de-DE"/>
+          </a:p>
+        </p:txBody>
+      </p:sp>
     </p:spTree>
     <p:extLst>
       <p:ext uri="{BB962C8B-B14F-4D97-AF65-F5344CB8AC3E}">
@@ -28638,6 +29904,75 @@
           </a:p>
         </p:txBody>
       </p:sp>
+      <p:sp>
+        <p:nvSpPr>
+          <p:cNvPr id="4" name="Datumsplatzhalter 3"/>
+          <p:cNvSpPr>
+            <a:spLocks noGrp="1"/>
+          </p:cNvSpPr>
+          <p:nvPr>
+            <p:ph type="dt" sz="half" idx="10"/>
+          </p:nvPr>
+        </p:nvSpPr>
+        <p:spPr/>
+        <p:txBody>
+          <a:bodyPr/>
+          <a:lstStyle/>
+          <a:p>
+            <a:fld id="{F86C81AB-5621-4D7F-9D27-D9223E193F8C}" type="datetime1">
+              <a:rPr lang="de-DE" smtClean="0"/>
+              <a:t>12.06.2012</a:t>
+            </a:fld>
+            <a:endParaRPr lang="de-DE"/>
+          </a:p>
+        </p:txBody>
+      </p:sp>
+      <p:sp>
+        <p:nvSpPr>
+          <p:cNvPr id="5" name="Fußzeilenplatzhalter 4"/>
+          <p:cNvSpPr>
+            <a:spLocks noGrp="1"/>
+          </p:cNvSpPr>
+          <p:nvPr>
+            <p:ph type="ftr" sz="quarter" idx="11"/>
+          </p:nvPr>
+        </p:nvSpPr>
+        <p:spPr/>
+        <p:txBody>
+          <a:bodyPr/>
+          <a:lstStyle/>
+          <a:p>
+            <a:r>
+              <a:rPr lang="de-DE" smtClean="0"/>
+              <a:t>Roomanizer Presentation Team E</a:t>
+            </a:r>
+            <a:endParaRPr lang="de-DE"/>
+          </a:p>
+        </p:txBody>
+      </p:sp>
+      <p:sp>
+        <p:nvSpPr>
+          <p:cNvPr id="6" name="Foliennummernplatzhalter 5"/>
+          <p:cNvSpPr>
+            <a:spLocks noGrp="1"/>
+          </p:cNvSpPr>
+          <p:nvPr>
+            <p:ph type="sldNum" sz="quarter" idx="12"/>
+          </p:nvPr>
+        </p:nvSpPr>
+        <p:spPr/>
+        <p:txBody>
+          <a:bodyPr/>
+          <a:lstStyle/>
+          <a:p>
+            <a:fld id="{6C6AE60A-B69C-4790-82F7-3882EDF23186}" type="slidenum">
+              <a:rPr lang="de-DE" smtClean="0"/>
+              <a:t>29</a:t>
+            </a:fld>
+            <a:endParaRPr lang="de-DE"/>
+          </a:p>
+        </p:txBody>
+      </p:sp>
     </p:spTree>
     <p:extLst>
       <p:ext uri="{BB962C8B-B14F-4D97-AF65-F5344CB8AC3E}">
@@ -28750,6 +30085,75 @@
           </a:p>
         </p:txBody>
       </p:sp>
+      <p:sp>
+        <p:nvSpPr>
+          <p:cNvPr id="4" name="Datumsplatzhalter 3"/>
+          <p:cNvSpPr>
+            <a:spLocks noGrp="1"/>
+          </p:cNvSpPr>
+          <p:nvPr>
+            <p:ph type="dt" sz="half" idx="10"/>
+          </p:nvPr>
+        </p:nvSpPr>
+        <p:spPr/>
+        <p:txBody>
+          <a:bodyPr/>
+          <a:lstStyle/>
+          <a:p>
+            <a:fld id="{80A6D4AB-7C8B-456D-BF4A-250B45703285}" type="datetime1">
+              <a:rPr lang="de-DE" smtClean="0"/>
+              <a:t>12.06.2012</a:t>
+            </a:fld>
+            <a:endParaRPr lang="de-DE"/>
+          </a:p>
+        </p:txBody>
+      </p:sp>
+      <p:sp>
+        <p:nvSpPr>
+          <p:cNvPr id="5" name="Fußzeilenplatzhalter 4"/>
+          <p:cNvSpPr>
+            <a:spLocks noGrp="1"/>
+          </p:cNvSpPr>
+          <p:nvPr>
+            <p:ph type="ftr" sz="quarter" idx="11"/>
+          </p:nvPr>
+        </p:nvSpPr>
+        <p:spPr/>
+        <p:txBody>
+          <a:bodyPr/>
+          <a:lstStyle/>
+          <a:p>
+            <a:r>
+              <a:rPr lang="de-DE" smtClean="0"/>
+              <a:t>Roomanizer Presentation Team E</a:t>
+            </a:r>
+            <a:endParaRPr lang="de-DE"/>
+          </a:p>
+        </p:txBody>
+      </p:sp>
+      <p:sp>
+        <p:nvSpPr>
+          <p:cNvPr id="6" name="Foliennummernplatzhalter 5"/>
+          <p:cNvSpPr>
+            <a:spLocks noGrp="1"/>
+          </p:cNvSpPr>
+          <p:nvPr>
+            <p:ph type="sldNum" sz="quarter" idx="12"/>
+          </p:nvPr>
+        </p:nvSpPr>
+        <p:spPr/>
+        <p:txBody>
+          <a:bodyPr/>
+          <a:lstStyle/>
+          <a:p>
+            <a:fld id="{6C6AE60A-B69C-4790-82F7-3882EDF23186}" type="slidenum">
+              <a:rPr lang="de-DE" smtClean="0"/>
+              <a:t>3</a:t>
+            </a:fld>
+            <a:endParaRPr lang="de-DE"/>
+          </a:p>
+        </p:txBody>
+      </p:sp>
     </p:spTree>
     <p:extLst>
       <p:ext uri="{BB962C8B-B14F-4D97-AF65-F5344CB8AC3E}">
@@ -29015,6 +30419,75 @@
           </a:graphicData>
         </a:graphic>
       </p:graphicFrame>
+      <p:sp>
+        <p:nvSpPr>
+          <p:cNvPr id="4" name="Datumsplatzhalter 3"/>
+          <p:cNvSpPr>
+            <a:spLocks noGrp="1"/>
+          </p:cNvSpPr>
+          <p:nvPr>
+            <p:ph type="dt" sz="half" idx="10"/>
+          </p:nvPr>
+        </p:nvSpPr>
+        <p:spPr/>
+        <p:txBody>
+          <a:bodyPr/>
+          <a:lstStyle/>
+          <a:p>
+            <a:fld id="{E72BF9D2-0539-4254-B1F4-DBC9B3341B4F}" type="datetime1">
+              <a:rPr lang="de-DE" smtClean="0"/>
+              <a:t>12.06.2012</a:t>
+            </a:fld>
+            <a:endParaRPr lang="de-DE"/>
+          </a:p>
+        </p:txBody>
+      </p:sp>
+      <p:sp>
+        <p:nvSpPr>
+          <p:cNvPr id="6" name="Fußzeilenplatzhalter 5"/>
+          <p:cNvSpPr>
+            <a:spLocks noGrp="1"/>
+          </p:cNvSpPr>
+          <p:nvPr>
+            <p:ph type="ftr" sz="quarter" idx="11"/>
+          </p:nvPr>
+        </p:nvSpPr>
+        <p:spPr/>
+        <p:txBody>
+          <a:bodyPr/>
+          <a:lstStyle/>
+          <a:p>
+            <a:r>
+              <a:rPr lang="de-DE" smtClean="0"/>
+              <a:t>Roomanizer Presentation Team E</a:t>
+            </a:r>
+            <a:endParaRPr lang="de-DE"/>
+          </a:p>
+        </p:txBody>
+      </p:sp>
+      <p:sp>
+        <p:nvSpPr>
+          <p:cNvPr id="7" name="Foliennummernplatzhalter 6"/>
+          <p:cNvSpPr>
+            <a:spLocks noGrp="1"/>
+          </p:cNvSpPr>
+          <p:nvPr>
+            <p:ph type="sldNum" sz="quarter" idx="12"/>
+          </p:nvPr>
+        </p:nvSpPr>
+        <p:spPr/>
+        <p:txBody>
+          <a:bodyPr/>
+          <a:lstStyle/>
+          <a:p>
+            <a:fld id="{6C6AE60A-B69C-4790-82F7-3882EDF23186}" type="slidenum">
+              <a:rPr lang="de-DE" smtClean="0"/>
+              <a:t>30</a:t>
+            </a:fld>
+            <a:endParaRPr lang="de-DE"/>
+          </a:p>
+        </p:txBody>
+      </p:sp>
     </p:spTree>
     <p:extLst>
       <p:ext uri="{BB962C8B-B14F-4D97-AF65-F5344CB8AC3E}">
@@ -29268,6 +30741,75 @@
           </a:p>
         </p:txBody>
       </p:sp>
+      <p:sp>
+        <p:nvSpPr>
+          <p:cNvPr id="4" name="Datumsplatzhalter 3"/>
+          <p:cNvSpPr>
+            <a:spLocks noGrp="1"/>
+          </p:cNvSpPr>
+          <p:nvPr>
+            <p:ph type="dt" sz="half" idx="10"/>
+          </p:nvPr>
+        </p:nvSpPr>
+        <p:spPr/>
+        <p:txBody>
+          <a:bodyPr/>
+          <a:lstStyle/>
+          <a:p>
+            <a:fld id="{CC20832E-E277-41BF-B479-28E628B958E3}" type="datetime1">
+              <a:rPr lang="de-DE" smtClean="0"/>
+              <a:t>12.06.2012</a:t>
+            </a:fld>
+            <a:endParaRPr lang="de-DE"/>
+          </a:p>
+        </p:txBody>
+      </p:sp>
+      <p:sp>
+        <p:nvSpPr>
+          <p:cNvPr id="5" name="Fußzeilenplatzhalter 4"/>
+          <p:cNvSpPr>
+            <a:spLocks noGrp="1"/>
+          </p:cNvSpPr>
+          <p:nvPr>
+            <p:ph type="ftr" sz="quarter" idx="11"/>
+          </p:nvPr>
+        </p:nvSpPr>
+        <p:spPr/>
+        <p:txBody>
+          <a:bodyPr/>
+          <a:lstStyle/>
+          <a:p>
+            <a:r>
+              <a:rPr lang="de-DE" smtClean="0"/>
+              <a:t>Roomanizer Presentation Team E</a:t>
+            </a:r>
+            <a:endParaRPr lang="de-DE"/>
+          </a:p>
+        </p:txBody>
+      </p:sp>
+      <p:sp>
+        <p:nvSpPr>
+          <p:cNvPr id="6" name="Foliennummernplatzhalter 5"/>
+          <p:cNvSpPr>
+            <a:spLocks noGrp="1"/>
+          </p:cNvSpPr>
+          <p:nvPr>
+            <p:ph type="sldNum" sz="quarter" idx="12"/>
+          </p:nvPr>
+        </p:nvSpPr>
+        <p:spPr/>
+        <p:txBody>
+          <a:bodyPr/>
+          <a:lstStyle/>
+          <a:p>
+            <a:fld id="{6C6AE60A-B69C-4790-82F7-3882EDF23186}" type="slidenum">
+              <a:rPr lang="de-DE" smtClean="0"/>
+              <a:t>31</a:t>
+            </a:fld>
+            <a:endParaRPr lang="de-DE"/>
+          </a:p>
+        </p:txBody>
+      </p:sp>
     </p:spTree>
     <p:extLst>
       <p:ext uri="{BB962C8B-B14F-4D97-AF65-F5344CB8AC3E}">
@@ -29874,6 +31416,75 @@
             <a:endParaRPr lang="de-AT" sz="1600" dirty="0" smtClean="0">
               <a:sym typeface="Wingdings" pitchFamily="2" charset="2"/>
             </a:endParaRPr>
+          </a:p>
+        </p:txBody>
+      </p:sp>
+      <p:sp>
+        <p:nvSpPr>
+          <p:cNvPr id="4" name="Datumsplatzhalter 3"/>
+          <p:cNvSpPr>
+            <a:spLocks noGrp="1"/>
+          </p:cNvSpPr>
+          <p:nvPr>
+            <p:ph type="dt" sz="half" idx="10"/>
+          </p:nvPr>
+        </p:nvSpPr>
+        <p:spPr/>
+        <p:txBody>
+          <a:bodyPr/>
+          <a:lstStyle/>
+          <a:p>
+            <a:fld id="{5F6394CA-0388-42BA-B642-C61FBE1668BB}" type="datetime1">
+              <a:rPr lang="de-DE" smtClean="0"/>
+              <a:t>12.06.2012</a:t>
+            </a:fld>
+            <a:endParaRPr lang="de-DE"/>
+          </a:p>
+        </p:txBody>
+      </p:sp>
+      <p:sp>
+        <p:nvSpPr>
+          <p:cNvPr id="5" name="Fußzeilenplatzhalter 4"/>
+          <p:cNvSpPr>
+            <a:spLocks noGrp="1"/>
+          </p:cNvSpPr>
+          <p:nvPr>
+            <p:ph type="ftr" sz="quarter" idx="11"/>
+          </p:nvPr>
+        </p:nvSpPr>
+        <p:spPr/>
+        <p:txBody>
+          <a:bodyPr/>
+          <a:lstStyle/>
+          <a:p>
+            <a:r>
+              <a:rPr lang="de-DE" smtClean="0"/>
+              <a:t>Roomanizer Presentation Team E</a:t>
+            </a:r>
+            <a:endParaRPr lang="de-DE"/>
+          </a:p>
+        </p:txBody>
+      </p:sp>
+      <p:sp>
+        <p:nvSpPr>
+          <p:cNvPr id="6" name="Foliennummernplatzhalter 5"/>
+          <p:cNvSpPr>
+            <a:spLocks noGrp="1"/>
+          </p:cNvSpPr>
+          <p:nvPr>
+            <p:ph type="sldNum" sz="quarter" idx="12"/>
+          </p:nvPr>
+        </p:nvSpPr>
+        <p:spPr/>
+        <p:txBody>
+          <a:bodyPr/>
+          <a:lstStyle/>
+          <a:p>
+            <a:fld id="{6C6AE60A-B69C-4790-82F7-3882EDF23186}" type="slidenum">
+              <a:rPr lang="de-DE" smtClean="0"/>
+              <a:t>32</a:t>
+            </a:fld>
+            <a:endParaRPr lang="de-DE"/>
           </a:p>
         </p:txBody>
       </p:sp>
@@ -30113,6 +31724,75 @@
               <a:t>object</a:t>
             </a:r>
             <a:endParaRPr lang="de-AT" dirty="0" smtClean="0"/>
+          </a:p>
+        </p:txBody>
+      </p:sp>
+      <p:sp>
+        <p:nvSpPr>
+          <p:cNvPr id="4" name="Datumsplatzhalter 3"/>
+          <p:cNvSpPr>
+            <a:spLocks noGrp="1"/>
+          </p:cNvSpPr>
+          <p:nvPr>
+            <p:ph type="dt" sz="half" idx="10"/>
+          </p:nvPr>
+        </p:nvSpPr>
+        <p:spPr/>
+        <p:txBody>
+          <a:bodyPr/>
+          <a:lstStyle/>
+          <a:p>
+            <a:fld id="{55D1D1FE-DB1B-4559-9B95-B8A319F525F3}" type="datetime1">
+              <a:rPr lang="de-DE" smtClean="0"/>
+              <a:t>12.06.2012</a:t>
+            </a:fld>
+            <a:endParaRPr lang="de-DE"/>
+          </a:p>
+        </p:txBody>
+      </p:sp>
+      <p:sp>
+        <p:nvSpPr>
+          <p:cNvPr id="5" name="Fußzeilenplatzhalter 4"/>
+          <p:cNvSpPr>
+            <a:spLocks noGrp="1"/>
+          </p:cNvSpPr>
+          <p:nvPr>
+            <p:ph type="ftr" sz="quarter" idx="11"/>
+          </p:nvPr>
+        </p:nvSpPr>
+        <p:spPr/>
+        <p:txBody>
+          <a:bodyPr/>
+          <a:lstStyle/>
+          <a:p>
+            <a:r>
+              <a:rPr lang="de-DE" smtClean="0"/>
+              <a:t>Roomanizer Presentation Team E</a:t>
+            </a:r>
+            <a:endParaRPr lang="de-DE"/>
+          </a:p>
+        </p:txBody>
+      </p:sp>
+      <p:sp>
+        <p:nvSpPr>
+          <p:cNvPr id="6" name="Foliennummernplatzhalter 5"/>
+          <p:cNvSpPr>
+            <a:spLocks noGrp="1"/>
+          </p:cNvSpPr>
+          <p:nvPr>
+            <p:ph type="sldNum" sz="quarter" idx="12"/>
+          </p:nvPr>
+        </p:nvSpPr>
+        <p:spPr/>
+        <p:txBody>
+          <a:bodyPr/>
+          <a:lstStyle/>
+          <a:p>
+            <a:fld id="{6C6AE60A-B69C-4790-82F7-3882EDF23186}" type="slidenum">
+              <a:rPr lang="de-DE" smtClean="0"/>
+              <a:t>33</a:t>
+            </a:fld>
+            <a:endParaRPr lang="de-DE"/>
           </a:p>
         </p:txBody>
       </p:sp>
@@ -30868,6 +32548,75 @@
               <a:t>PaymentState</a:t>
             </a:r>
             <a:endParaRPr lang="en-GB" sz="2400" b="1" i="1" dirty="0"/>
+          </a:p>
+        </p:txBody>
+      </p:sp>
+      <p:sp>
+        <p:nvSpPr>
+          <p:cNvPr id="4" name="Datumsplatzhalter 3"/>
+          <p:cNvSpPr>
+            <a:spLocks noGrp="1"/>
+          </p:cNvSpPr>
+          <p:nvPr>
+            <p:ph type="dt" sz="half" idx="10"/>
+          </p:nvPr>
+        </p:nvSpPr>
+        <p:spPr/>
+        <p:txBody>
+          <a:bodyPr/>
+          <a:lstStyle/>
+          <a:p>
+            <a:fld id="{90665428-5038-43D1-B66A-E8A7A8B6DAC4}" type="datetime1">
+              <a:rPr lang="de-DE" smtClean="0"/>
+              <a:t>12.06.2012</a:t>
+            </a:fld>
+            <a:endParaRPr lang="de-DE"/>
+          </a:p>
+        </p:txBody>
+      </p:sp>
+      <p:sp>
+        <p:nvSpPr>
+          <p:cNvPr id="7" name="Fußzeilenplatzhalter 6"/>
+          <p:cNvSpPr>
+            <a:spLocks noGrp="1"/>
+          </p:cNvSpPr>
+          <p:nvPr>
+            <p:ph type="ftr" sz="quarter" idx="11"/>
+          </p:nvPr>
+        </p:nvSpPr>
+        <p:spPr/>
+        <p:txBody>
+          <a:bodyPr/>
+          <a:lstStyle/>
+          <a:p>
+            <a:r>
+              <a:rPr lang="de-DE" smtClean="0"/>
+              <a:t>Roomanizer Presentation Team E</a:t>
+            </a:r>
+            <a:endParaRPr lang="de-DE"/>
+          </a:p>
+        </p:txBody>
+      </p:sp>
+      <p:sp>
+        <p:nvSpPr>
+          <p:cNvPr id="8" name="Foliennummernplatzhalter 7"/>
+          <p:cNvSpPr>
+            <a:spLocks noGrp="1"/>
+          </p:cNvSpPr>
+          <p:nvPr>
+            <p:ph type="sldNum" sz="quarter" idx="12"/>
+          </p:nvPr>
+        </p:nvSpPr>
+        <p:spPr/>
+        <p:txBody>
+          <a:bodyPr/>
+          <a:lstStyle/>
+          <a:p>
+            <a:fld id="{6C6AE60A-B69C-4790-82F7-3882EDF23186}" type="slidenum">
+              <a:rPr lang="de-DE" smtClean="0"/>
+              <a:t>34</a:t>
+            </a:fld>
+            <a:endParaRPr lang="de-DE"/>
           </a:p>
         </p:txBody>
       </p:sp>
@@ -31677,6 +33426,75 @@
           </a:p>
         </p:txBody>
       </p:sp>
+      <p:sp>
+        <p:nvSpPr>
+          <p:cNvPr id="4" name="Datumsplatzhalter 3"/>
+          <p:cNvSpPr>
+            <a:spLocks noGrp="1"/>
+          </p:cNvSpPr>
+          <p:nvPr>
+            <p:ph type="dt" sz="half" idx="10"/>
+          </p:nvPr>
+        </p:nvSpPr>
+        <p:spPr/>
+        <p:txBody>
+          <a:bodyPr/>
+          <a:lstStyle/>
+          <a:p>
+            <a:fld id="{379ACA78-2388-42BF-BAC9-7720C9A9D113}" type="datetime1">
+              <a:rPr lang="de-DE" smtClean="0"/>
+              <a:t>12.06.2012</a:t>
+            </a:fld>
+            <a:endParaRPr lang="de-DE"/>
+          </a:p>
+        </p:txBody>
+      </p:sp>
+      <p:sp>
+        <p:nvSpPr>
+          <p:cNvPr id="5" name="Fußzeilenplatzhalter 4"/>
+          <p:cNvSpPr>
+            <a:spLocks noGrp="1"/>
+          </p:cNvSpPr>
+          <p:nvPr>
+            <p:ph type="ftr" sz="quarter" idx="11"/>
+          </p:nvPr>
+        </p:nvSpPr>
+        <p:spPr/>
+        <p:txBody>
+          <a:bodyPr/>
+          <a:lstStyle/>
+          <a:p>
+            <a:r>
+              <a:rPr lang="de-DE" smtClean="0"/>
+              <a:t>Roomanizer Presentation Team E</a:t>
+            </a:r>
+            <a:endParaRPr lang="de-DE"/>
+          </a:p>
+        </p:txBody>
+      </p:sp>
+      <p:sp>
+        <p:nvSpPr>
+          <p:cNvPr id="6" name="Foliennummernplatzhalter 5"/>
+          <p:cNvSpPr>
+            <a:spLocks noGrp="1"/>
+          </p:cNvSpPr>
+          <p:nvPr>
+            <p:ph type="sldNum" sz="quarter" idx="12"/>
+          </p:nvPr>
+        </p:nvSpPr>
+        <p:spPr/>
+        <p:txBody>
+          <a:bodyPr/>
+          <a:lstStyle/>
+          <a:p>
+            <a:fld id="{6C6AE60A-B69C-4790-82F7-3882EDF23186}" type="slidenum">
+              <a:rPr lang="de-DE" smtClean="0"/>
+              <a:t>35</a:t>
+            </a:fld>
+            <a:endParaRPr lang="de-DE"/>
+          </a:p>
+        </p:txBody>
+      </p:sp>
     </p:spTree>
     <p:extLst>
       <p:ext uri="{BB962C8B-B14F-4D97-AF65-F5344CB8AC3E}">
@@ -31873,6 +33691,75 @@
           </a:prstGeom>
         </p:spPr>
       </p:pic>
+      <p:sp>
+        <p:nvSpPr>
+          <p:cNvPr id="5" name="Datumsplatzhalter 4"/>
+          <p:cNvSpPr>
+            <a:spLocks noGrp="1"/>
+          </p:cNvSpPr>
+          <p:nvPr>
+            <p:ph type="dt" sz="half" idx="10"/>
+          </p:nvPr>
+        </p:nvSpPr>
+        <p:spPr/>
+        <p:txBody>
+          <a:bodyPr/>
+          <a:lstStyle/>
+          <a:p>
+            <a:fld id="{DB74F5E2-EA95-4776-940B-444E6A953869}" type="datetime1">
+              <a:rPr lang="de-DE" smtClean="0"/>
+              <a:t>12.06.2012</a:t>
+            </a:fld>
+            <a:endParaRPr lang="de-DE"/>
+          </a:p>
+        </p:txBody>
+      </p:sp>
+      <p:sp>
+        <p:nvSpPr>
+          <p:cNvPr id="6" name="Fußzeilenplatzhalter 5"/>
+          <p:cNvSpPr>
+            <a:spLocks noGrp="1"/>
+          </p:cNvSpPr>
+          <p:nvPr>
+            <p:ph type="ftr" sz="quarter" idx="11"/>
+          </p:nvPr>
+        </p:nvSpPr>
+        <p:spPr/>
+        <p:txBody>
+          <a:bodyPr/>
+          <a:lstStyle/>
+          <a:p>
+            <a:r>
+              <a:rPr lang="de-DE" smtClean="0"/>
+              <a:t>Roomanizer Presentation Team E</a:t>
+            </a:r>
+            <a:endParaRPr lang="de-DE"/>
+          </a:p>
+        </p:txBody>
+      </p:sp>
+      <p:sp>
+        <p:nvSpPr>
+          <p:cNvPr id="7" name="Foliennummernplatzhalter 6"/>
+          <p:cNvSpPr>
+            <a:spLocks noGrp="1"/>
+          </p:cNvSpPr>
+          <p:nvPr>
+            <p:ph type="sldNum" sz="quarter" idx="12"/>
+          </p:nvPr>
+        </p:nvSpPr>
+        <p:spPr/>
+        <p:txBody>
+          <a:bodyPr/>
+          <a:lstStyle/>
+          <a:p>
+            <a:fld id="{6C6AE60A-B69C-4790-82F7-3882EDF23186}" type="slidenum">
+              <a:rPr lang="de-DE" smtClean="0"/>
+              <a:t>36</a:t>
+            </a:fld>
+            <a:endParaRPr lang="de-DE"/>
+          </a:p>
+        </p:txBody>
+      </p:sp>
     </p:spTree>
     <p:extLst>
       <p:ext uri="{BB962C8B-B14F-4D97-AF65-F5344CB8AC3E}">
@@ -31976,6 +33863,75 @@
           </a:p>
         </p:txBody>
       </p:sp>
+      <p:sp>
+        <p:nvSpPr>
+          <p:cNvPr id="4" name="Datumsplatzhalter 3"/>
+          <p:cNvSpPr>
+            <a:spLocks noGrp="1"/>
+          </p:cNvSpPr>
+          <p:nvPr>
+            <p:ph type="dt" sz="half" idx="10"/>
+          </p:nvPr>
+        </p:nvSpPr>
+        <p:spPr/>
+        <p:txBody>
+          <a:bodyPr/>
+          <a:lstStyle/>
+          <a:p>
+            <a:fld id="{BFFC6093-B46E-476F-B4C5-1F231BBCF7B0}" type="datetime1">
+              <a:rPr lang="de-DE" smtClean="0"/>
+              <a:t>12.06.2012</a:t>
+            </a:fld>
+            <a:endParaRPr lang="de-DE"/>
+          </a:p>
+        </p:txBody>
+      </p:sp>
+      <p:sp>
+        <p:nvSpPr>
+          <p:cNvPr id="5" name="Fußzeilenplatzhalter 4"/>
+          <p:cNvSpPr>
+            <a:spLocks noGrp="1"/>
+          </p:cNvSpPr>
+          <p:nvPr>
+            <p:ph type="ftr" sz="quarter" idx="11"/>
+          </p:nvPr>
+        </p:nvSpPr>
+        <p:spPr/>
+        <p:txBody>
+          <a:bodyPr/>
+          <a:lstStyle/>
+          <a:p>
+            <a:r>
+              <a:rPr lang="de-DE" smtClean="0"/>
+              <a:t>Roomanizer Presentation Team E</a:t>
+            </a:r>
+            <a:endParaRPr lang="de-DE"/>
+          </a:p>
+        </p:txBody>
+      </p:sp>
+      <p:sp>
+        <p:nvSpPr>
+          <p:cNvPr id="6" name="Foliennummernplatzhalter 5"/>
+          <p:cNvSpPr>
+            <a:spLocks noGrp="1"/>
+          </p:cNvSpPr>
+          <p:nvPr>
+            <p:ph type="sldNum" sz="quarter" idx="12"/>
+          </p:nvPr>
+        </p:nvSpPr>
+        <p:spPr/>
+        <p:txBody>
+          <a:bodyPr/>
+          <a:lstStyle/>
+          <a:p>
+            <a:fld id="{6C6AE60A-B69C-4790-82F7-3882EDF23186}" type="slidenum">
+              <a:rPr lang="de-DE" smtClean="0"/>
+              <a:t>37</a:t>
+            </a:fld>
+            <a:endParaRPr lang="de-DE"/>
+          </a:p>
+        </p:txBody>
+      </p:sp>
     </p:spTree>
     <p:extLst>
       <p:ext uri="{BB962C8B-B14F-4D97-AF65-F5344CB8AC3E}">
@@ -32065,6 +34021,75 @@
           </a:xfrm>
         </p:spPr>
       </p:pic>
+      <p:sp>
+        <p:nvSpPr>
+          <p:cNvPr id="3" name="Datumsplatzhalter 2"/>
+          <p:cNvSpPr>
+            <a:spLocks noGrp="1"/>
+          </p:cNvSpPr>
+          <p:nvPr>
+            <p:ph type="dt" sz="half" idx="10"/>
+          </p:nvPr>
+        </p:nvSpPr>
+        <p:spPr/>
+        <p:txBody>
+          <a:bodyPr/>
+          <a:lstStyle/>
+          <a:p>
+            <a:fld id="{6FB45434-FD8D-4414-BFAB-68E741D0C658}" type="datetime1">
+              <a:rPr lang="de-DE" smtClean="0"/>
+              <a:t>12.06.2012</a:t>
+            </a:fld>
+            <a:endParaRPr lang="de-DE"/>
+          </a:p>
+        </p:txBody>
+      </p:sp>
+      <p:sp>
+        <p:nvSpPr>
+          <p:cNvPr id="5" name="Fußzeilenplatzhalter 4"/>
+          <p:cNvSpPr>
+            <a:spLocks noGrp="1"/>
+          </p:cNvSpPr>
+          <p:nvPr>
+            <p:ph type="ftr" sz="quarter" idx="11"/>
+          </p:nvPr>
+        </p:nvSpPr>
+        <p:spPr/>
+        <p:txBody>
+          <a:bodyPr/>
+          <a:lstStyle/>
+          <a:p>
+            <a:r>
+              <a:rPr lang="de-DE" smtClean="0"/>
+              <a:t>Roomanizer Presentation Team E</a:t>
+            </a:r>
+            <a:endParaRPr lang="de-DE"/>
+          </a:p>
+        </p:txBody>
+      </p:sp>
+      <p:sp>
+        <p:nvSpPr>
+          <p:cNvPr id="6" name="Foliennummernplatzhalter 5"/>
+          <p:cNvSpPr>
+            <a:spLocks noGrp="1"/>
+          </p:cNvSpPr>
+          <p:nvPr>
+            <p:ph type="sldNum" sz="quarter" idx="12"/>
+          </p:nvPr>
+        </p:nvSpPr>
+        <p:spPr/>
+        <p:txBody>
+          <a:bodyPr/>
+          <a:lstStyle/>
+          <a:p>
+            <a:fld id="{6C6AE60A-B69C-4790-82F7-3882EDF23186}" type="slidenum">
+              <a:rPr lang="de-DE" smtClean="0"/>
+              <a:t>38</a:t>
+            </a:fld>
+            <a:endParaRPr lang="de-DE"/>
+          </a:p>
+        </p:txBody>
+      </p:sp>
     </p:spTree>
     <p:extLst>
       <p:ext uri="{BB962C8B-B14F-4D97-AF65-F5344CB8AC3E}">
@@ -32365,6 +34390,75 @@
           </a:p>
         </p:txBody>
       </p:sp>
+      <p:sp>
+        <p:nvSpPr>
+          <p:cNvPr id="4" name="Datumsplatzhalter 3"/>
+          <p:cNvSpPr>
+            <a:spLocks noGrp="1"/>
+          </p:cNvSpPr>
+          <p:nvPr>
+            <p:ph type="dt" sz="half" idx="10"/>
+          </p:nvPr>
+        </p:nvSpPr>
+        <p:spPr/>
+        <p:txBody>
+          <a:bodyPr/>
+          <a:lstStyle/>
+          <a:p>
+            <a:fld id="{951D9C18-2FE0-4E38-964D-2E0ADFC6897C}" type="datetime1">
+              <a:rPr lang="de-DE" smtClean="0"/>
+              <a:t>12.06.2012</a:t>
+            </a:fld>
+            <a:endParaRPr lang="de-DE"/>
+          </a:p>
+        </p:txBody>
+      </p:sp>
+      <p:sp>
+        <p:nvSpPr>
+          <p:cNvPr id="5" name="Fußzeilenplatzhalter 4"/>
+          <p:cNvSpPr>
+            <a:spLocks noGrp="1"/>
+          </p:cNvSpPr>
+          <p:nvPr>
+            <p:ph type="ftr" sz="quarter" idx="11"/>
+          </p:nvPr>
+        </p:nvSpPr>
+        <p:spPr/>
+        <p:txBody>
+          <a:bodyPr/>
+          <a:lstStyle/>
+          <a:p>
+            <a:r>
+              <a:rPr lang="de-DE" smtClean="0"/>
+              <a:t>Roomanizer Presentation Team E</a:t>
+            </a:r>
+            <a:endParaRPr lang="de-DE"/>
+          </a:p>
+        </p:txBody>
+      </p:sp>
+      <p:sp>
+        <p:nvSpPr>
+          <p:cNvPr id="6" name="Foliennummernplatzhalter 5"/>
+          <p:cNvSpPr>
+            <a:spLocks noGrp="1"/>
+          </p:cNvSpPr>
+          <p:nvPr>
+            <p:ph type="sldNum" sz="quarter" idx="12"/>
+          </p:nvPr>
+        </p:nvSpPr>
+        <p:spPr/>
+        <p:txBody>
+          <a:bodyPr/>
+          <a:lstStyle/>
+          <a:p>
+            <a:fld id="{6C6AE60A-B69C-4790-82F7-3882EDF23186}" type="slidenum">
+              <a:rPr lang="de-DE" smtClean="0"/>
+              <a:t>39</a:t>
+            </a:fld>
+            <a:endParaRPr lang="de-DE"/>
+          </a:p>
+        </p:txBody>
+      </p:sp>
     </p:spTree>
     <p:extLst>
       <p:ext uri="{BB962C8B-B14F-4D97-AF65-F5344CB8AC3E}">
@@ -32420,10 +34514,10 @@
             <a:pPr>
               <a:defRPr/>
             </a:pPr>
-            <a:r>
-              <a:rPr lang="de-AT" smtClean="0"/>
-              <a:t>10.06.2012</a:t>
-            </a:r>
+            <a:fld id="{CBE63382-8907-4F59-8B5B-55521F934C55}" type="datetime1">
+              <a:rPr lang="de-DE" smtClean="0"/>
+              <a:t>12.06.2012</a:t>
+            </a:fld>
             <a:endParaRPr lang="de-AT"/>
           </a:p>
         </p:txBody>
@@ -33258,6 +35352,35 @@
           </a:p>
         </p:txBody>
       </p:sp>
+      <p:sp>
+        <p:nvSpPr>
+          <p:cNvPr id="2" name="Foliennummernplatzhalter 1"/>
+          <p:cNvSpPr>
+            <a:spLocks noGrp="1"/>
+          </p:cNvSpPr>
+          <p:nvPr>
+            <p:ph type="sldNum" idx="11"/>
+          </p:nvPr>
+        </p:nvSpPr>
+        <p:spPr/>
+        <p:txBody>
+          <a:bodyPr/>
+          <a:lstStyle/>
+          <a:p>
+            <a:pPr>
+              <a:defRPr/>
+            </a:pPr>
+            <a:fld id="{645DEDA9-89AC-431C-94ED-F92ECA179B63}" type="slidenum">
+              <a:rPr lang="de-AT" smtClean="0"/>
+              <a:pPr>
+                <a:defRPr/>
+              </a:pPr>
+              <a:t>4</a:t>
+            </a:fld>
+            <a:endParaRPr lang="de-AT"/>
+          </a:p>
+        </p:txBody>
+      </p:sp>
     </p:spTree>
     <p:extLst>
       <p:ext uri="{BB962C8B-B14F-4D97-AF65-F5344CB8AC3E}">
@@ -33415,6 +35538,75 @@
               <a:t>binding</a:t>
             </a:r>
             <a:endParaRPr lang="de-AT" dirty="0"/>
+          </a:p>
+        </p:txBody>
+      </p:sp>
+      <p:sp>
+        <p:nvSpPr>
+          <p:cNvPr id="3" name="Datumsplatzhalter 2"/>
+          <p:cNvSpPr>
+            <a:spLocks noGrp="1"/>
+          </p:cNvSpPr>
+          <p:nvPr>
+            <p:ph type="dt" sz="half" idx="10"/>
+          </p:nvPr>
+        </p:nvSpPr>
+        <p:spPr/>
+        <p:txBody>
+          <a:bodyPr/>
+          <a:lstStyle/>
+          <a:p>
+            <a:fld id="{1FBCF0A0-DDB4-48F3-B67F-9A9710A65075}" type="datetime1">
+              <a:rPr lang="de-DE" smtClean="0"/>
+              <a:t>12.06.2012</a:t>
+            </a:fld>
+            <a:endParaRPr lang="de-DE"/>
+          </a:p>
+        </p:txBody>
+      </p:sp>
+      <p:sp>
+        <p:nvSpPr>
+          <p:cNvPr id="4" name="Fußzeilenplatzhalter 3"/>
+          <p:cNvSpPr>
+            <a:spLocks noGrp="1"/>
+          </p:cNvSpPr>
+          <p:nvPr>
+            <p:ph type="ftr" sz="quarter" idx="11"/>
+          </p:nvPr>
+        </p:nvSpPr>
+        <p:spPr/>
+        <p:txBody>
+          <a:bodyPr/>
+          <a:lstStyle/>
+          <a:p>
+            <a:r>
+              <a:rPr lang="de-DE" smtClean="0"/>
+              <a:t>Roomanizer Presentation Team E</a:t>
+            </a:r>
+            <a:endParaRPr lang="de-DE"/>
+          </a:p>
+        </p:txBody>
+      </p:sp>
+      <p:sp>
+        <p:nvSpPr>
+          <p:cNvPr id="6" name="Foliennummernplatzhalter 5"/>
+          <p:cNvSpPr>
+            <a:spLocks noGrp="1"/>
+          </p:cNvSpPr>
+          <p:nvPr>
+            <p:ph type="sldNum" sz="quarter" idx="12"/>
+          </p:nvPr>
+        </p:nvSpPr>
+        <p:spPr/>
+        <p:txBody>
+          <a:bodyPr/>
+          <a:lstStyle/>
+          <a:p>
+            <a:fld id="{6C6AE60A-B69C-4790-82F7-3882EDF23186}" type="slidenum">
+              <a:rPr lang="de-DE" smtClean="0"/>
+              <a:t>40</a:t>
+            </a:fld>
+            <a:endParaRPr lang="de-DE"/>
           </a:p>
         </p:txBody>
       </p:sp>
@@ -33565,6 +35757,75 @@
           </a:p>
         </p:txBody>
       </p:sp>
+      <p:sp>
+        <p:nvSpPr>
+          <p:cNvPr id="4" name="Datumsplatzhalter 3"/>
+          <p:cNvSpPr>
+            <a:spLocks noGrp="1"/>
+          </p:cNvSpPr>
+          <p:nvPr>
+            <p:ph type="dt" sz="half" idx="10"/>
+          </p:nvPr>
+        </p:nvSpPr>
+        <p:spPr/>
+        <p:txBody>
+          <a:bodyPr/>
+          <a:lstStyle/>
+          <a:p>
+            <a:fld id="{2D24F1C6-A0E7-4669-955D-C30987019200}" type="datetime1">
+              <a:rPr lang="de-DE" smtClean="0"/>
+              <a:t>12.06.2012</a:t>
+            </a:fld>
+            <a:endParaRPr lang="de-DE"/>
+          </a:p>
+        </p:txBody>
+      </p:sp>
+      <p:sp>
+        <p:nvSpPr>
+          <p:cNvPr id="5" name="Fußzeilenplatzhalter 4"/>
+          <p:cNvSpPr>
+            <a:spLocks noGrp="1"/>
+          </p:cNvSpPr>
+          <p:nvPr>
+            <p:ph type="ftr" sz="quarter" idx="11"/>
+          </p:nvPr>
+        </p:nvSpPr>
+        <p:spPr/>
+        <p:txBody>
+          <a:bodyPr/>
+          <a:lstStyle/>
+          <a:p>
+            <a:r>
+              <a:rPr lang="de-DE" smtClean="0"/>
+              <a:t>Roomanizer Presentation Team E</a:t>
+            </a:r>
+            <a:endParaRPr lang="de-DE"/>
+          </a:p>
+        </p:txBody>
+      </p:sp>
+      <p:sp>
+        <p:nvSpPr>
+          <p:cNvPr id="6" name="Foliennummernplatzhalter 5"/>
+          <p:cNvSpPr>
+            <a:spLocks noGrp="1"/>
+          </p:cNvSpPr>
+          <p:nvPr>
+            <p:ph type="sldNum" sz="quarter" idx="12"/>
+          </p:nvPr>
+        </p:nvSpPr>
+        <p:spPr/>
+        <p:txBody>
+          <a:bodyPr/>
+          <a:lstStyle/>
+          <a:p>
+            <a:fld id="{6C6AE60A-B69C-4790-82F7-3882EDF23186}" type="slidenum">
+              <a:rPr lang="de-DE" smtClean="0"/>
+              <a:t>41</a:t>
+            </a:fld>
+            <a:endParaRPr lang="de-DE"/>
+          </a:p>
+        </p:txBody>
+      </p:sp>
     </p:spTree>
     <p:extLst>
       <p:ext uri="{BB962C8B-B14F-4D97-AF65-F5344CB8AC3E}">
@@ -33761,6 +36022,75 @@
               <a:t>MVC</a:t>
             </a:r>
             <a:endParaRPr lang="de-AT" dirty="0"/>
+          </a:p>
+        </p:txBody>
+      </p:sp>
+      <p:sp>
+        <p:nvSpPr>
+          <p:cNvPr id="4" name="Datumsplatzhalter 3"/>
+          <p:cNvSpPr>
+            <a:spLocks noGrp="1"/>
+          </p:cNvSpPr>
+          <p:nvPr>
+            <p:ph type="dt" sz="half" idx="10"/>
+          </p:nvPr>
+        </p:nvSpPr>
+        <p:spPr/>
+        <p:txBody>
+          <a:bodyPr/>
+          <a:lstStyle/>
+          <a:p>
+            <a:fld id="{0D05E4B8-A610-4E5F-8787-ACA105DCF971}" type="datetime1">
+              <a:rPr lang="de-DE" smtClean="0"/>
+              <a:t>12.06.2012</a:t>
+            </a:fld>
+            <a:endParaRPr lang="de-DE"/>
+          </a:p>
+        </p:txBody>
+      </p:sp>
+      <p:sp>
+        <p:nvSpPr>
+          <p:cNvPr id="5" name="Fußzeilenplatzhalter 4"/>
+          <p:cNvSpPr>
+            <a:spLocks noGrp="1"/>
+          </p:cNvSpPr>
+          <p:nvPr>
+            <p:ph type="ftr" sz="quarter" idx="11"/>
+          </p:nvPr>
+        </p:nvSpPr>
+        <p:spPr/>
+        <p:txBody>
+          <a:bodyPr/>
+          <a:lstStyle/>
+          <a:p>
+            <a:r>
+              <a:rPr lang="de-DE" smtClean="0"/>
+              <a:t>Roomanizer Presentation Team E</a:t>
+            </a:r>
+            <a:endParaRPr lang="de-DE"/>
+          </a:p>
+        </p:txBody>
+      </p:sp>
+      <p:sp>
+        <p:nvSpPr>
+          <p:cNvPr id="6" name="Foliennummernplatzhalter 5"/>
+          <p:cNvSpPr>
+            <a:spLocks noGrp="1"/>
+          </p:cNvSpPr>
+          <p:nvPr>
+            <p:ph type="sldNum" sz="quarter" idx="12"/>
+          </p:nvPr>
+        </p:nvSpPr>
+        <p:spPr/>
+        <p:txBody>
+          <a:bodyPr/>
+          <a:lstStyle/>
+          <a:p>
+            <a:fld id="{6C6AE60A-B69C-4790-82F7-3882EDF23186}" type="slidenum">
+              <a:rPr lang="de-DE" smtClean="0"/>
+              <a:t>42</a:t>
+            </a:fld>
+            <a:endParaRPr lang="de-DE"/>
           </a:p>
         </p:txBody>
       </p:sp>
@@ -34210,6 +36540,75 @@
           </a:prstGeom>
         </p:spPr>
       </p:pic>
+      <p:sp>
+        <p:nvSpPr>
+          <p:cNvPr id="6" name="Datumsplatzhalter 5"/>
+          <p:cNvSpPr>
+            <a:spLocks noGrp="1"/>
+          </p:cNvSpPr>
+          <p:nvPr>
+            <p:ph type="dt" sz="half" idx="10"/>
+          </p:nvPr>
+        </p:nvSpPr>
+        <p:spPr/>
+        <p:txBody>
+          <a:bodyPr/>
+          <a:lstStyle/>
+          <a:p>
+            <a:fld id="{68FEAAD8-4EF8-4972-BE2C-805B742D8671}" type="datetime1">
+              <a:rPr lang="de-DE" smtClean="0"/>
+              <a:t>12.06.2012</a:t>
+            </a:fld>
+            <a:endParaRPr lang="de-DE"/>
+          </a:p>
+        </p:txBody>
+      </p:sp>
+      <p:sp>
+        <p:nvSpPr>
+          <p:cNvPr id="7" name="Fußzeilenplatzhalter 6"/>
+          <p:cNvSpPr>
+            <a:spLocks noGrp="1"/>
+          </p:cNvSpPr>
+          <p:nvPr>
+            <p:ph type="ftr" sz="quarter" idx="11"/>
+          </p:nvPr>
+        </p:nvSpPr>
+        <p:spPr/>
+        <p:txBody>
+          <a:bodyPr/>
+          <a:lstStyle/>
+          <a:p>
+            <a:r>
+              <a:rPr lang="de-DE" smtClean="0"/>
+              <a:t>Roomanizer Presentation Team E</a:t>
+            </a:r>
+            <a:endParaRPr lang="de-DE"/>
+          </a:p>
+        </p:txBody>
+      </p:sp>
+      <p:sp>
+        <p:nvSpPr>
+          <p:cNvPr id="8" name="Foliennummernplatzhalter 7"/>
+          <p:cNvSpPr>
+            <a:spLocks noGrp="1"/>
+          </p:cNvSpPr>
+          <p:nvPr>
+            <p:ph type="sldNum" sz="quarter" idx="12"/>
+          </p:nvPr>
+        </p:nvSpPr>
+        <p:spPr/>
+        <p:txBody>
+          <a:bodyPr/>
+          <a:lstStyle/>
+          <a:p>
+            <a:fld id="{6C6AE60A-B69C-4790-82F7-3882EDF23186}" type="slidenum">
+              <a:rPr lang="de-DE" smtClean="0"/>
+              <a:t>43</a:t>
+            </a:fld>
+            <a:endParaRPr lang="de-DE"/>
+          </a:p>
+        </p:txBody>
+      </p:sp>
     </p:spTree>
     <p:extLst>
       <p:ext uri="{BB962C8B-B14F-4D97-AF65-F5344CB8AC3E}">
@@ -35716,6 +38115,75 @@
           </a:p>
         </p:txBody>
       </p:sp>
+      <p:sp>
+        <p:nvSpPr>
+          <p:cNvPr id="2" name="Datumsplatzhalter 1"/>
+          <p:cNvSpPr>
+            <a:spLocks noGrp="1"/>
+          </p:cNvSpPr>
+          <p:nvPr>
+            <p:ph type="dt" sz="half" idx="10"/>
+          </p:nvPr>
+        </p:nvSpPr>
+        <p:spPr/>
+        <p:txBody>
+          <a:bodyPr/>
+          <a:lstStyle/>
+          <a:p>
+            <a:fld id="{05172756-0226-4308-A019-94D0D0B5C6A8}" type="datetime1">
+              <a:rPr lang="de-DE" smtClean="0"/>
+              <a:t>12.06.2012</a:t>
+            </a:fld>
+            <a:endParaRPr lang="de-DE"/>
+          </a:p>
+        </p:txBody>
+      </p:sp>
+      <p:sp>
+        <p:nvSpPr>
+          <p:cNvPr id="3" name="Fußzeilenplatzhalter 2"/>
+          <p:cNvSpPr>
+            <a:spLocks noGrp="1"/>
+          </p:cNvSpPr>
+          <p:nvPr>
+            <p:ph type="ftr" sz="quarter" idx="11"/>
+          </p:nvPr>
+        </p:nvSpPr>
+        <p:spPr/>
+        <p:txBody>
+          <a:bodyPr/>
+          <a:lstStyle/>
+          <a:p>
+            <a:r>
+              <a:rPr lang="de-DE" smtClean="0"/>
+              <a:t>Roomanizer Presentation Team E</a:t>
+            </a:r>
+            <a:endParaRPr lang="de-DE"/>
+          </a:p>
+        </p:txBody>
+      </p:sp>
+      <p:sp>
+        <p:nvSpPr>
+          <p:cNvPr id="4" name="Foliennummernplatzhalter 3"/>
+          <p:cNvSpPr>
+            <a:spLocks noGrp="1"/>
+          </p:cNvSpPr>
+          <p:nvPr>
+            <p:ph type="sldNum" sz="quarter" idx="12"/>
+          </p:nvPr>
+        </p:nvSpPr>
+        <p:spPr/>
+        <p:txBody>
+          <a:bodyPr/>
+          <a:lstStyle/>
+          <a:p>
+            <a:fld id="{6C6AE60A-B69C-4790-82F7-3882EDF23186}" type="slidenum">
+              <a:rPr lang="de-DE" smtClean="0"/>
+              <a:t>44</a:t>
+            </a:fld>
+            <a:endParaRPr lang="de-DE"/>
+          </a:p>
+        </p:txBody>
+      </p:sp>
     </p:spTree>
     <p:extLst>
       <p:ext uri="{BB962C8B-B14F-4D97-AF65-F5344CB8AC3E}">
@@ -36154,6 +38622,75 @@
           </a:p>
         </p:txBody>
       </p:sp>
+      <p:sp>
+        <p:nvSpPr>
+          <p:cNvPr id="2" name="Datumsplatzhalter 1"/>
+          <p:cNvSpPr>
+            <a:spLocks noGrp="1"/>
+          </p:cNvSpPr>
+          <p:nvPr>
+            <p:ph type="dt" sz="half" idx="10"/>
+          </p:nvPr>
+        </p:nvSpPr>
+        <p:spPr/>
+        <p:txBody>
+          <a:bodyPr/>
+          <a:lstStyle/>
+          <a:p>
+            <a:fld id="{4591495F-AEED-4690-BA29-3D289964C644}" type="datetime1">
+              <a:rPr lang="de-DE" smtClean="0"/>
+              <a:t>12.06.2012</a:t>
+            </a:fld>
+            <a:endParaRPr lang="de-DE"/>
+          </a:p>
+        </p:txBody>
+      </p:sp>
+      <p:sp>
+        <p:nvSpPr>
+          <p:cNvPr id="3" name="Fußzeilenplatzhalter 2"/>
+          <p:cNvSpPr>
+            <a:spLocks noGrp="1"/>
+          </p:cNvSpPr>
+          <p:nvPr>
+            <p:ph type="ftr" sz="quarter" idx="11"/>
+          </p:nvPr>
+        </p:nvSpPr>
+        <p:spPr/>
+        <p:txBody>
+          <a:bodyPr/>
+          <a:lstStyle/>
+          <a:p>
+            <a:r>
+              <a:rPr lang="de-DE" smtClean="0"/>
+              <a:t>Roomanizer Presentation Team E</a:t>
+            </a:r>
+            <a:endParaRPr lang="de-DE"/>
+          </a:p>
+        </p:txBody>
+      </p:sp>
+      <p:sp>
+        <p:nvSpPr>
+          <p:cNvPr id="4" name="Foliennummernplatzhalter 3"/>
+          <p:cNvSpPr>
+            <a:spLocks noGrp="1"/>
+          </p:cNvSpPr>
+          <p:nvPr>
+            <p:ph type="sldNum" sz="quarter" idx="12"/>
+          </p:nvPr>
+        </p:nvSpPr>
+        <p:spPr/>
+        <p:txBody>
+          <a:bodyPr/>
+          <a:lstStyle/>
+          <a:p>
+            <a:fld id="{6C6AE60A-B69C-4790-82F7-3882EDF23186}" type="slidenum">
+              <a:rPr lang="de-DE" smtClean="0"/>
+              <a:t>45</a:t>
+            </a:fld>
+            <a:endParaRPr lang="de-DE"/>
+          </a:p>
+        </p:txBody>
+      </p:sp>
     </p:spTree>
     <p:extLst>
       <p:ext uri="{BB962C8B-B14F-4D97-AF65-F5344CB8AC3E}">
@@ -36259,6 +38796,75 @@
           <a:lstStyle/>
           <a:p>
             <a:endParaRPr lang="en-GB"/>
+          </a:p>
+        </p:txBody>
+      </p:sp>
+      <p:sp>
+        <p:nvSpPr>
+          <p:cNvPr id="4" name="Datumsplatzhalter 3"/>
+          <p:cNvSpPr>
+            <a:spLocks noGrp="1"/>
+          </p:cNvSpPr>
+          <p:nvPr>
+            <p:ph type="dt" sz="half" idx="10"/>
+          </p:nvPr>
+        </p:nvSpPr>
+        <p:spPr/>
+        <p:txBody>
+          <a:bodyPr/>
+          <a:lstStyle/>
+          <a:p>
+            <a:fld id="{501ACBA1-8DB4-4629-B6BF-1C1931F98289}" type="datetime1">
+              <a:rPr lang="de-DE" smtClean="0"/>
+              <a:t>12.06.2012</a:t>
+            </a:fld>
+            <a:endParaRPr lang="de-DE"/>
+          </a:p>
+        </p:txBody>
+      </p:sp>
+      <p:sp>
+        <p:nvSpPr>
+          <p:cNvPr id="5" name="Fußzeilenplatzhalter 4"/>
+          <p:cNvSpPr>
+            <a:spLocks noGrp="1"/>
+          </p:cNvSpPr>
+          <p:nvPr>
+            <p:ph type="ftr" sz="quarter" idx="11"/>
+          </p:nvPr>
+        </p:nvSpPr>
+        <p:spPr/>
+        <p:txBody>
+          <a:bodyPr/>
+          <a:lstStyle/>
+          <a:p>
+            <a:r>
+              <a:rPr lang="de-DE" smtClean="0"/>
+              <a:t>Roomanizer Presentation Team E</a:t>
+            </a:r>
+            <a:endParaRPr lang="de-DE"/>
+          </a:p>
+        </p:txBody>
+      </p:sp>
+      <p:sp>
+        <p:nvSpPr>
+          <p:cNvPr id="6" name="Foliennummernplatzhalter 5"/>
+          <p:cNvSpPr>
+            <a:spLocks noGrp="1"/>
+          </p:cNvSpPr>
+          <p:nvPr>
+            <p:ph type="sldNum" sz="quarter" idx="12"/>
+          </p:nvPr>
+        </p:nvSpPr>
+        <p:spPr/>
+        <p:txBody>
+          <a:bodyPr/>
+          <a:lstStyle/>
+          <a:p>
+            <a:fld id="{6C6AE60A-B69C-4790-82F7-3882EDF23186}" type="slidenum">
+              <a:rPr lang="de-DE" smtClean="0"/>
+              <a:t>46</a:t>
+            </a:fld>
+            <a:endParaRPr lang="de-DE"/>
           </a:p>
         </p:txBody>
       </p:sp>
@@ -36774,6 +39380,75 @@
           </a:p>
         </p:txBody>
       </p:sp>
+      <p:sp>
+        <p:nvSpPr>
+          <p:cNvPr id="2" name="Datumsplatzhalter 1"/>
+          <p:cNvSpPr>
+            <a:spLocks noGrp="1"/>
+          </p:cNvSpPr>
+          <p:nvPr>
+            <p:ph type="dt" sz="half" idx="10"/>
+          </p:nvPr>
+        </p:nvSpPr>
+        <p:spPr/>
+        <p:txBody>
+          <a:bodyPr/>
+          <a:lstStyle/>
+          <a:p>
+            <a:fld id="{D116B5E9-7BEA-4E84-BB7C-300578A8E023}" type="datetime1">
+              <a:rPr lang="de-DE" smtClean="0"/>
+              <a:t>12.06.2012</a:t>
+            </a:fld>
+            <a:endParaRPr lang="de-DE"/>
+          </a:p>
+        </p:txBody>
+      </p:sp>
+      <p:sp>
+        <p:nvSpPr>
+          <p:cNvPr id="3" name="Fußzeilenplatzhalter 2"/>
+          <p:cNvSpPr>
+            <a:spLocks noGrp="1"/>
+          </p:cNvSpPr>
+          <p:nvPr>
+            <p:ph type="ftr" sz="quarter" idx="11"/>
+          </p:nvPr>
+        </p:nvSpPr>
+        <p:spPr/>
+        <p:txBody>
+          <a:bodyPr/>
+          <a:lstStyle/>
+          <a:p>
+            <a:r>
+              <a:rPr lang="de-DE" smtClean="0"/>
+              <a:t>Roomanizer Presentation Team E</a:t>
+            </a:r>
+            <a:endParaRPr lang="de-DE"/>
+          </a:p>
+        </p:txBody>
+      </p:sp>
+      <p:sp>
+        <p:nvSpPr>
+          <p:cNvPr id="4" name="Foliennummernplatzhalter 3"/>
+          <p:cNvSpPr>
+            <a:spLocks noGrp="1"/>
+          </p:cNvSpPr>
+          <p:nvPr>
+            <p:ph type="sldNum" sz="quarter" idx="12"/>
+          </p:nvPr>
+        </p:nvSpPr>
+        <p:spPr/>
+        <p:txBody>
+          <a:bodyPr/>
+          <a:lstStyle/>
+          <a:p>
+            <a:fld id="{6C6AE60A-B69C-4790-82F7-3882EDF23186}" type="slidenum">
+              <a:rPr lang="de-DE" smtClean="0"/>
+              <a:t>5</a:t>
+            </a:fld>
+            <a:endParaRPr lang="de-DE"/>
+          </a:p>
+        </p:txBody>
+      </p:sp>
     </p:spTree>
     <p:extLst>
       <p:ext uri="{BB962C8B-B14F-4D97-AF65-F5344CB8AC3E}">
@@ -36935,6 +39610,75 @@
           </a:p>
         </p:txBody>
       </p:sp>
+      <p:sp>
+        <p:nvSpPr>
+          <p:cNvPr id="2" name="Datumsplatzhalter 1"/>
+          <p:cNvSpPr>
+            <a:spLocks noGrp="1"/>
+          </p:cNvSpPr>
+          <p:nvPr>
+            <p:ph type="dt" sz="half" idx="10"/>
+          </p:nvPr>
+        </p:nvSpPr>
+        <p:spPr/>
+        <p:txBody>
+          <a:bodyPr/>
+          <a:lstStyle/>
+          <a:p>
+            <a:fld id="{BC5E42FE-7B7B-4D74-A6E5-72AA4D0658EE}" type="datetime1">
+              <a:rPr lang="de-DE" smtClean="0"/>
+              <a:t>12.06.2012</a:t>
+            </a:fld>
+            <a:endParaRPr lang="de-DE"/>
+          </a:p>
+        </p:txBody>
+      </p:sp>
+      <p:sp>
+        <p:nvSpPr>
+          <p:cNvPr id="3" name="Fußzeilenplatzhalter 2"/>
+          <p:cNvSpPr>
+            <a:spLocks noGrp="1"/>
+          </p:cNvSpPr>
+          <p:nvPr>
+            <p:ph type="ftr" sz="quarter" idx="11"/>
+          </p:nvPr>
+        </p:nvSpPr>
+        <p:spPr/>
+        <p:txBody>
+          <a:bodyPr/>
+          <a:lstStyle/>
+          <a:p>
+            <a:r>
+              <a:rPr lang="de-DE" smtClean="0"/>
+              <a:t>Roomanizer Presentation Team E</a:t>
+            </a:r>
+            <a:endParaRPr lang="de-DE"/>
+          </a:p>
+        </p:txBody>
+      </p:sp>
+      <p:sp>
+        <p:nvSpPr>
+          <p:cNvPr id="4" name="Foliennummernplatzhalter 3"/>
+          <p:cNvSpPr>
+            <a:spLocks noGrp="1"/>
+          </p:cNvSpPr>
+          <p:nvPr>
+            <p:ph type="sldNum" sz="quarter" idx="12"/>
+          </p:nvPr>
+        </p:nvSpPr>
+        <p:spPr/>
+        <p:txBody>
+          <a:bodyPr/>
+          <a:lstStyle/>
+          <a:p>
+            <a:fld id="{6C6AE60A-B69C-4790-82F7-3882EDF23186}" type="slidenum">
+              <a:rPr lang="de-DE" smtClean="0"/>
+              <a:t>6</a:t>
+            </a:fld>
+            <a:endParaRPr lang="de-DE"/>
+          </a:p>
+        </p:txBody>
+      </p:sp>
     </p:spTree>
     <p:extLst>
       <p:ext uri="{BB962C8B-B14F-4D97-AF65-F5344CB8AC3E}">
@@ -37101,10 +39845,11 @@
             <a:pPr>
               <a:defRPr/>
             </a:pPr>
-            <a:r>
-              <a:rPr lang="de-AT"/>
-              <a:t>10.06.2012</a:t>
-            </a:r>
+            <a:fld id="{31463B31-E093-4DC5-94BA-5E51E0F53BC4}" type="datetime1">
+              <a:rPr lang="de-DE" smtClean="0"/>
+              <a:t>12.06.2012</a:t>
+            </a:fld>
+            <a:endParaRPr lang="de-AT"/>
           </a:p>
         </p:txBody>
       </p:sp>
@@ -37434,6 +40179,52 @@
           </a:p>
         </p:txBody>
       </p:sp>
+      <p:sp>
+        <p:nvSpPr>
+          <p:cNvPr id="2" name="Fußzeilenplatzhalter 1"/>
+          <p:cNvSpPr>
+            <a:spLocks noGrp="1"/>
+          </p:cNvSpPr>
+          <p:nvPr>
+            <p:ph type="ftr" sz="quarter" idx="11"/>
+          </p:nvPr>
+        </p:nvSpPr>
+        <p:spPr/>
+        <p:txBody>
+          <a:bodyPr/>
+          <a:lstStyle/>
+          <a:p>
+            <a:r>
+              <a:rPr lang="de-DE" smtClean="0"/>
+              <a:t>Roomanizer Presentation Team E</a:t>
+            </a:r>
+            <a:endParaRPr lang="de-DE"/>
+          </a:p>
+        </p:txBody>
+      </p:sp>
+      <p:sp>
+        <p:nvSpPr>
+          <p:cNvPr id="5" name="Foliennummernplatzhalter 4"/>
+          <p:cNvSpPr>
+            <a:spLocks noGrp="1"/>
+          </p:cNvSpPr>
+          <p:nvPr>
+            <p:ph type="sldNum" sz="quarter" idx="12"/>
+          </p:nvPr>
+        </p:nvSpPr>
+        <p:spPr/>
+        <p:txBody>
+          <a:bodyPr/>
+          <a:lstStyle/>
+          <a:p>
+            <a:fld id="{6C6AE60A-B69C-4790-82F7-3882EDF23186}" type="slidenum">
+              <a:rPr lang="de-DE" smtClean="0"/>
+              <a:t>7</a:t>
+            </a:fld>
+            <a:endParaRPr lang="de-DE"/>
+          </a:p>
+        </p:txBody>
+      </p:sp>
     </p:spTree>
     <p:extLst>
       <p:ext uri="{BB962C8B-B14F-4D97-AF65-F5344CB8AC3E}">
@@ -37552,10 +40343,11 @@
             <a:pPr>
               <a:defRPr/>
             </a:pPr>
-            <a:r>
-              <a:rPr lang="de-AT"/>
-              <a:t>10.06.2012</a:t>
-            </a:r>
+            <a:fld id="{7759553B-B3E1-46BC-8DF3-E2E2469BC615}" type="datetime1">
+              <a:rPr lang="de-DE" smtClean="0"/>
+              <a:t>12.06.2012</a:t>
+            </a:fld>
+            <a:endParaRPr lang="de-AT"/>
           </a:p>
         </p:txBody>
       </p:sp>
@@ -37905,6 +40697,52 @@
           </a:p>
         </p:txBody>
       </p:sp>
+      <p:sp>
+        <p:nvSpPr>
+          <p:cNvPr id="2" name="Fußzeilenplatzhalter 1"/>
+          <p:cNvSpPr>
+            <a:spLocks noGrp="1"/>
+          </p:cNvSpPr>
+          <p:nvPr>
+            <p:ph type="ftr" sz="quarter" idx="11"/>
+          </p:nvPr>
+        </p:nvSpPr>
+        <p:spPr/>
+        <p:txBody>
+          <a:bodyPr/>
+          <a:lstStyle/>
+          <a:p>
+            <a:r>
+              <a:rPr lang="de-DE" smtClean="0"/>
+              <a:t>Roomanizer Presentation Team E</a:t>
+            </a:r>
+            <a:endParaRPr lang="de-DE"/>
+          </a:p>
+        </p:txBody>
+      </p:sp>
+      <p:sp>
+        <p:nvSpPr>
+          <p:cNvPr id="5" name="Foliennummernplatzhalter 4"/>
+          <p:cNvSpPr>
+            <a:spLocks noGrp="1"/>
+          </p:cNvSpPr>
+          <p:nvPr>
+            <p:ph type="sldNum" sz="quarter" idx="12"/>
+          </p:nvPr>
+        </p:nvSpPr>
+        <p:spPr/>
+        <p:txBody>
+          <a:bodyPr/>
+          <a:lstStyle/>
+          <a:p>
+            <a:fld id="{6C6AE60A-B69C-4790-82F7-3882EDF23186}" type="slidenum">
+              <a:rPr lang="de-DE" smtClean="0"/>
+              <a:t>8</a:t>
+            </a:fld>
+            <a:endParaRPr lang="de-DE"/>
+          </a:p>
+        </p:txBody>
+      </p:sp>
     </p:spTree>
     <p:extLst>
       <p:ext uri="{BB962C8B-B14F-4D97-AF65-F5344CB8AC3E}">
@@ -37991,11 +40829,57 @@
             <a:pPr>
               <a:defRPr/>
             </a:pPr>
-            <a:r>
-              <a:rPr lang="de-AT" smtClean="0"/>
-              <a:t>10.06.2012</a:t>
-            </a:r>
+            <a:fld id="{DB0973A2-9C39-496C-A7CC-A57B4EC1B554}" type="datetime1">
+              <a:rPr lang="de-DE" smtClean="0"/>
+              <a:t>12.06.2012</a:t>
+            </a:fld>
             <a:endParaRPr lang="de-AT"/>
+          </a:p>
+        </p:txBody>
+      </p:sp>
+      <p:sp>
+        <p:nvSpPr>
+          <p:cNvPr id="2" name="Fußzeilenplatzhalter 1"/>
+          <p:cNvSpPr>
+            <a:spLocks noGrp="1"/>
+          </p:cNvSpPr>
+          <p:nvPr>
+            <p:ph type="ftr" sz="quarter" idx="11"/>
+          </p:nvPr>
+        </p:nvSpPr>
+        <p:spPr/>
+        <p:txBody>
+          <a:bodyPr/>
+          <a:lstStyle/>
+          <a:p>
+            <a:r>
+              <a:rPr lang="de-DE" smtClean="0"/>
+              <a:t>Roomanizer Presentation Team E</a:t>
+            </a:r>
+            <a:endParaRPr lang="de-DE"/>
+          </a:p>
+        </p:txBody>
+      </p:sp>
+      <p:sp>
+        <p:nvSpPr>
+          <p:cNvPr id="3" name="Foliennummernplatzhalter 2"/>
+          <p:cNvSpPr>
+            <a:spLocks noGrp="1"/>
+          </p:cNvSpPr>
+          <p:nvPr>
+            <p:ph type="sldNum" sz="quarter" idx="12"/>
+          </p:nvPr>
+        </p:nvSpPr>
+        <p:spPr/>
+        <p:txBody>
+          <a:bodyPr/>
+          <a:lstStyle/>
+          <a:p>
+            <a:fld id="{6C6AE60A-B69C-4790-82F7-3882EDF23186}" type="slidenum">
+              <a:rPr lang="de-DE" smtClean="0"/>
+              <a:t>9</a:t>
+            </a:fld>
+            <a:endParaRPr lang="de-DE"/>
           </a:p>
         </p:txBody>
       </p:sp>

</xml_diff>

<commit_message>
teil von markus hinzugefügt
</commit_message>
<xml_diff>
--- a/Documentation/Praesentation/PresentationRoomanizer.pptx
+++ b/Documentation/Praesentation/PresentationRoomanizer.pptx
@@ -1106,240 +1106,6 @@
       <dsp:cNvGrpSpPr/>
     </dsp:nvGrpSpPr>
     <dsp:grpSpPr/>
-    <dsp:sp modelId="{4A9CE6FA-2F6A-40B6-843E-7BD8B0065E1F}">
-      <dsp:nvSpPr>
-        <dsp:cNvPr id="0" name=""/>
-        <dsp:cNvSpPr/>
-      </dsp:nvSpPr>
-      <dsp:spPr>
-        <a:xfrm>
-          <a:off x="2006260" y="613697"/>
-          <a:ext cx="1492540" cy="1164645"/>
-        </a:xfrm>
-        <a:prstGeom prst="rect">
-          <a:avLst/>
-        </a:prstGeom>
-        <a:noFill/>
-        <a:ln>
-          <a:noFill/>
-        </a:ln>
-        <a:effectLst/>
-      </dsp:spPr>
-      <dsp:style>
-        <a:lnRef idx="0">
-          <a:scrgbClr r="0" g="0" b="0"/>
-        </a:lnRef>
-        <a:fillRef idx="0">
-          <a:scrgbClr r="0" g="0" b="0"/>
-        </a:fillRef>
-        <a:effectRef idx="0">
-          <a:scrgbClr r="0" g="0" b="0"/>
-        </a:effectRef>
-        <a:fontRef idx="minor"/>
-      </dsp:style>
-      <dsp:txBody>
-        <a:bodyPr spcFirstLastPara="0" vert="horz" wrap="square" lIns="36830" tIns="36830" rIns="36830" bIns="36830" numCol="1" spcCol="1270" anchor="ctr" anchorCtr="0">
-          <a:noAutofit/>
-        </a:bodyPr>
-        <a:lstStyle/>
-        <a:p>
-          <a:pPr lvl="0" algn="ctr" defTabSz="1289050">
-            <a:lnSpc>
-              <a:spcPct val="90000"/>
-            </a:lnSpc>
-            <a:spcBef>
-              <a:spcPct val="0"/>
-            </a:spcBef>
-            <a:spcAft>
-              <a:spcPct val="35000"/>
-            </a:spcAft>
-          </a:pPr>
-          <a:r>
-            <a:rPr lang="de-AT" sz="2900" kern="1200" dirty="0" err="1" smtClean="0"/>
-            <a:t>Invoice</a:t>
-          </a:r>
-          <a:r>
-            <a:rPr lang="de-AT" sz="2900" kern="1200" dirty="0" smtClean="0"/>
-            <a:t> Item</a:t>
-          </a:r>
-          <a:endParaRPr lang="de-AT" sz="2900" kern="1200" dirty="0"/>
-        </a:p>
-      </dsp:txBody>
-      <dsp:txXfrm>
-        <a:off x="2006260" y="613697"/>
-        <a:ext cx="1492540" cy="1164645"/>
-      </dsp:txXfrm>
-    </dsp:sp>
-    <dsp:sp modelId="{0A944668-9E45-4271-BB3D-61EA8936D182}">
-      <dsp:nvSpPr>
-        <dsp:cNvPr id="0" name=""/>
-        <dsp:cNvSpPr/>
-      </dsp:nvSpPr>
-      <dsp:spPr>
-        <a:xfrm>
-          <a:off x="605571" y="-475"/>
-          <a:ext cx="2392990" cy="2392990"/>
-        </a:xfrm>
-        <a:prstGeom prst="circularArrow">
-          <a:avLst>
-            <a:gd name="adj1" fmla="val 9490"/>
-            <a:gd name="adj2" fmla="val 685655"/>
-            <a:gd name="adj3" fmla="val 7847366"/>
-            <a:gd name="adj4" fmla="val 2266979"/>
-            <a:gd name="adj5" fmla="val 11072"/>
-          </a:avLst>
-        </a:prstGeom>
-        <a:solidFill>
-          <a:schemeClr val="accent1">
-            <a:hueOff val="0"/>
-            <a:satOff val="0"/>
-            <a:lumOff val="0"/>
-            <a:alphaOff val="0"/>
-          </a:schemeClr>
-        </a:solidFill>
-        <a:ln w="25400" cap="rnd" cmpd="sng" algn="ctr">
-          <a:solidFill>
-            <a:schemeClr val="lt1">
-              <a:hueOff val="0"/>
-              <a:satOff val="0"/>
-              <a:lumOff val="0"/>
-              <a:alphaOff val="0"/>
-            </a:schemeClr>
-          </a:solidFill>
-          <a:prstDash val="solid"/>
-        </a:ln>
-        <a:effectLst/>
-      </dsp:spPr>
-      <dsp:style>
-        <a:lnRef idx="2">
-          <a:scrgbClr r="0" g="0" b="0"/>
-        </a:lnRef>
-        <a:fillRef idx="1">
-          <a:scrgbClr r="0" g="0" b="0"/>
-        </a:fillRef>
-        <a:effectRef idx="0">
-          <a:scrgbClr r="0" g="0" b="0"/>
-        </a:effectRef>
-        <a:fontRef idx="minor">
-          <a:schemeClr val="lt1"/>
-        </a:fontRef>
-      </dsp:style>
-    </dsp:sp>
-    <dsp:sp modelId="{2F8F08C6-8C6D-457F-BD8C-A4D9AF3E7475}">
-      <dsp:nvSpPr>
-        <dsp:cNvPr id="0" name=""/>
-        <dsp:cNvSpPr/>
-      </dsp:nvSpPr>
-      <dsp:spPr>
-        <a:xfrm>
-          <a:off x="269279" y="613697"/>
-          <a:ext cx="1164645" cy="1164645"/>
-        </a:xfrm>
-        <a:prstGeom prst="rect">
-          <a:avLst/>
-        </a:prstGeom>
-        <a:noFill/>
-        <a:ln>
-          <a:noFill/>
-        </a:ln>
-        <a:effectLst/>
-      </dsp:spPr>
-      <dsp:style>
-        <a:lnRef idx="0">
-          <a:scrgbClr r="0" g="0" b="0"/>
-        </a:lnRef>
-        <a:fillRef idx="0">
-          <a:scrgbClr r="0" g="0" b="0"/>
-        </a:fillRef>
-        <a:effectRef idx="0">
-          <a:scrgbClr r="0" g="0" b="0"/>
-        </a:effectRef>
-        <a:fontRef idx="minor"/>
-      </dsp:style>
-      <dsp:txBody>
-        <a:bodyPr spcFirstLastPara="0" vert="horz" wrap="square" lIns="36830" tIns="36830" rIns="36830" bIns="36830" numCol="1" spcCol="1270" anchor="ctr" anchorCtr="0">
-          <a:noAutofit/>
-        </a:bodyPr>
-        <a:lstStyle/>
-        <a:p>
-          <a:pPr lvl="0" algn="ctr" defTabSz="1289050">
-            <a:lnSpc>
-              <a:spcPct val="90000"/>
-            </a:lnSpc>
-            <a:spcBef>
-              <a:spcPct val="0"/>
-            </a:spcBef>
-            <a:spcAft>
-              <a:spcPct val="35000"/>
-            </a:spcAft>
-          </a:pPr>
-          <a:r>
-            <a:rPr lang="de-AT" sz="2900" kern="1200" dirty="0" err="1" smtClean="0"/>
-            <a:t>Invoice</a:t>
-          </a:r>
-          <a:endParaRPr lang="de-AT" sz="2900" kern="1200" dirty="0"/>
-        </a:p>
-      </dsp:txBody>
-      <dsp:txXfrm>
-        <a:off x="269279" y="613697"/>
-        <a:ext cx="1164645" cy="1164645"/>
-      </dsp:txXfrm>
-    </dsp:sp>
-    <dsp:sp modelId="{9CFF976A-BD0C-45E9-BD17-26232B64DC87}">
-      <dsp:nvSpPr>
-        <dsp:cNvPr id="0" name=""/>
-        <dsp:cNvSpPr/>
-      </dsp:nvSpPr>
-      <dsp:spPr>
-        <a:xfrm>
-          <a:off x="605571" y="-475"/>
-          <a:ext cx="2392990" cy="2392990"/>
-        </a:xfrm>
-        <a:prstGeom prst="circularArrow">
-          <a:avLst>
-            <a:gd name="adj1" fmla="val 9490"/>
-            <a:gd name="adj2" fmla="val 685655"/>
-            <a:gd name="adj3" fmla="val 18647366"/>
-            <a:gd name="adj4" fmla="val 13066979"/>
-            <a:gd name="adj5" fmla="val 11072"/>
-          </a:avLst>
-        </a:prstGeom>
-        <a:solidFill>
-          <a:schemeClr val="accent1">
-            <a:hueOff val="0"/>
-            <a:satOff val="0"/>
-            <a:lumOff val="0"/>
-            <a:alphaOff val="0"/>
-          </a:schemeClr>
-        </a:solidFill>
-        <a:ln w="25400" cap="rnd" cmpd="sng" algn="ctr">
-          <a:solidFill>
-            <a:schemeClr val="lt1">
-              <a:hueOff val="0"/>
-              <a:satOff val="0"/>
-              <a:lumOff val="0"/>
-              <a:alphaOff val="0"/>
-            </a:schemeClr>
-          </a:solidFill>
-          <a:prstDash val="solid"/>
-        </a:ln>
-        <a:effectLst/>
-      </dsp:spPr>
-      <dsp:style>
-        <a:lnRef idx="2">
-          <a:scrgbClr r="0" g="0" b="0"/>
-        </a:lnRef>
-        <a:fillRef idx="1">
-          <a:scrgbClr r="0" g="0" b="0"/>
-        </a:fillRef>
-        <a:effectRef idx="0">
-          <a:scrgbClr r="0" g="0" b="0"/>
-        </a:effectRef>
-        <a:fontRef idx="minor">
-          <a:schemeClr val="lt1"/>
-        </a:fontRef>
-      </dsp:style>
-    </dsp:sp>
   </dsp:spTree>
 </dsp:drawing>
 </file>
@@ -26255,11 +26021,80 @@
           </a:p>
         </p:txBody>
       </p:sp>
+      <p:sp>
+        <p:nvSpPr>
+          <p:cNvPr id="2" name="Datumsplatzhalter 1"/>
+          <p:cNvSpPr>
+            <a:spLocks noGrp="1"/>
+          </p:cNvSpPr>
+          <p:nvPr>
+            <p:ph type="dt" sz="half" idx="10"/>
+          </p:nvPr>
+        </p:nvSpPr>
+        <p:spPr/>
+        <p:txBody>
+          <a:bodyPr/>
+          <a:lstStyle/>
+          <a:p>
+            <a:fld id="{4603DE6C-2766-453F-9D69-BEFC378EA777}" type="datetime1">
+              <a:rPr lang="de-DE" smtClean="0"/>
+              <a:t>12.06.2012</a:t>
+            </a:fld>
+            <a:endParaRPr lang="de-DE"/>
+          </a:p>
+        </p:txBody>
+      </p:sp>
+      <p:sp>
+        <p:nvSpPr>
+          <p:cNvPr id="3" name="Fußzeilenplatzhalter 2"/>
+          <p:cNvSpPr>
+            <a:spLocks noGrp="1"/>
+          </p:cNvSpPr>
+          <p:nvPr>
+            <p:ph type="ftr" sz="quarter" idx="11"/>
+          </p:nvPr>
+        </p:nvSpPr>
+        <p:spPr/>
+        <p:txBody>
+          <a:bodyPr/>
+          <a:lstStyle/>
+          <a:p>
+            <a:r>
+              <a:rPr lang="de-DE" smtClean="0"/>
+              <a:t>Roomanizer Presentation Team E</a:t>
+            </a:r>
+            <a:endParaRPr lang="de-DE"/>
+          </a:p>
+        </p:txBody>
+      </p:sp>
+      <p:sp>
+        <p:nvSpPr>
+          <p:cNvPr id="4" name="Foliennummernplatzhalter 3"/>
+          <p:cNvSpPr>
+            <a:spLocks noGrp="1"/>
+          </p:cNvSpPr>
+          <p:nvPr>
+            <p:ph type="sldNum" sz="quarter" idx="12"/>
+          </p:nvPr>
+        </p:nvSpPr>
+        <p:spPr/>
+        <p:txBody>
+          <a:bodyPr/>
+          <a:lstStyle/>
+          <a:p>
+            <a:fld id="{6C6AE60A-B69C-4790-82F7-3882EDF23186}" type="slidenum">
+              <a:rPr lang="de-DE" smtClean="0"/>
+              <a:t>18</a:t>
+            </a:fld>
+            <a:endParaRPr lang="de-DE"/>
+          </a:p>
+        </p:txBody>
+      </p:sp>
       <p:pic>
         <p:nvPicPr>
-          <p:cNvPr id="59394" name="Picture 2"/>
+          <p:cNvPr id="7" name="Bild 2" descr="Package_diagram-1.jpg"/>
           <p:cNvPicPr>
-            <a:picLocks noChangeAspect="1" noChangeArrowheads="1"/>
+            <a:picLocks noChangeAspect="1"/>
           </p:cNvPicPr>
           <p:nvPr/>
         </p:nvPicPr>
@@ -26275,122 +26110,16 @@
             <a:fillRect/>
           </a:stretch>
         </p:blipFill>
-        <p:spPr bwMode="auto">
+        <p:spPr>
           <a:xfrm>
-            <a:off x="1961743" y="1468954"/>
-            <a:ext cx="5409154" cy="5224869"/>
+            <a:off x="0" y="1468912"/>
+            <a:ext cx="9144000" cy="4768400"/>
           </a:xfrm>
           <a:prstGeom prst="rect">
             <a:avLst/>
           </a:prstGeom>
-          <a:noFill/>
-          <a:ln>
-            <a:noFill/>
-          </a:ln>
-          <a:effectLst/>
-          <a:extLst>
-            <a:ext uri="{909E8E84-426E-40DD-AFC4-6F175D3DCCD1}">
-              <a14:hiddenFill xmlns:a14="http://schemas.microsoft.com/office/drawing/2010/main">
-                <a:blipFill dpi="0" rotWithShape="0">
-                  <a:blip/>
-                  <a:srcRect/>
-                  <a:stretch>
-                    <a:fillRect/>
-                  </a:stretch>
-                </a:blipFill>
-              </a14:hiddenFill>
-            </a:ext>
-            <a:ext uri="{91240B29-F687-4F45-9708-019B960494DF}">
-              <a14:hiddenLine xmlns:a14="http://schemas.microsoft.com/office/drawing/2010/main" w="9525">
-                <a:solidFill>
-                  <a:srgbClr val="000000"/>
-                </a:solidFill>
-                <a:round/>
-                <a:headEnd/>
-                <a:tailEnd/>
-              </a14:hiddenLine>
-            </a:ext>
-            <a:ext uri="{AF507438-7753-43E0-B8FC-AC1667EBCBE1}">
-              <a14:hiddenEffects xmlns:a14="http://schemas.microsoft.com/office/drawing/2010/main">
-                <a:effectLst>
-                  <a:outerShdw dist="35921" dir="2700000" algn="ctr" rotWithShape="0">
-                    <a:srgbClr val="808080"/>
-                  </a:outerShdw>
-                </a:effectLst>
-              </a14:hiddenEffects>
-            </a:ext>
-          </a:extLst>
         </p:spPr>
       </p:pic>
-      <p:sp>
-        <p:nvSpPr>
-          <p:cNvPr id="2" name="Datumsplatzhalter 1"/>
-          <p:cNvSpPr>
-            <a:spLocks noGrp="1"/>
-          </p:cNvSpPr>
-          <p:nvPr>
-            <p:ph type="dt" sz="half" idx="10"/>
-          </p:nvPr>
-        </p:nvSpPr>
-        <p:spPr/>
-        <p:txBody>
-          <a:bodyPr/>
-          <a:lstStyle/>
-          <a:p>
-            <a:fld id="{4603DE6C-2766-453F-9D69-BEFC378EA777}" type="datetime1">
-              <a:rPr lang="de-DE" smtClean="0"/>
-              <a:t>12.06.2012</a:t>
-            </a:fld>
-            <a:endParaRPr lang="de-DE"/>
-          </a:p>
-        </p:txBody>
-      </p:sp>
-      <p:sp>
-        <p:nvSpPr>
-          <p:cNvPr id="3" name="Fußzeilenplatzhalter 2"/>
-          <p:cNvSpPr>
-            <a:spLocks noGrp="1"/>
-          </p:cNvSpPr>
-          <p:nvPr>
-            <p:ph type="ftr" sz="quarter" idx="11"/>
-          </p:nvPr>
-        </p:nvSpPr>
-        <p:spPr/>
-        <p:txBody>
-          <a:bodyPr/>
-          <a:lstStyle/>
-          <a:p>
-            <a:r>
-              <a:rPr lang="de-DE" smtClean="0"/>
-              <a:t>Roomanizer Presentation Team E</a:t>
-            </a:r>
-            <a:endParaRPr lang="de-DE"/>
-          </a:p>
-        </p:txBody>
-      </p:sp>
-      <p:sp>
-        <p:nvSpPr>
-          <p:cNvPr id="4" name="Foliennummernplatzhalter 3"/>
-          <p:cNvSpPr>
-            <a:spLocks noGrp="1"/>
-          </p:cNvSpPr>
-          <p:nvPr>
-            <p:ph type="sldNum" sz="quarter" idx="12"/>
-          </p:nvPr>
-        </p:nvSpPr>
-        <p:spPr/>
-        <p:txBody>
-          <a:bodyPr/>
-          <a:lstStyle/>
-          <a:p>
-            <a:fld id="{6C6AE60A-B69C-4790-82F7-3882EDF23186}" type="slidenum">
-              <a:rPr lang="de-DE" smtClean="0"/>
-              <a:t>18</a:t>
-            </a:fld>
-            <a:endParaRPr lang="de-DE"/>
-          </a:p>
-        </p:txBody>
-      </p:sp>
     </p:spTree>
     <p:extLst>
       <p:ext uri="{BB962C8B-B14F-4D97-AF65-F5344CB8AC3E}">

</xml_diff>

<commit_message>
Documentation mit bildern Meine Notizen
</commit_message>
<xml_diff>
--- a/Documentation/Praesentation/PresentationRoomanizer.pptx
+++ b/Documentation/Praesentation/PresentationRoomanizer.pptx
@@ -15300,68 +15300,6 @@
             <a:pPr marL="0" indent="0">
               <a:buNone/>
             </a:pPr>
-            <a:r>
-              <a:rPr lang="en-US" dirty="0" smtClean="0"/>
-              <a:t>JSF makes it easy to designate Java code that is invoked when forms are submitted. The code can respond to particular buttons, changes in particular values, certain user selections, and so on.</a:t>
-            </a:r>
-          </a:p>
-          <a:p>
-            <a:pPr marL="0" indent="0">
-              <a:buNone/>
-            </a:pPr>
-            <a:endParaRPr lang="en-US" dirty="0" smtClean="0"/>
-          </a:p>
-          <a:p>
-            <a:pPr marL="0" marR="0" indent="0" algn="l" defTabSz="914400" rtl="0" eaLnBrk="1" fontAlgn="auto" latinLnBrk="0" hangingPunct="1">
-              <a:lnSpc>
-                <a:spcPct val="100000"/>
-              </a:lnSpc>
-              <a:spcBef>
-                <a:spcPts val="0"/>
-              </a:spcBef>
-              <a:spcAft>
-                <a:spcPts val="0"/>
-              </a:spcAft>
-              <a:buClrTx/>
-              <a:buSzTx/>
-              <a:buFontTx/>
-              <a:buNone/>
-              <a:tabLst/>
-              <a:defRPr/>
-            </a:pPr>
-            <a:r>
-              <a:rPr lang="en-US" dirty="0" smtClean="0"/>
-              <a:t>In JSP, you can use property="*" with </a:t>
-            </a:r>
-            <a:r>
-              <a:rPr lang="en-US" dirty="0" err="1" smtClean="0"/>
-              <a:t>jsp:setProperty</a:t>
-            </a:r>
-            <a:r>
-              <a:rPr lang="en-US" dirty="0" smtClean="0"/>
-              <a:t> to automatically populate a bean based on request parameters. JSF extends this capability and adds in several utilities, all of which serve to greatly simplify request </a:t>
-            </a:r>
-            <a:r>
-              <a:rPr lang="de-AT" dirty="0" err="1" smtClean="0"/>
-              <a:t>param</a:t>
-            </a:r>
-            <a:r>
-              <a:rPr lang="de-AT" dirty="0" smtClean="0"/>
-              <a:t> </a:t>
-            </a:r>
-            <a:r>
-              <a:rPr lang="de-AT" dirty="0" err="1" smtClean="0"/>
-              <a:t>processing</a:t>
-            </a:r>
-            <a:r>
-              <a:rPr lang="de-AT" dirty="0" smtClean="0"/>
-              <a:t>.</a:t>
-            </a:r>
-          </a:p>
-          <a:p>
-            <a:pPr marL="0" indent="0">
-              <a:buNone/>
-            </a:pPr>
             <a:endParaRPr lang="en-US" dirty="0" smtClean="0"/>
           </a:p>
         </p:txBody>
@@ -15446,6 +15384,13 @@
           <a:bodyPr/>
           <a:lstStyle/>
           <a:p>
+            <a:r>
+              <a:rPr lang="de-AT" dirty="0" smtClean="0"/>
+              <a:t>	</a:t>
+            </a:r>
+            <a:endParaRPr lang="de-AT" dirty="0" smtClean="0"/>
+          </a:p>
+          <a:p>
             <a:pPr marL="0" marR="0" indent="0" algn="l" defTabSz="914400" rtl="0" eaLnBrk="1" fontAlgn="auto" latinLnBrk="0" hangingPunct="1">
               <a:lnSpc>
                 <a:spcPct val="100000"/>
@@ -15465,40 +15410,6 @@
             </a:pPr>
             <a:r>
               <a:rPr lang="en-US" dirty="0" smtClean="0"/>
-              <a:t>You can use </a:t>
-            </a:r>
-            <a:r>
-              <a:rPr lang="en-US" dirty="0" err="1" smtClean="0"/>
-              <a:t>jQuery</a:t>
-            </a:r>
-            <a:r>
-              <a:rPr lang="en-US" dirty="0" smtClean="0"/>
-              <a:t>, Dojo, or Ext-JS with servlets and JSP. However, JSF lets you use Ajax without explicit JavaScript programming and with very simple tags. Also, the Ajax calls know about the server-side business logic.</a:t>
-            </a:r>
-          </a:p>
-          <a:p>
-            <a:endParaRPr lang="de-AT" dirty="0" smtClean="0"/>
-          </a:p>
-          <a:p>
-            <a:pPr marL="0" marR="0" indent="0" algn="l" defTabSz="914400" rtl="0" eaLnBrk="1" fontAlgn="auto" latinLnBrk="0" hangingPunct="1">
-              <a:lnSpc>
-                <a:spcPct val="100000"/>
-              </a:lnSpc>
-              <a:spcBef>
-                <a:spcPts val="0"/>
-              </a:spcBef>
-              <a:spcAft>
-                <a:spcPts val="0"/>
-              </a:spcAft>
-              <a:buClrTx/>
-              <a:buSzTx/>
-              <a:buFontTx/>
-              <a:buNone/>
-              <a:tabLst/>
-              <a:defRPr/>
-            </a:pPr>
-            <a:r>
-              <a:rPr lang="en-US" dirty="0" smtClean="0"/>
               <a:t>JSF has built-in capabilities for checking that form values are in the required format and for converting from strings to various other data types. </a:t>
             </a:r>
             <a:br>
@@ -15529,12 +15440,12 @@
               <a:t>maintained</a:t>
             </a:r>
             <a:r>
-              <a:rPr lang="de-AT" smtClean="0"/>
+              <a:rPr lang="de-AT" dirty="0" smtClean="0"/>
               <a:t>.</a:t>
             </a:r>
           </a:p>
           <a:p>
-            <a:endParaRPr lang="de-AT"/>
+            <a:endParaRPr lang="de-AT" dirty="0"/>
           </a:p>
         </p:txBody>
       </p:sp>
@@ -16751,11 +16662,7 @@
             </a:r>
             <a:r>
               <a:rPr lang="de-AT" baseline="0" dirty="0" smtClean="0"/>
-              <a:t> </a:t>
-            </a:r>
-            <a:r>
-              <a:rPr lang="de-AT" baseline="0" dirty="0" smtClean="0"/>
-              <a:t>Abläufe</a:t>
+              <a:t> Abläufe</a:t>
             </a:r>
           </a:p>
           <a:p>

</xml_diff>

<commit_message>
presentation after test 1
</commit_message>
<xml_diff>
--- a/Documentation/Praesentation/PresentationRoomanizer.pptx
+++ b/Documentation/Praesentation/PresentationRoomanizer.pptx
@@ -12,9 +12,9 @@
     <p:sldId id="257" r:id="rId3"/>
     <p:sldId id="286" r:id="rId4"/>
     <p:sldId id="346" r:id="rId5"/>
-    <p:sldId id="348" r:id="rId6"/>
-    <p:sldId id="333" r:id="rId7"/>
-    <p:sldId id="345" r:id="rId8"/>
+    <p:sldId id="333" r:id="rId6"/>
+    <p:sldId id="345" r:id="rId7"/>
+    <p:sldId id="348" r:id="rId8"/>
     <p:sldId id="323" r:id="rId9"/>
     <p:sldId id="329" r:id="rId10"/>
     <p:sldId id="332" r:id="rId11"/>
@@ -25,8 +25,8 @@
     <p:sldId id="338" r:id="rId16"/>
     <p:sldId id="339" r:id="rId17"/>
     <p:sldId id="340" r:id="rId18"/>
-    <p:sldId id="341" r:id="rId19"/>
-    <p:sldId id="342" r:id="rId20"/>
+    <p:sldId id="342" r:id="rId19"/>
+    <p:sldId id="341" r:id="rId20"/>
     <p:sldId id="343" r:id="rId21"/>
     <p:sldId id="357" r:id="rId22"/>
     <p:sldId id="358" r:id="rId23"/>
@@ -4763,7 +4763,7 @@
           <a:p>
             <a:fld id="{3980AEB2-C199-9048-A2B7-7DA9A47AD0EB}" type="slidenum">
               <a:rPr lang="de-DE" smtClean="0"/>
-              <a:t>19</a:t>
+              <a:t>18</a:t>
             </a:fld>
             <a:endParaRPr lang="de-DE"/>
           </a:p>
@@ -15900,7 +15900,7 @@
                 <a:latin typeface="Times New Roman" pitchFamily="16" charset="0"/>
               </a:rPr>
               <a:pPr eaLnBrk="1"/>
-              <a:t>6</a:t>
+              <a:t>5</a:t>
             </a:fld>
             <a:endParaRPr lang="de-AT" smtClean="0">
               <a:solidFill>
@@ -16223,7 +16223,7 @@
                 <a:latin typeface="Times New Roman" pitchFamily="16" charset="0"/>
               </a:rPr>
               <a:pPr eaLnBrk="1"/>
-              <a:t>7</a:t>
+              <a:t>6</a:t>
             </a:fld>
             <a:endParaRPr lang="de-AT" smtClean="0">
               <a:solidFill>
@@ -22966,7 +22966,7 @@
       </p:sp>
       <p:pic>
         <p:nvPicPr>
-          <p:cNvPr id="3" name="Bild 2" descr="Package_diagram-1.jpg"/>
+          <p:cNvPr id="3" name="Bild 2"/>
           <p:cNvPicPr>
             <a:picLocks noChangeAspect="1"/>
           </p:cNvPicPr>
@@ -22986,8 +22986,8 @@
         </p:blipFill>
         <p:spPr>
           <a:xfrm>
-            <a:off x="0" y="1412776"/>
-            <a:ext cx="9144000" cy="4768400"/>
+            <a:off x="1515333" y="1412776"/>
+            <a:ext cx="6113333" cy="4768400"/>
           </a:xfrm>
           <a:prstGeom prst="rect">
             <a:avLst/>
@@ -23063,6 +23063,36 @@
           </a:p>
         </p:txBody>
       </p:sp>
+      <p:pic>
+        <p:nvPicPr>
+          <p:cNvPr id="6" name="Grafik 5"/>
+          <p:cNvPicPr>
+            <a:picLocks noChangeAspect="1"/>
+          </p:cNvPicPr>
+          <p:nvPr/>
+        </p:nvPicPr>
+        <p:blipFill>
+          <a:blip r:embed="rId4" cstate="print">
+            <a:extLst>
+              <a:ext uri="{28A0092B-C50C-407E-A947-70E740481C1C}">
+                <a14:useLocalDpi xmlns:a14="http://schemas.microsoft.com/office/drawing/2010/main" val="0"/>
+              </a:ext>
+            </a:extLst>
+          </a:blip>
+          <a:stretch>
+            <a:fillRect/>
+          </a:stretch>
+        </p:blipFill>
+        <p:spPr>
+          <a:xfrm>
+            <a:off x="5868145" y="1131270"/>
+            <a:ext cx="1872207" cy="1193073"/>
+          </a:xfrm>
+          <a:prstGeom prst="rect">
+            <a:avLst/>
+          </a:prstGeom>
+        </p:spPr>
+      </p:pic>
     </p:spTree>
     <p:extLst>
       <p:ext uri="{BB962C8B-B14F-4D97-AF65-F5344CB8AC3E}">
@@ -23080,7 +23110,101 @@
         <p:cTn id="1" dur="indefinite" restart="never" nodeType="tmRoot">
           <p:childTnLst>
             <p:seq concurrent="1" nextAc="seek">
-              <p:cTn id="2" dur="0" nodeType="mainSeq"/>
+              <p:cTn id="2" dur="0" nodeType="mainSeq">
+                <p:childTnLst>
+                  <p:par>
+                    <p:cTn id="3" fill="hold">
+                      <p:stCondLst>
+                        <p:cond delay="indefinite"/>
+                      </p:stCondLst>
+                      <p:childTnLst>
+                        <p:par>
+                          <p:cTn id="4" fill="hold">
+                            <p:stCondLst>
+                              <p:cond delay="0"/>
+                            </p:stCondLst>
+                            <p:childTnLst>
+                              <p:par>
+                                <p:cTn id="5" presetID="2" presetClass="entr" presetSubtype="4" fill="hold" nodeType="clickEffect">
+                                  <p:stCondLst>
+                                    <p:cond delay="0"/>
+                                  </p:stCondLst>
+                                  <p:childTnLst>
+                                    <p:set>
+                                      <p:cBhvr>
+                                        <p:cTn id="6" dur="1" fill="hold">
+                                          <p:stCondLst>
+                                            <p:cond delay="0"/>
+                                          </p:stCondLst>
+                                        </p:cTn>
+                                        <p:tgtEl>
+                                          <p:spTgt spid="6"/>
+                                        </p:tgtEl>
+                                        <p:attrNameLst>
+                                          <p:attrName>style.visibility</p:attrName>
+                                        </p:attrNameLst>
+                                      </p:cBhvr>
+                                      <p:to>
+                                        <p:strVal val="visible"/>
+                                      </p:to>
+                                    </p:set>
+                                    <p:anim calcmode="lin" valueType="num">
+                                      <p:cBhvr additive="base">
+                                        <p:cTn id="7" dur="500" fill="hold"/>
+                                        <p:tgtEl>
+                                          <p:spTgt spid="6"/>
+                                        </p:tgtEl>
+                                        <p:attrNameLst>
+                                          <p:attrName>ppt_x</p:attrName>
+                                        </p:attrNameLst>
+                                      </p:cBhvr>
+                                      <p:tavLst>
+                                        <p:tav tm="0">
+                                          <p:val>
+                                            <p:strVal val="#ppt_x"/>
+                                          </p:val>
+                                        </p:tav>
+                                        <p:tav tm="100000">
+                                          <p:val>
+                                            <p:strVal val="#ppt_x"/>
+                                          </p:val>
+                                        </p:tav>
+                                      </p:tavLst>
+                                    </p:anim>
+                                    <p:anim calcmode="lin" valueType="num">
+                                      <p:cBhvr additive="base">
+                                        <p:cTn id="8" dur="500" fill="hold"/>
+                                        <p:tgtEl>
+                                          <p:spTgt spid="6"/>
+                                        </p:tgtEl>
+                                        <p:attrNameLst>
+                                          <p:attrName>ppt_y</p:attrName>
+                                        </p:attrNameLst>
+                                      </p:cBhvr>
+                                      <p:tavLst>
+                                        <p:tav tm="0">
+                                          <p:val>
+                                            <p:strVal val="1+#ppt_h/2"/>
+                                          </p:val>
+                                        </p:tav>
+                                        <p:tav tm="100000">
+                                          <p:val>
+                                            <p:strVal val="#ppt_y"/>
+                                          </p:val>
+                                        </p:tav>
+                                      </p:tavLst>
+                                    </p:anim>
+                                  </p:childTnLst>
+                                </p:cTn>
+                              </p:par>
+                            </p:childTnLst>
+                          </p:cTn>
+                        </p:par>
+                      </p:childTnLst>
+                    </p:cTn>
+                  </p:par>
+                </p:childTnLst>
+              </p:cTn>
               <p:prevCondLst>
                 <p:cond evt="onPrev" delay="0">
                   <p:tgtEl>
@@ -23575,7 +23699,11 @@
             </a:r>
             <a:r>
               <a:rPr lang="de-DE" dirty="0" smtClean="0"/>
-              <a:t> a </a:t>
+              <a:t> </a:t>
+            </a:r>
+            <a:r>
+              <a:rPr lang="de-DE" dirty="0" smtClean="0"/>
+              <a:t>an </a:t>
             </a:r>
             <a:r>
               <a:rPr lang="de-DE" dirty="0" err="1" smtClean="0"/>
@@ -23642,7 +23770,15 @@
             </a:r>
             <a:r>
               <a:rPr lang="de-DE" dirty="0" smtClean="0"/>
-              <a:t> a </a:t>
+              <a:t> </a:t>
+            </a:r>
+            <a:r>
+              <a:rPr lang="de-DE" dirty="0" err="1" smtClean="0"/>
+              <a:t>the</a:t>
+            </a:r>
+            <a:r>
+              <a:rPr lang="de-DE" dirty="0" smtClean="0"/>
+              <a:t> </a:t>
             </a:r>
             <a:r>
               <a:rPr lang="de-DE" dirty="0" err="1" smtClean="0"/>
@@ -23810,25 +23946,61 @@
           <a:p>
             <a:r>
               <a:rPr lang="de-DE" dirty="0" smtClean="0"/>
-              <a:t>View</a:t>
+              <a:t>Controller</a:t>
             </a:r>
           </a:p>
           <a:p>
             <a:pPr lvl="1"/>
             <a:r>
               <a:rPr lang="de-DE" dirty="0" err="1" smtClean="0"/>
-              <a:t>Contains</a:t>
+              <a:t>For</a:t>
             </a:r>
             <a:r>
               <a:rPr lang="de-DE" dirty="0" smtClean="0"/>
-              <a:t> all </a:t>
+              <a:t> </a:t>
             </a:r>
             <a:r>
               <a:rPr lang="de-DE" dirty="0" err="1" smtClean="0"/>
-              <a:t>classes</a:t>
-            </a:r>
-            <a:r>
-              <a:rPr lang="de-DE" dirty="0"/>
+              <a:t>each</a:t>
+            </a:r>
+            <a:r>
+              <a:rPr lang="de-DE" dirty="0" smtClean="0"/>
+              <a:t> </a:t>
+            </a:r>
+            <a:r>
+              <a:rPr lang="de-DE" dirty="0" err="1" smtClean="0"/>
+              <a:t>use-case</a:t>
+            </a:r>
+            <a:r>
+              <a:rPr lang="de-DE" dirty="0" smtClean="0"/>
+              <a:t> </a:t>
+            </a:r>
+            <a:r>
+              <a:rPr lang="de-DE" dirty="0" err="1" smtClean="0"/>
+              <a:t>one</a:t>
+            </a:r>
+            <a:r>
+              <a:rPr lang="de-DE" dirty="0" smtClean="0"/>
+              <a:t> </a:t>
+            </a:r>
+            <a:r>
+              <a:rPr lang="de-DE" dirty="0" err="1" smtClean="0"/>
+              <a:t>controller</a:t>
+            </a:r>
+            <a:endParaRPr lang="de-DE" dirty="0" smtClean="0"/>
+          </a:p>
+          <a:p>
+            <a:pPr lvl="1"/>
+            <a:r>
+              <a:rPr lang="de-DE" dirty="0" smtClean="0"/>
+              <a:t>Controllers </a:t>
+            </a:r>
+            <a:r>
+              <a:rPr lang="de-DE" dirty="0" err="1" smtClean="0"/>
+              <a:t>implement</a:t>
+            </a:r>
+            <a:r>
+              <a:rPr lang="de-DE" dirty="0" smtClean="0"/>
               <a:t> </a:t>
             </a:r>
             <a:r>
@@ -23837,167 +24009,15 @@
             </a:r>
             <a:r>
               <a:rPr lang="de-DE" dirty="0" smtClean="0"/>
-              <a:t> GUI </a:t>
+              <a:t> </a:t>
             </a:r>
             <a:r>
               <a:rPr lang="de-DE" dirty="0" err="1" smtClean="0"/>
-              <a:t>uses</a:t>
-            </a:r>
-            <a:endParaRPr lang="de-DE" dirty="0" smtClean="0"/>
-          </a:p>
-          <a:p>
-            <a:pPr lvl="1"/>
+              <a:t>state</a:t>
+            </a:r>
             <a:r>
               <a:rPr lang="de-DE" dirty="0" smtClean="0"/>
-              <a:t>Also </a:t>
-            </a:r>
-            <a:r>
-              <a:rPr lang="de-DE" dirty="0" err="1" smtClean="0"/>
-              <a:t>containing</a:t>
-            </a:r>
-            <a:r>
-              <a:rPr lang="de-DE" dirty="0" smtClean="0"/>
-              <a:t> </a:t>
-            </a:r>
-            <a:r>
-              <a:rPr lang="de-DE" dirty="0" err="1" smtClean="0"/>
-              <a:t>interfaces</a:t>
-            </a:r>
-            <a:r>
-              <a:rPr lang="de-DE" dirty="0" smtClean="0"/>
-              <a:t> </a:t>
-            </a:r>
-            <a:r>
-              <a:rPr lang="de-DE" dirty="0" err="1" smtClean="0"/>
-              <a:t>to</a:t>
-            </a:r>
-            <a:r>
-              <a:rPr lang="de-DE" dirty="0" smtClean="0"/>
-              <a:t> </a:t>
-            </a:r>
-            <a:r>
-              <a:rPr lang="de-DE" dirty="0" err="1" smtClean="0"/>
-              <a:t>hand</a:t>
-            </a:r>
-            <a:r>
-              <a:rPr lang="de-DE" dirty="0" smtClean="0"/>
-              <a:t> </a:t>
-            </a:r>
-            <a:r>
-              <a:rPr lang="de-DE" dirty="0" err="1" smtClean="0"/>
-              <a:t>over</a:t>
-            </a:r>
-            <a:r>
-              <a:rPr lang="de-DE" dirty="0"/>
-              <a:t> </a:t>
-            </a:r>
-            <a:r>
-              <a:rPr lang="de-DE" dirty="0" err="1" smtClean="0"/>
-              <a:t>information</a:t>
-            </a:r>
-            <a:r>
-              <a:rPr lang="de-DE" dirty="0" smtClean="0"/>
-              <a:t> </a:t>
-            </a:r>
-            <a:r>
-              <a:rPr lang="de-DE" dirty="0" err="1" smtClean="0"/>
-              <a:t>to</a:t>
-            </a:r>
-            <a:r>
-              <a:rPr lang="de-DE" dirty="0" smtClean="0"/>
-              <a:t> </a:t>
-            </a:r>
-            <a:r>
-              <a:rPr lang="de-DE" dirty="0" err="1" smtClean="0"/>
-              <a:t>the</a:t>
-            </a:r>
-            <a:r>
-              <a:rPr lang="de-DE" dirty="0" smtClean="0"/>
-              <a:t> </a:t>
-            </a:r>
-            <a:r>
-              <a:rPr lang="de-DE" dirty="0" err="1" smtClean="0"/>
-              <a:t>model</a:t>
-            </a:r>
-            <a:r>
-              <a:rPr lang="de-DE" dirty="0" smtClean="0"/>
-              <a:t> </a:t>
-            </a:r>
-            <a:r>
-              <a:rPr lang="de-DE" dirty="0" err="1" smtClean="0"/>
-              <a:t>layer</a:t>
-            </a:r>
-            <a:r>
-              <a:rPr lang="de-DE" dirty="0" smtClean="0"/>
-              <a:t> </a:t>
-            </a:r>
-            <a:r>
-              <a:rPr lang="de-DE" dirty="0" err="1" smtClean="0"/>
-              <a:t>and</a:t>
-            </a:r>
-            <a:r>
-              <a:rPr lang="de-DE" dirty="0" smtClean="0"/>
-              <a:t> </a:t>
-            </a:r>
-            <a:r>
-              <a:rPr lang="de-DE" dirty="0" err="1" smtClean="0"/>
-              <a:t>the</a:t>
-            </a:r>
-            <a:r>
-              <a:rPr lang="de-DE" dirty="0" smtClean="0"/>
-              <a:t> </a:t>
-            </a:r>
-            <a:r>
-              <a:rPr lang="de-DE" dirty="0" err="1" smtClean="0"/>
-              <a:t>other</a:t>
-            </a:r>
-            <a:r>
-              <a:rPr lang="de-DE" dirty="0" smtClean="0"/>
-              <a:t> </a:t>
-            </a:r>
-            <a:r>
-              <a:rPr lang="de-DE" dirty="0" err="1" smtClean="0"/>
-              <a:t>way</a:t>
-            </a:r>
-            <a:r>
-              <a:rPr lang="de-DE" dirty="0" smtClean="0"/>
-              <a:t> </a:t>
-            </a:r>
-            <a:r>
-              <a:rPr lang="de-DE" dirty="0" err="1" smtClean="0"/>
-              <a:t>round</a:t>
-            </a:r>
-            <a:endParaRPr lang="de-DE" dirty="0" smtClean="0"/>
-          </a:p>
-          <a:p>
-            <a:pPr lvl="1"/>
-            <a:r>
-              <a:rPr lang="de-DE" dirty="0" err="1" smtClean="0"/>
-              <a:t>Specific</a:t>
-            </a:r>
-            <a:r>
-              <a:rPr lang="de-DE" dirty="0" smtClean="0"/>
-              <a:t> </a:t>
-            </a:r>
-            <a:r>
-              <a:rPr lang="de-DE" dirty="0" err="1" smtClean="0"/>
-              <a:t>controller</a:t>
-            </a:r>
-            <a:r>
-              <a:rPr lang="de-DE" dirty="0" smtClean="0"/>
-              <a:t> </a:t>
-            </a:r>
-            <a:r>
-              <a:rPr lang="de-DE" dirty="0" err="1" smtClean="0"/>
-              <a:t>for</a:t>
-            </a:r>
-            <a:r>
-              <a:rPr lang="de-DE" dirty="0" smtClean="0"/>
-              <a:t> GUI </a:t>
-            </a:r>
-            <a:r>
-              <a:rPr lang="de-DE" dirty="0" err="1" smtClean="0"/>
-              <a:t>operations</a:t>
+              <a:t>-pattern</a:t>
             </a:r>
             <a:endParaRPr lang="de-DE" dirty="0"/>
           </a:p>
@@ -24018,7 +24038,7 @@
           <a:bodyPr/>
           <a:lstStyle/>
           <a:p>
-            <a:fld id="{0994480E-65DE-4E27-A77D-3FC0824918DE}" type="datetime1">
+            <a:fld id="{90348C0C-C52A-41F1-A153-FFFC42D07549}" type="datetime1">
               <a:rPr lang="de-DE" smtClean="0"/>
               <a:t>12.06.2012</a:t>
             </a:fld>
@@ -24075,7 +24095,7 @@
     </p:spTree>
     <p:extLst>
       <p:ext uri="{BB962C8B-B14F-4D97-AF65-F5344CB8AC3E}">
-        <p14:creationId xmlns:p14="http://schemas.microsoft.com/office/powerpoint/2010/main" val="3623746361"/>
+        <p14:creationId xmlns:p14="http://schemas.microsoft.com/office/powerpoint/2010/main" val="2132579426"/>
       </p:ext>
     </p:extLst>
   </p:cSld>
@@ -24149,38 +24169,170 @@
           <a:p>
             <a:r>
               <a:rPr lang="de-DE" dirty="0" smtClean="0"/>
-              <a:t>Controller</a:t>
+              <a:t>View</a:t>
             </a:r>
           </a:p>
           <a:p>
             <a:pPr lvl="1"/>
             <a:r>
               <a:rPr lang="de-DE" dirty="0" err="1" smtClean="0"/>
-              <a:t>For</a:t>
+              <a:t>Contains</a:t>
             </a:r>
             <a:r>
               <a:rPr lang="de-DE" dirty="0" smtClean="0"/>
-              <a:t> </a:t>
+              <a:t> all </a:t>
             </a:r>
             <a:r>
               <a:rPr lang="de-DE" dirty="0" err="1" smtClean="0"/>
-              <a:t>each</a:t>
+              <a:t>classes</a:t>
+            </a:r>
+            <a:r>
+              <a:rPr lang="de-DE" dirty="0"/>
+              <a:t> </a:t>
+            </a:r>
+            <a:r>
+              <a:rPr lang="de-DE" dirty="0" err="1" smtClean="0"/>
+              <a:t>the</a:t>
             </a:r>
             <a:r>
               <a:rPr lang="de-DE" dirty="0" smtClean="0"/>
-              <a:t> </a:t>
+              <a:t> GUI </a:t>
             </a:r>
             <a:r>
               <a:rPr lang="de-DE" dirty="0" err="1" smtClean="0"/>
-              <a:t>use-case</a:t>
-            </a:r>
+              <a:t>uses</a:t>
+            </a:r>
+            <a:endParaRPr lang="de-DE" dirty="0" smtClean="0"/>
+          </a:p>
+          <a:p>
+            <a:pPr lvl="1"/>
             <a:r>
               <a:rPr lang="de-DE" dirty="0" smtClean="0"/>
-              <a:t> </a:t>
+              <a:t>Also </a:t>
             </a:r>
             <a:r>
               <a:rPr lang="de-DE" dirty="0" err="1" smtClean="0"/>
-              <a:t>one</a:t>
+              <a:t>containing</a:t>
+            </a:r>
+            <a:r>
+              <a:rPr lang="de-DE" dirty="0" smtClean="0"/>
+              <a:t> </a:t>
+            </a:r>
+            <a:r>
+              <a:rPr lang="de-DE" dirty="0" err="1" smtClean="0"/>
+              <a:t>interfaces</a:t>
+            </a:r>
+            <a:r>
+              <a:rPr lang="de-DE" dirty="0" smtClean="0"/>
+              <a:t> </a:t>
+            </a:r>
+            <a:r>
+              <a:rPr lang="de-DE" dirty="0" err="1" smtClean="0"/>
+              <a:t>to</a:t>
+            </a:r>
+            <a:r>
+              <a:rPr lang="de-DE" dirty="0" smtClean="0"/>
+              <a:t> </a:t>
+            </a:r>
+            <a:r>
+              <a:rPr lang="de-DE" dirty="0" err="1" smtClean="0"/>
+              <a:t>hand</a:t>
+            </a:r>
+            <a:r>
+              <a:rPr lang="de-DE" dirty="0" smtClean="0"/>
+              <a:t> </a:t>
+            </a:r>
+            <a:r>
+              <a:rPr lang="de-DE" dirty="0" err="1" smtClean="0"/>
+              <a:t>over</a:t>
+            </a:r>
+            <a:r>
+              <a:rPr lang="de-DE" dirty="0"/>
+              <a:t> </a:t>
+            </a:r>
+            <a:r>
+              <a:rPr lang="de-DE" dirty="0" err="1" smtClean="0"/>
+              <a:t>information</a:t>
+            </a:r>
+            <a:r>
+              <a:rPr lang="de-DE" dirty="0" smtClean="0"/>
+              <a:t> </a:t>
+            </a:r>
+            <a:r>
+              <a:rPr lang="de-DE" dirty="0" err="1" smtClean="0"/>
+              <a:t>to</a:t>
+            </a:r>
+            <a:r>
+              <a:rPr lang="de-DE" dirty="0" smtClean="0"/>
+              <a:t> </a:t>
+            </a:r>
+            <a:r>
+              <a:rPr lang="de-DE" dirty="0" err="1" smtClean="0"/>
+              <a:t>the</a:t>
+            </a:r>
+            <a:r>
+              <a:rPr lang="de-DE" dirty="0" smtClean="0"/>
+              <a:t> </a:t>
+            </a:r>
+            <a:r>
+              <a:rPr lang="de-DE" dirty="0" err="1" smtClean="0"/>
+              <a:t>model</a:t>
+            </a:r>
+            <a:r>
+              <a:rPr lang="de-DE" dirty="0" smtClean="0"/>
+              <a:t> </a:t>
+            </a:r>
+            <a:r>
+              <a:rPr lang="de-DE" dirty="0" err="1" smtClean="0"/>
+              <a:t>layer</a:t>
+            </a:r>
+            <a:r>
+              <a:rPr lang="de-DE" dirty="0" smtClean="0"/>
+              <a:t> </a:t>
+            </a:r>
+            <a:r>
+              <a:rPr lang="de-DE" dirty="0" err="1" smtClean="0"/>
+              <a:t>and</a:t>
+            </a:r>
+            <a:r>
+              <a:rPr lang="de-DE" dirty="0" smtClean="0"/>
+              <a:t> </a:t>
+            </a:r>
+            <a:r>
+              <a:rPr lang="de-DE" dirty="0" err="1" smtClean="0"/>
+              <a:t>the</a:t>
+            </a:r>
+            <a:r>
+              <a:rPr lang="de-DE" dirty="0" smtClean="0"/>
+              <a:t> </a:t>
+            </a:r>
+            <a:r>
+              <a:rPr lang="de-DE" dirty="0" err="1" smtClean="0"/>
+              <a:t>other</a:t>
+            </a:r>
+            <a:r>
+              <a:rPr lang="de-DE" dirty="0" smtClean="0"/>
+              <a:t> </a:t>
+            </a:r>
+            <a:r>
+              <a:rPr lang="de-DE" dirty="0" err="1" smtClean="0"/>
+              <a:t>way</a:t>
+            </a:r>
+            <a:r>
+              <a:rPr lang="de-DE" dirty="0" smtClean="0"/>
+              <a:t> </a:t>
+            </a:r>
+            <a:r>
+              <a:rPr lang="de-DE" dirty="0" err="1" smtClean="0"/>
+              <a:t>round</a:t>
+            </a:r>
+            <a:endParaRPr lang="de-DE" dirty="0" smtClean="0"/>
+          </a:p>
+          <a:p>
+            <a:pPr lvl="1"/>
+            <a:r>
+              <a:rPr lang="de-DE" dirty="0" err="1" smtClean="0"/>
+              <a:t>Specific</a:t>
             </a:r>
             <a:r>
               <a:rPr lang="de-DE" dirty="0" smtClean="0"/>
@@ -24190,37 +24342,21 @@
               <a:rPr lang="de-DE" dirty="0" err="1" smtClean="0"/>
               <a:t>controller</a:t>
             </a:r>
-            <a:endParaRPr lang="de-DE" dirty="0" smtClean="0"/>
-          </a:p>
-          <a:p>
-            <a:pPr lvl="1"/>
             <a:r>
               <a:rPr lang="de-DE" dirty="0" smtClean="0"/>
-              <a:t>Controllers </a:t>
+              <a:t> </a:t>
             </a:r>
             <a:r>
               <a:rPr lang="de-DE" dirty="0" err="1" smtClean="0"/>
-              <a:t>implement</a:t>
+              <a:t>for</a:t>
             </a:r>
             <a:r>
               <a:rPr lang="de-DE" dirty="0" smtClean="0"/>
-              <a:t> </a:t>
+              <a:t> GUI </a:t>
             </a:r>
             <a:r>
               <a:rPr lang="de-DE" dirty="0" err="1" smtClean="0"/>
-              <a:t>the</a:t>
-            </a:r>
-            <a:r>
-              <a:rPr lang="de-DE" dirty="0" smtClean="0"/>
-              <a:t> </a:t>
-            </a:r>
-            <a:r>
-              <a:rPr lang="de-DE" dirty="0" err="1" smtClean="0"/>
-              <a:t>state</a:t>
-            </a:r>
-            <a:r>
-              <a:rPr lang="de-DE" dirty="0" smtClean="0"/>
-              <a:t>-pattern</a:t>
+              <a:t>operations</a:t>
             </a:r>
             <a:endParaRPr lang="de-DE" dirty="0"/>
           </a:p>
@@ -24241,7 +24377,7 @@
           <a:bodyPr/>
           <a:lstStyle/>
           <a:p>
-            <a:fld id="{90348C0C-C52A-41F1-A153-FFFC42D07549}" type="datetime1">
+            <a:fld id="{0994480E-65DE-4E27-A77D-3FC0824918DE}" type="datetime1">
               <a:rPr lang="de-DE" smtClean="0"/>
               <a:t>12.06.2012</a:t>
             </a:fld>
@@ -24298,7 +24434,7 @@
     </p:spTree>
     <p:extLst>
       <p:ext uri="{BB962C8B-B14F-4D97-AF65-F5344CB8AC3E}">
-        <p14:creationId xmlns:p14="http://schemas.microsoft.com/office/powerpoint/2010/main" val="2132579426"/>
+        <p14:creationId xmlns:p14="http://schemas.microsoft.com/office/powerpoint/2010/main" val="3623746361"/>
       </p:ext>
     </p:extLst>
   </p:cSld>
@@ -24368,7 +24504,7 @@
         <p:spPr/>
         <p:txBody>
           <a:bodyPr>
-            <a:normAutofit fontScale="77500" lnSpcReduction="20000"/>
+            <a:normAutofit fontScale="92500" lnSpcReduction="10000"/>
           </a:bodyPr>
           <a:lstStyle/>
           <a:p>
@@ -24416,18 +24552,6 @@
             <a:r>
               <a:rPr lang="de-AT" sz="4500" dirty="0" smtClean="0"/>
               <a:t>Outlook</a:t>
-            </a:r>
-          </a:p>
-          <a:p>
-            <a:r>
-              <a:rPr lang="de-AT" sz="4500" dirty="0" smtClean="0"/>
-              <a:t>Summary</a:t>
-            </a:r>
-          </a:p>
-          <a:p>
-            <a:r>
-              <a:rPr lang="de-AT" sz="4500" dirty="0" smtClean="0"/>
-              <a:t>End</a:t>
             </a:r>
           </a:p>
           <a:p>
@@ -27373,7 +27497,11 @@
           <a:p>
             <a:r>
               <a:rPr lang="de-AT" dirty="0" smtClean="0"/>
-              <a:t>Tobis Meusburger</a:t>
+              <a:t>Tobias </a:t>
+            </a:r>
+            <a:r>
+              <a:rPr lang="de-AT" dirty="0" smtClean="0"/>
+              <a:t>Meusburger</a:t>
             </a:r>
           </a:p>
           <a:p>
@@ -32017,7 +32145,15 @@
           <a:p>
             <a:r>
               <a:rPr lang="de-AT" dirty="0" smtClean="0"/>
-              <a:t>JSF</a:t>
+              <a:t>Java Server </a:t>
+            </a:r>
+            <a:r>
+              <a:rPr lang="de-AT" dirty="0" err="1" smtClean="0"/>
+              <a:t>Faces</a:t>
+            </a:r>
+            <a:r>
+              <a:rPr lang="de-AT" dirty="0" smtClean="0"/>
+              <a:t> (JSF)</a:t>
             </a:r>
             <a:endParaRPr lang="de-AT" dirty="0"/>
           </a:p>
@@ -32677,8 +32813,17 @@
           <a:p>
             <a:r>
               <a:rPr lang="de-AT" dirty="0" smtClean="0"/>
-              <a:t>Hotelsoftware</a:t>
-            </a:r>
+              <a:t>Hotelsoftware „</a:t>
+            </a:r>
+            <a:r>
+              <a:rPr lang="de-AT" dirty="0" err="1" smtClean="0"/>
+              <a:t>Roomanizer</a:t>
+            </a:r>
+            <a:r>
+              <a:rPr lang="de-AT" dirty="0" smtClean="0"/>
+              <a:t>“</a:t>
+            </a:r>
+            <a:endParaRPr lang="de-AT" dirty="0" smtClean="0"/>
           </a:p>
           <a:p>
             <a:pPr lvl="1"/>
@@ -33070,7 +33215,7 @@
           </p:cNvPicPr>
           <p:nvPr/>
         </p:nvPicPr>
-        <p:blipFill>
+        <p:blipFill rotWithShape="1">
           <a:blip r:embed="rId3">
             <a:extLst>
               <a:ext uri="{28A0092B-C50C-407E-A947-70E740481C1C}">
@@ -33079,9 +33224,7 @@
             </a:extLst>
           </a:blip>
           <a:srcRect/>
-          <a:stretch>
-            <a:fillRect/>
-          </a:stretch>
+          <a:stretch/>
         </p:blipFill>
         <p:spPr bwMode="auto">
           <a:xfrm>
@@ -34573,7 +34716,7 @@
         <p:spPr/>
         <p:txBody>
           <a:bodyPr>
-            <a:normAutofit lnSpcReduction="10000"/>
+            <a:normAutofit/>
           </a:bodyPr>
           <a:lstStyle/>
           <a:p>
@@ -34673,23 +34816,9 @@
           </a:p>
           <a:p>
             <a:r>
-              <a:rPr lang="de-AT" dirty="0"/>
+              <a:rPr lang="de-AT" dirty="0" smtClean="0"/>
               <a:t>Outlook</a:t>
             </a:r>
-          </a:p>
-          <a:p>
-            <a:r>
-              <a:rPr lang="de-AT" dirty="0"/>
-              <a:t>Summary</a:t>
-            </a:r>
-          </a:p>
-          <a:p>
-            <a:r>
-              <a:rPr lang="de-AT" dirty="0"/>
-              <a:t>End</a:t>
-            </a:r>
-          </a:p>
-          <a:p>
             <a:endParaRPr lang="en-GB" dirty="0"/>
           </a:p>
         </p:txBody>
@@ -34924,9 +35053,14 @@
               </a:tabLst>
             </a:pPr>
             <a:r>
-              <a:rPr lang="de-DE" sz="1800" dirty="0"/>
-              <a:t>PSP</a:t>
-            </a:r>
+              <a:rPr lang="de-DE" sz="1800" dirty="0" smtClean="0"/>
+              <a:t>Work Breakdown </a:t>
+            </a:r>
+            <a:r>
+              <a:rPr lang="de-DE" sz="1800" dirty="0" err="1" smtClean="0"/>
+              <a:t>Structure</a:t>
+            </a:r>
+            <a:endParaRPr lang="de-DE" sz="1800" dirty="0"/>
           </a:p>
           <a:p>
             <a:pPr marL="431800" indent="-323850">
@@ -35119,7 +35253,7 @@
         </p:blipFill>
         <p:spPr>
           <a:xfrm>
-            <a:off x="575493" y="1196752"/>
+            <a:off x="683568" y="1415091"/>
             <a:ext cx="7740923" cy="5389976"/>
           </a:xfrm>
           <a:prstGeom prst="rect">
@@ -35149,7 +35283,7 @@
         </p:blipFill>
         <p:spPr>
           <a:xfrm>
-            <a:off x="323528" y="1412776"/>
+            <a:off x="654698" y="1415091"/>
             <a:ext cx="8424936" cy="4982489"/>
           </a:xfrm>
           <a:prstGeom prst="rect">
@@ -35179,7 +35313,7 @@
         </p:blipFill>
         <p:spPr>
           <a:xfrm>
-            <a:off x="230594" y="1342972"/>
+            <a:off x="683568" y="1436610"/>
             <a:ext cx="8013814" cy="4390284"/>
           </a:xfrm>
           <a:prstGeom prst="rect">
@@ -35209,7 +35343,7 @@
         </p:blipFill>
         <p:spPr>
           <a:xfrm>
-            <a:off x="539552" y="1455812"/>
+            <a:off x="395536" y="1436610"/>
             <a:ext cx="7534952" cy="4939453"/>
           </a:xfrm>
           <a:prstGeom prst="rect">
@@ -39738,205 +39872,6 @@
       </p:grpSpPr>
       <p:sp>
         <p:nvSpPr>
-          <p:cNvPr id="2" name="Titel 1"/>
-          <p:cNvSpPr>
-            <a:spLocks noGrp="1"/>
-          </p:cNvSpPr>
-          <p:nvPr>
-            <p:ph type="title"/>
-          </p:nvPr>
-        </p:nvSpPr>
-        <p:spPr/>
-        <p:txBody>
-          <a:bodyPr/>
-          <a:lstStyle/>
-          <a:p>
-            <a:r>
-              <a:rPr lang="de-AT" dirty="0" smtClean="0"/>
-              <a:t>Customer </a:t>
-            </a:r>
-            <a:r>
-              <a:rPr lang="de-AT" dirty="0" err="1" smtClean="0"/>
-              <a:t>presenation</a:t>
-            </a:r>
-            <a:endParaRPr lang="en-GB" dirty="0"/>
-          </a:p>
-        </p:txBody>
-      </p:sp>
-      <p:sp>
-        <p:nvSpPr>
-          <p:cNvPr id="3" name="Inhaltsplatzhalter 2"/>
-          <p:cNvSpPr>
-            <a:spLocks noGrp="1"/>
-          </p:cNvSpPr>
-          <p:nvPr>
-            <p:ph idx="1"/>
-          </p:nvPr>
-        </p:nvSpPr>
-        <p:spPr/>
-        <p:txBody>
-          <a:bodyPr/>
-          <a:lstStyle/>
-          <a:p>
-            <a:pPr marL="457200" indent="-457200"/>
-            <a:r>
-              <a:rPr lang="de-AT" dirty="0"/>
-              <a:t>Demonstration </a:t>
-            </a:r>
-            <a:r>
-              <a:rPr lang="de-AT" dirty="0" err="1"/>
-              <a:t>of</a:t>
-            </a:r>
-            <a:r>
-              <a:rPr lang="de-AT" dirty="0"/>
-              <a:t> </a:t>
-            </a:r>
-            <a:r>
-              <a:rPr lang="de-AT" dirty="0" err="1"/>
-              <a:t>the</a:t>
-            </a:r>
-            <a:r>
-              <a:rPr lang="de-AT" dirty="0"/>
-              <a:t> </a:t>
-            </a:r>
-            <a:r>
-              <a:rPr lang="de-AT" dirty="0" err="1"/>
-              <a:t>program</a:t>
-            </a:r>
-            <a:endParaRPr lang="de-AT" dirty="0"/>
-          </a:p>
-          <a:p>
-            <a:pPr marL="457200" indent="-457200"/>
-            <a:r>
-              <a:rPr lang="de-AT" dirty="0" err="1"/>
-              <a:t>Screencast</a:t>
-            </a:r>
-            <a:endParaRPr lang="de-AT" dirty="0"/>
-          </a:p>
-          <a:p>
-            <a:pPr marL="457200" indent="-457200"/>
-            <a:r>
-              <a:rPr lang="de-AT" dirty="0" smtClean="0"/>
-              <a:t>Summary</a:t>
-            </a:r>
-            <a:endParaRPr lang="de-AT" dirty="0"/>
-          </a:p>
-          <a:p>
-            <a:pPr marL="0" indent="0">
-              <a:buNone/>
-            </a:pPr>
-            <a:endParaRPr lang="en-GB" dirty="0"/>
-          </a:p>
-        </p:txBody>
-      </p:sp>
-      <p:sp>
-        <p:nvSpPr>
-          <p:cNvPr id="4" name="Datumsplatzhalter 3"/>
-          <p:cNvSpPr>
-            <a:spLocks noGrp="1"/>
-          </p:cNvSpPr>
-          <p:nvPr>
-            <p:ph type="dt" sz="half" idx="10"/>
-          </p:nvPr>
-        </p:nvSpPr>
-        <p:spPr/>
-        <p:txBody>
-          <a:bodyPr/>
-          <a:lstStyle/>
-          <a:p>
-            <a:fld id="{281C52AE-42A8-4426-ADA6-159E569D9194}" type="datetime1">
-              <a:rPr lang="de-DE" smtClean="0"/>
-              <a:t>12.06.2012</a:t>
-            </a:fld>
-            <a:endParaRPr lang="de-DE"/>
-          </a:p>
-        </p:txBody>
-      </p:sp>
-      <p:sp>
-        <p:nvSpPr>
-          <p:cNvPr id="5" name="Fußzeilenplatzhalter 4"/>
-          <p:cNvSpPr>
-            <a:spLocks noGrp="1"/>
-          </p:cNvSpPr>
-          <p:nvPr>
-            <p:ph type="ftr" sz="quarter" idx="11"/>
-          </p:nvPr>
-        </p:nvSpPr>
-        <p:spPr/>
-        <p:txBody>
-          <a:bodyPr/>
-          <a:lstStyle/>
-          <a:p>
-            <a:r>
-              <a:rPr lang="de-DE" smtClean="0"/>
-              <a:t>Roomanizer Presentation Team E</a:t>
-            </a:r>
-            <a:endParaRPr lang="de-DE"/>
-          </a:p>
-        </p:txBody>
-      </p:sp>
-      <p:sp>
-        <p:nvSpPr>
-          <p:cNvPr id="6" name="Foliennummernplatzhalter 5"/>
-          <p:cNvSpPr>
-            <a:spLocks noGrp="1"/>
-          </p:cNvSpPr>
-          <p:nvPr>
-            <p:ph type="sldNum" sz="quarter" idx="12"/>
-          </p:nvPr>
-        </p:nvSpPr>
-        <p:spPr/>
-        <p:txBody>
-          <a:bodyPr/>
-          <a:lstStyle/>
-          <a:p>
-            <a:fld id="{6C6AE60A-B69C-4790-82F7-3882EDF23186}" type="slidenum">
-              <a:rPr lang="de-DE" smtClean="0"/>
-              <a:t>5</a:t>
-            </a:fld>
-            <a:endParaRPr lang="de-DE"/>
-          </a:p>
-        </p:txBody>
-      </p:sp>
-    </p:spTree>
-    <p:extLst>
-      <p:ext uri="{BB962C8B-B14F-4D97-AF65-F5344CB8AC3E}">
-        <p14:creationId xmlns:p14="http://schemas.microsoft.com/office/powerpoint/2010/main" val="805443497"/>
-      </p:ext>
-    </p:extLst>
-  </p:cSld>
-  <p:clrMapOvr>
-    <a:masterClrMapping/>
-  </p:clrMapOvr>
-  <p:timing>
-    <p:tnLst>
-      <p:par>
-        <p:cTn id="1" dur="indefinite" restart="never" nodeType="tmRoot"/>
-      </p:par>
-    </p:tnLst>
-  </p:timing>
-</p:sld>
-</file>
-
-<file path=ppt/slides/slide6.xml><?xml version="1.0" encoding="utf-8"?>
-<p:sld xmlns:a="http://schemas.openxmlformats.org/drawingml/2006/main" xmlns:r="http://schemas.openxmlformats.org/officeDocument/2006/relationships" xmlns:p="http://schemas.openxmlformats.org/presentationml/2006/main">
-  <p:cSld>
-    <p:spTree>
-      <p:nvGrpSpPr>
-        <p:cNvPr id="1" name=""/>
-        <p:cNvGrpSpPr/>
-        <p:nvPr/>
-      </p:nvGrpSpPr>
-      <p:grpSpPr>
-        <a:xfrm>
-          <a:off x="0" y="0"/>
-          <a:ext cx="0" cy="0"/>
-          <a:chOff x="0" y="0"/>
-          <a:chExt cx="0" cy="0"/>
-        </a:xfrm>
-      </p:grpSpPr>
-      <p:sp>
-        <p:nvSpPr>
           <p:cNvPr id="3" name="Date Placeholder 2"/>
           <p:cNvSpPr>
             <a:spLocks noGrp="1"/>
@@ -40814,7 +40749,34 @@
                 </a:solidFill>
                 <a:latin typeface="Calibri" charset="0"/>
               </a:rPr>
-              <a:t>accounting</a:t>
+              <a:t>d</a:t>
+            </a:r>
+            <a:r>
+              <a:rPr lang="de-DE" sz="3200" dirty="0" err="1" smtClean="0">
+                <a:solidFill>
+                  <a:srgbClr val="000000"/>
+                </a:solidFill>
+                <a:latin typeface="Calibri" charset="0"/>
+              </a:rPr>
+              <a:t>ay</a:t>
+            </a:r>
+            <a:r>
+              <a:rPr lang="de-DE" sz="3200" dirty="0" smtClean="0">
+                <a:solidFill>
+                  <a:srgbClr val="000000"/>
+                </a:solidFill>
+                <a:latin typeface="Calibri" charset="0"/>
+              </a:rPr>
+              <a:t> end </a:t>
+            </a:r>
+            <a:r>
+              <a:rPr lang="de-DE" sz="3200" dirty="0" err="1" smtClean="0">
+                <a:solidFill>
+                  <a:srgbClr val="000000"/>
+                </a:solidFill>
+                <a:latin typeface="Calibri" charset="0"/>
+              </a:rPr>
+              <a:t>closing</a:t>
             </a:r>
             <a:endParaRPr lang="de-DE" sz="3200" dirty="0">
               <a:solidFill>
@@ -40985,7 +40947,7 @@
               <a:pPr>
                 <a:defRPr/>
               </a:pPr>
-              <a:t>6</a:t>
+              <a:t>5</a:t>
             </a:fld>
             <a:endParaRPr lang="de-AT"/>
           </a:p>
@@ -41011,7 +40973,7 @@
 </p:sld>
 </file>
 
-<file path=ppt/slides/slide7.xml><?xml version="1.0" encoding="utf-8"?>
+<file path=ppt/slides/slide6.xml><?xml version="1.0" encoding="utf-8"?>
 <p:sld xmlns:a="http://schemas.openxmlformats.org/drawingml/2006/main" xmlns:r="http://schemas.openxmlformats.org/officeDocument/2006/relationships" xmlns:p="http://schemas.openxmlformats.org/presentationml/2006/main">
   <p:cSld>
     <p:spTree>
@@ -41409,7 +41371,7 @@
               <a:pPr>
                 <a:defRPr/>
               </a:pPr>
-              <a:t>7</a:t>
+              <a:t>6</a:t>
             </a:fld>
             <a:endParaRPr lang="de-AT"/>
           </a:p>
@@ -41573,6 +41535,205 @@
     <p:extLst>
       <p:ext uri="{BB962C8B-B14F-4D97-AF65-F5344CB8AC3E}">
         <p14:creationId xmlns:p14="http://schemas.microsoft.com/office/powerpoint/2010/main" val="635496484"/>
+      </p:ext>
+    </p:extLst>
+  </p:cSld>
+  <p:clrMapOvr>
+    <a:masterClrMapping/>
+  </p:clrMapOvr>
+  <p:timing>
+    <p:tnLst>
+      <p:par>
+        <p:cTn id="1" dur="indefinite" restart="never" nodeType="tmRoot"/>
+      </p:par>
+    </p:tnLst>
+  </p:timing>
+</p:sld>
+</file>
+
+<file path=ppt/slides/slide7.xml><?xml version="1.0" encoding="utf-8"?>
+<p:sld xmlns:a="http://schemas.openxmlformats.org/drawingml/2006/main" xmlns:r="http://schemas.openxmlformats.org/officeDocument/2006/relationships" xmlns:p="http://schemas.openxmlformats.org/presentationml/2006/main">
+  <p:cSld>
+    <p:spTree>
+      <p:nvGrpSpPr>
+        <p:cNvPr id="1" name=""/>
+        <p:cNvGrpSpPr/>
+        <p:nvPr/>
+      </p:nvGrpSpPr>
+      <p:grpSpPr>
+        <a:xfrm>
+          <a:off x="0" y="0"/>
+          <a:ext cx="0" cy="0"/>
+          <a:chOff x="0" y="0"/>
+          <a:chExt cx="0" cy="0"/>
+        </a:xfrm>
+      </p:grpSpPr>
+      <p:sp>
+        <p:nvSpPr>
+          <p:cNvPr id="2" name="Titel 1"/>
+          <p:cNvSpPr>
+            <a:spLocks noGrp="1"/>
+          </p:cNvSpPr>
+          <p:nvPr>
+            <p:ph type="title"/>
+          </p:nvPr>
+        </p:nvSpPr>
+        <p:spPr/>
+        <p:txBody>
+          <a:bodyPr/>
+          <a:lstStyle/>
+          <a:p>
+            <a:r>
+              <a:rPr lang="de-AT" dirty="0" smtClean="0"/>
+              <a:t>Customer </a:t>
+            </a:r>
+            <a:r>
+              <a:rPr lang="de-AT" dirty="0" err="1" smtClean="0"/>
+              <a:t>presenation</a:t>
+            </a:r>
+            <a:endParaRPr lang="en-GB" dirty="0"/>
+          </a:p>
+        </p:txBody>
+      </p:sp>
+      <p:sp>
+        <p:nvSpPr>
+          <p:cNvPr id="3" name="Inhaltsplatzhalter 2"/>
+          <p:cNvSpPr>
+            <a:spLocks noGrp="1"/>
+          </p:cNvSpPr>
+          <p:nvPr>
+            <p:ph idx="1"/>
+          </p:nvPr>
+        </p:nvSpPr>
+        <p:spPr/>
+        <p:txBody>
+          <a:bodyPr/>
+          <a:lstStyle/>
+          <a:p>
+            <a:pPr marL="457200" indent="-457200"/>
+            <a:r>
+              <a:rPr lang="de-AT" dirty="0"/>
+              <a:t>Demonstration </a:t>
+            </a:r>
+            <a:r>
+              <a:rPr lang="de-AT" dirty="0" err="1"/>
+              <a:t>of</a:t>
+            </a:r>
+            <a:r>
+              <a:rPr lang="de-AT" dirty="0"/>
+              <a:t> </a:t>
+            </a:r>
+            <a:r>
+              <a:rPr lang="de-AT" dirty="0" err="1"/>
+              <a:t>the</a:t>
+            </a:r>
+            <a:r>
+              <a:rPr lang="de-AT" dirty="0"/>
+              <a:t> </a:t>
+            </a:r>
+            <a:r>
+              <a:rPr lang="de-AT" dirty="0" err="1"/>
+              <a:t>program</a:t>
+            </a:r>
+            <a:endParaRPr lang="de-AT" dirty="0"/>
+          </a:p>
+          <a:p>
+            <a:pPr marL="457200" indent="-457200"/>
+            <a:r>
+              <a:rPr lang="de-AT" dirty="0" err="1"/>
+              <a:t>Screencast</a:t>
+            </a:r>
+            <a:endParaRPr lang="de-AT" dirty="0"/>
+          </a:p>
+          <a:p>
+            <a:pPr marL="457200" indent="-457200"/>
+            <a:r>
+              <a:rPr lang="de-AT" dirty="0" smtClean="0"/>
+              <a:t>Summary</a:t>
+            </a:r>
+            <a:endParaRPr lang="de-AT" dirty="0"/>
+          </a:p>
+          <a:p>
+            <a:pPr marL="0" indent="0">
+              <a:buNone/>
+            </a:pPr>
+            <a:endParaRPr lang="en-GB" dirty="0"/>
+          </a:p>
+        </p:txBody>
+      </p:sp>
+      <p:sp>
+        <p:nvSpPr>
+          <p:cNvPr id="4" name="Datumsplatzhalter 3"/>
+          <p:cNvSpPr>
+            <a:spLocks noGrp="1"/>
+          </p:cNvSpPr>
+          <p:nvPr>
+            <p:ph type="dt" sz="half" idx="10"/>
+          </p:nvPr>
+        </p:nvSpPr>
+        <p:spPr/>
+        <p:txBody>
+          <a:bodyPr/>
+          <a:lstStyle/>
+          <a:p>
+            <a:fld id="{281C52AE-42A8-4426-ADA6-159E569D9194}" type="datetime1">
+              <a:rPr lang="de-DE" smtClean="0"/>
+              <a:t>12.06.2012</a:t>
+            </a:fld>
+            <a:endParaRPr lang="de-DE"/>
+          </a:p>
+        </p:txBody>
+      </p:sp>
+      <p:sp>
+        <p:nvSpPr>
+          <p:cNvPr id="5" name="Fußzeilenplatzhalter 4"/>
+          <p:cNvSpPr>
+            <a:spLocks noGrp="1"/>
+          </p:cNvSpPr>
+          <p:nvPr>
+            <p:ph type="ftr" sz="quarter" idx="11"/>
+          </p:nvPr>
+        </p:nvSpPr>
+        <p:spPr/>
+        <p:txBody>
+          <a:bodyPr/>
+          <a:lstStyle/>
+          <a:p>
+            <a:r>
+              <a:rPr lang="de-DE" smtClean="0"/>
+              <a:t>Roomanizer Presentation Team E</a:t>
+            </a:r>
+            <a:endParaRPr lang="de-DE"/>
+          </a:p>
+        </p:txBody>
+      </p:sp>
+      <p:sp>
+        <p:nvSpPr>
+          <p:cNvPr id="6" name="Foliennummernplatzhalter 5"/>
+          <p:cNvSpPr>
+            <a:spLocks noGrp="1"/>
+          </p:cNvSpPr>
+          <p:nvPr>
+            <p:ph type="sldNum" sz="quarter" idx="12"/>
+          </p:nvPr>
+        </p:nvSpPr>
+        <p:spPr/>
+        <p:txBody>
+          <a:bodyPr/>
+          <a:lstStyle/>
+          <a:p>
+            <a:fld id="{6C6AE60A-B69C-4790-82F7-3882EDF23186}" type="slidenum">
+              <a:rPr lang="de-DE" smtClean="0"/>
+              <a:t>7</a:t>
+            </a:fld>
+            <a:endParaRPr lang="de-DE"/>
+          </a:p>
+        </p:txBody>
+      </p:sp>
+    </p:spTree>
+    <p:extLst>
+      <p:ext uri="{BB962C8B-B14F-4D97-AF65-F5344CB8AC3E}">
+        <p14:creationId xmlns:p14="http://schemas.microsoft.com/office/powerpoint/2010/main" val="805443497"/>
       </p:ext>
     </p:extLst>
   </p:cSld>

</xml_diff>